<commit_message>
add presentation, update report
</commit_message>
<xml_diff>
--- a/presentation/DutileOtentiPhangSweeney.pptx
+++ b/presentation/DutileOtentiPhangSweeney.pptx
@@ -5,23 +5,25 @@
     <p:sldMasterId id="2147483648" r:id="rId1"/>
   </p:sldMasterIdLst>
   <p:notesMasterIdLst>
-    <p:notesMasterId r:id="rId13"/>
+    <p:notesMasterId r:id="rId15"/>
   </p:notesMasterIdLst>
   <p:handoutMasterIdLst>
-    <p:handoutMasterId r:id="rId14"/>
+    <p:handoutMasterId r:id="rId16"/>
   </p:handoutMasterIdLst>
   <p:sldIdLst>
     <p:sldId id="256" r:id="rId2"/>
     <p:sldId id="273" r:id="rId3"/>
     <p:sldId id="274" r:id="rId4"/>
-    <p:sldId id="265" r:id="rId5"/>
-    <p:sldId id="275" r:id="rId6"/>
-    <p:sldId id="271" r:id="rId7"/>
-    <p:sldId id="276" r:id="rId8"/>
-    <p:sldId id="269" r:id="rId9"/>
-    <p:sldId id="262" r:id="rId10"/>
-    <p:sldId id="277" r:id="rId11"/>
-    <p:sldId id="261" r:id="rId12"/>
+    <p:sldId id="278" r:id="rId5"/>
+    <p:sldId id="279" r:id="rId6"/>
+    <p:sldId id="275" r:id="rId7"/>
+    <p:sldId id="271" r:id="rId8"/>
+    <p:sldId id="276" r:id="rId9"/>
+    <p:sldId id="280" r:id="rId10"/>
+    <p:sldId id="281" r:id="rId11"/>
+    <p:sldId id="262" r:id="rId12"/>
+    <p:sldId id="277" r:id="rId13"/>
+    <p:sldId id="261" r:id="rId14"/>
   </p:sldIdLst>
   <p:sldSz cx="9144000" cy="6858000" type="screen4x3"/>
   <p:notesSz cx="6858000" cy="9144000"/>
@@ -135,6 +137,9 @@
         </p15:guide>
       </p15:sldGuideLst>
     </p:ext>
+    <p:ext uri="{2D200454-40CA-4A62-9FC3-DE9A4176ACB9}">
+      <p15:notesGuideLst xmlns:p15="http://schemas.microsoft.com/office/powerpoint/2012/main"/>
+    </p:ext>
   </p:extLst>
 </p:presentation>
 </file>
@@ -221,7 +226,7 @@
           <a:p>
             <a:fld id="{69F838D6-D208-E54F-80E5-7DC509039C32}" type="datetimeFigureOut">
               <a:rPr lang="en-US" smtClean="0"/>
-              <a:t>4/22/18</a:t>
+              <a:t>4/23/18</a:t>
             </a:fld>
             <a:endParaRPr lang="en-US"/>
           </a:p>
@@ -387,7 +392,7 @@
           <a:p>
             <a:fld id="{C4DE9AAC-E34A-E34F-8216-9BD67DCDB2D8}" type="datetimeFigureOut">
               <a:rPr lang="en-US" smtClean="0"/>
-              <a:t>4/22/18</a:t>
+              <a:t>4/23/18</a:t>
             </a:fld>
             <a:endParaRPr lang="en-US"/>
           </a:p>
@@ -699,6 +704,10 @@
           <a:bodyPr/>
           <a:lstStyle/>
           <a:p>
+            <a:pPr marL="171450" indent="-171450">
+              <a:buFont typeface="Arial" panose="020B0604020202020204" pitchFamily="34" charset="0"/>
+              <a:buChar char="•"/>
+            </a:pPr>
             <a:r>
               <a:rPr lang="en-US" sz="1200" b="0" i="0" kern="1200" dirty="0">
                 <a:solidFill>
@@ -709,9 +718,116 @@
                 <a:ea typeface="+mn-ea"/>
                 <a:cs typeface="+mn-cs"/>
               </a:rPr>
-              <a:t>We looked at the distribution of the data to identify class imbalance - a term used to describe when a target class within a data set is outnumbered by another target class (or classes). This can create misleading accuracy metrics, known as an accuracy paradox.</a:t>
-            </a:r>
-            <a:endParaRPr lang="en-US" dirty="0"/>
+              <a:t>Have foreground and background image</a:t>
+            </a:r>
+          </a:p>
+          <a:p>
+            <a:pPr marL="171450" indent="-171450">
+              <a:buFont typeface="Arial" panose="020B0604020202020204" pitchFamily="34" charset="0"/>
+              <a:buChar char="•"/>
+            </a:pPr>
+            <a:r>
+              <a:rPr lang="en-US" sz="1200" b="0" i="0" kern="1200" dirty="0">
+                <a:solidFill>
+                  <a:schemeClr val="tx1"/>
+                </a:solidFill>
+                <a:effectLst/>
+                <a:latin typeface="+mn-lt"/>
+                <a:ea typeface="+mn-ea"/>
+                <a:cs typeface="+mn-cs"/>
+              </a:rPr>
+              <a:t>We can see the foreground image have a higher density of points with values higher than a particular threshold (50)</a:t>
+            </a:r>
+          </a:p>
+          <a:p>
+            <a:pPr marL="171450" indent="-171450">
+              <a:buFont typeface="Arial" panose="020B0604020202020204" pitchFamily="34" charset="0"/>
+              <a:buChar char="•"/>
+            </a:pPr>
+            <a:r>
+              <a:rPr lang="en-US" sz="1200" b="0" i="0" kern="1200" dirty="0">
+                <a:solidFill>
+                  <a:schemeClr val="tx1"/>
+                </a:solidFill>
+                <a:effectLst/>
+                <a:latin typeface="+mn-lt"/>
+                <a:ea typeface="+mn-ea"/>
+                <a:cs typeface="+mn-cs"/>
+              </a:rPr>
+              <a:t>Foreground and background have diff characterizes – foreground has more clustering of white images on the center (in the raw image and FFT transformation)</a:t>
+            </a:r>
+          </a:p>
+          <a:p>
+            <a:pPr marL="171450" indent="-171450">
+              <a:buFont typeface="Arial" panose="020B0604020202020204" pitchFamily="34" charset="0"/>
+              <a:buChar char="•"/>
+            </a:pPr>
+            <a:r>
+              <a:rPr lang="en-US" sz="1200" b="0" i="0" kern="1200" dirty="0">
+                <a:solidFill>
+                  <a:schemeClr val="tx1"/>
+                </a:solidFill>
+                <a:effectLst/>
+                <a:latin typeface="+mn-lt"/>
+                <a:ea typeface="+mn-ea"/>
+                <a:cs typeface="+mn-cs"/>
+              </a:rPr>
+              <a:t>We extracted more features based on clusters of pixels with higher values</a:t>
+            </a:r>
+          </a:p>
+          <a:p>
+            <a:pPr marL="171450" indent="-171450">
+              <a:buFont typeface="Arial" panose="020B0604020202020204" pitchFamily="34" charset="0"/>
+              <a:buChar char="•"/>
+            </a:pPr>
+            <a:r>
+              <a:rPr lang="en-US" sz="1200" b="0" i="0" kern="1200" dirty="0">
+                <a:solidFill>
+                  <a:schemeClr val="tx1"/>
+                </a:solidFill>
+                <a:effectLst/>
+                <a:latin typeface="+mn-lt"/>
+                <a:ea typeface="+mn-ea"/>
+                <a:cs typeface="+mn-cs"/>
+              </a:rPr>
+              <a:t>Decided to do window around the center – analyze raw image and foreground transformation which is a representation of image.</a:t>
+            </a:r>
+          </a:p>
+          <a:p>
+            <a:pPr marL="171450" indent="-171450">
+              <a:buFont typeface="Arial" panose="020B0604020202020204" pitchFamily="34" charset="0"/>
+              <a:buChar char="•"/>
+            </a:pPr>
+            <a:r>
+              <a:rPr lang="en-US" sz="1200" b="0" i="0" kern="1200" dirty="0">
+                <a:solidFill>
+                  <a:schemeClr val="tx1"/>
+                </a:solidFill>
+                <a:effectLst/>
+                <a:latin typeface="+mn-lt"/>
+                <a:ea typeface="+mn-ea"/>
+                <a:cs typeface="+mn-cs"/>
+              </a:rPr>
+              <a:t>Features selected (small feature vector): center pixel, overall # of pixels &gt; threshold, FFT</a:t>
+            </a:r>
+          </a:p>
+          <a:p>
+            <a:pPr marL="171450" indent="-171450">
+              <a:buFont typeface="Arial" panose="020B0604020202020204" pitchFamily="34" charset="0"/>
+              <a:buChar char="•"/>
+            </a:pPr>
+            <a:r>
+              <a:rPr lang="en-US" sz="1200" b="0" i="0" kern="1200" dirty="0">
+                <a:solidFill>
+                  <a:schemeClr val="tx1"/>
+                </a:solidFill>
+                <a:effectLst/>
+                <a:latin typeface="+mn-lt"/>
+                <a:ea typeface="+mn-ea"/>
+                <a:cs typeface="+mn-cs"/>
+              </a:rPr>
+              <a:t>We looked at the distribution of the data to identify class imbalance - a term used to describe when a target class within a data set is outnumbered by another target class (or classes). This can create misleading accuracy metrics, known as an accuracy paradox</a:t>
+            </a:r>
           </a:p>
         </p:txBody>
       </p:sp>
@@ -742,6 +858,117 @@
     <p:extLst>
       <p:ext uri="{BB962C8B-B14F-4D97-AF65-F5344CB8AC3E}">
         <p14:creationId xmlns:p14="http://schemas.microsoft.com/office/powerpoint/2010/main" val="269511429"/>
+      </p:ext>
+    </p:extLst>
+  </p:cSld>
+  <p:clrMapOvr>
+    <a:masterClrMapping/>
+  </p:clrMapOvr>
+</p:notes>
+</file>
+
+<file path=ppt/notesSlides/notesSlide10.xml><?xml version="1.0" encoding="utf-8"?>
+<p:notes xmlns:a="http://schemas.openxmlformats.org/drawingml/2006/main" xmlns:r="http://schemas.openxmlformats.org/officeDocument/2006/relationships" xmlns:p="http://schemas.openxmlformats.org/presentationml/2006/main">
+  <p:cSld>
+    <p:spTree>
+      <p:nvGrpSpPr>
+        <p:cNvPr id="1" name=""/>
+        <p:cNvGrpSpPr/>
+        <p:nvPr/>
+      </p:nvGrpSpPr>
+      <p:grpSpPr>
+        <a:xfrm>
+          <a:off x="0" y="0"/>
+          <a:ext cx="0" cy="0"/>
+          <a:chOff x="0" y="0"/>
+          <a:chExt cx="0" cy="0"/>
+        </a:xfrm>
+      </p:grpSpPr>
+      <p:sp>
+        <p:nvSpPr>
+          <p:cNvPr id="2" name="Slide Image Placeholder 1"/>
+          <p:cNvSpPr>
+            <a:spLocks noGrp="1" noRot="1" noChangeAspect="1"/>
+          </p:cNvSpPr>
+          <p:nvPr>
+            <p:ph type="sldImg"/>
+          </p:nvPr>
+        </p:nvSpPr>
+        <p:spPr/>
+      </p:sp>
+      <p:sp>
+        <p:nvSpPr>
+          <p:cNvPr id="3" name="Notes Placeholder 2"/>
+          <p:cNvSpPr>
+            <a:spLocks noGrp="1"/>
+          </p:cNvSpPr>
+          <p:nvPr>
+            <p:ph type="body" idx="1"/>
+          </p:nvPr>
+        </p:nvSpPr>
+        <p:spPr/>
+        <p:txBody>
+          <a:bodyPr/>
+          <a:lstStyle/>
+          <a:p>
+            <a:r>
+              <a:rPr lang="en-US" dirty="0"/>
+              <a:t>IMAGE 2 = validation, train on the rest of the data.</a:t>
+            </a:r>
+          </a:p>
+          <a:p>
+            <a:r>
+              <a:rPr lang="en-US" dirty="0"/>
+              <a:t>Base accuracy = total number of samples / negatives</a:t>
+            </a:r>
+          </a:p>
+          <a:p>
+            <a:r>
+              <a:rPr lang="en-US" dirty="0"/>
+              <a:t>Best = TN + TP / total</a:t>
+            </a:r>
+          </a:p>
+          <a:p>
+            <a:r>
+              <a:rPr lang="en-US" dirty="0"/>
+              <a:t>Don’t have as good sensitivity for foreground. Getting a better sensitivity for foreground we lose on background.</a:t>
+            </a:r>
+          </a:p>
+          <a:p>
+            <a:r>
+              <a:rPr lang="en-US" dirty="0"/>
+              <a:t>Similar to classifying patients with cancer, by selecting accuracy metric – true negatives is important. Have the smallest false positive rate.</a:t>
+            </a:r>
+          </a:p>
+        </p:txBody>
+      </p:sp>
+      <p:sp>
+        <p:nvSpPr>
+          <p:cNvPr id="4" name="Slide Number Placeholder 3"/>
+          <p:cNvSpPr>
+            <a:spLocks noGrp="1"/>
+          </p:cNvSpPr>
+          <p:nvPr>
+            <p:ph type="sldNum" sz="quarter" idx="10"/>
+          </p:nvPr>
+        </p:nvSpPr>
+        <p:spPr/>
+        <p:txBody>
+          <a:bodyPr/>
+          <a:lstStyle/>
+          <a:p>
+            <a:fld id="{1B8B4FD3-9156-3F45-86A6-2A512E7D4DAE}" type="slidenum">
+              <a:rPr lang="en-US" smtClean="0"/>
+              <a:t>12</a:t>
+            </a:fld>
+            <a:endParaRPr lang="en-US"/>
+          </a:p>
+        </p:txBody>
+      </p:sp>
+    </p:spTree>
+    <p:extLst>
+      <p:ext uri="{BB962C8B-B14F-4D97-AF65-F5344CB8AC3E}">
+        <p14:creationId xmlns:p14="http://schemas.microsoft.com/office/powerpoint/2010/main" val="2620487326"/>
       </p:ext>
     </p:extLst>
   </p:cSld>
@@ -809,7 +1036,25 @@
                 <a:ea typeface="+mn-ea"/>
                 <a:cs typeface="+mn-cs"/>
               </a:rPr>
-              <a:t>Using cross validation, we can create multiple training and test sets and average the scores to give us a less biased metric.</a:t>
+              <a:t>Decision tree and RF splits the samples on the features</a:t>
+            </a:r>
+          </a:p>
+          <a:p>
+            <a:pPr marL="171450" indent="-171450">
+              <a:buFont typeface="Arial" panose="020B0604020202020204" pitchFamily="34" charset="0"/>
+              <a:buChar char="•"/>
+            </a:pPr>
+            <a:r>
+              <a:rPr lang="en-US" sz="1200" b="0" i="0" kern="1200" dirty="0">
+                <a:solidFill>
+                  <a:schemeClr val="tx1"/>
+                </a:solidFill>
+                <a:effectLst/>
+                <a:latin typeface="+mn-lt"/>
+                <a:ea typeface="+mn-ea"/>
+                <a:cs typeface="+mn-cs"/>
+              </a:rPr>
+              <a:t>Foreground image has a higher value than background</a:t>
             </a:r>
             <a:endParaRPr lang="en-US" dirty="0"/>
           </a:p>
@@ -841,7 +1086,7 @@
     </p:spTree>
     <p:extLst>
       <p:ext uri="{BB962C8B-B14F-4D97-AF65-F5344CB8AC3E}">
-        <p14:creationId xmlns:p14="http://schemas.microsoft.com/office/powerpoint/2010/main" val="2138201310"/>
+        <p14:creationId xmlns:p14="http://schemas.microsoft.com/office/powerpoint/2010/main" val="2224639676"/>
       </p:ext>
     </p:extLst>
   </p:cSld>
@@ -900,9 +1145,114 @@
               <a:buChar char="•"/>
             </a:pPr>
             <a:r>
-              <a:rPr lang="en-US" dirty="0"/>
-              <a:t>Gini used since it doesn't require to compute logarithmic functions (which is calculated in entropy), which are computationally intensive.</a:t>
-            </a:r>
+              <a:rPr lang="en-US" sz="1200" b="0" i="0" kern="1200" dirty="0">
+                <a:solidFill>
+                  <a:schemeClr val="tx1"/>
+                </a:solidFill>
+                <a:effectLst/>
+                <a:latin typeface="+mn-lt"/>
+                <a:ea typeface="+mn-ea"/>
+                <a:cs typeface="+mn-cs"/>
+              </a:rPr>
+              <a:t>Ran a subset of samples, Using cross validation, we can create multiple training and test sets and average the scores to give us a less biased metric.</a:t>
+            </a:r>
+          </a:p>
+          <a:p>
+            <a:pPr marL="171450" indent="-171450">
+              <a:buFont typeface="Arial" panose="020B0604020202020204" pitchFamily="34" charset="0"/>
+              <a:buChar char="•"/>
+            </a:pPr>
+            <a:r>
+              <a:rPr lang="en-US" sz="1200" b="0" i="0" kern="1200" dirty="0">
+                <a:solidFill>
+                  <a:schemeClr val="tx1"/>
+                </a:solidFill>
+                <a:effectLst/>
+                <a:latin typeface="+mn-lt"/>
+                <a:ea typeface="+mn-ea"/>
+                <a:cs typeface="+mn-cs"/>
+              </a:rPr>
+              <a:t>Decision trees, RF, AdaBoost ensembles doing best</a:t>
+            </a:r>
+          </a:p>
+          <a:p>
+            <a:pPr marL="171450" indent="-171450">
+              <a:buFont typeface="Arial" panose="020B0604020202020204" pitchFamily="34" charset="0"/>
+              <a:buChar char="•"/>
+            </a:pPr>
+            <a:r>
+              <a:rPr lang="en-US" sz="1200" b="0" i="0" kern="1200" dirty="0">
+                <a:solidFill>
+                  <a:schemeClr val="tx1"/>
+                </a:solidFill>
+                <a:effectLst/>
+                <a:latin typeface="+mn-lt"/>
+                <a:ea typeface="+mn-ea"/>
+                <a:cs typeface="+mn-cs"/>
+              </a:rPr>
+              <a:t>RF scaled the best with framework</a:t>
+            </a:r>
+          </a:p>
+          <a:p>
+            <a:pPr marL="171450" indent="-171450">
+              <a:buFont typeface="Arial" panose="020B0604020202020204" pitchFamily="34" charset="0"/>
+              <a:buChar char="•"/>
+            </a:pPr>
+            <a:r>
+              <a:rPr lang="en-US" sz="1200" b="0" i="0" kern="1200" dirty="0">
+                <a:solidFill>
+                  <a:schemeClr val="tx1"/>
+                </a:solidFill>
+                <a:effectLst/>
+                <a:latin typeface="+mn-lt"/>
+                <a:ea typeface="+mn-ea"/>
+                <a:cs typeface="+mn-cs"/>
+              </a:rPr>
+              <a:t>Image shows subset of samples as background or foreground</a:t>
+            </a:r>
+          </a:p>
+          <a:p>
+            <a:pPr marL="171450" indent="-171450">
+              <a:buFont typeface="Arial" panose="020B0604020202020204" pitchFamily="34" charset="0"/>
+              <a:buChar char="•"/>
+            </a:pPr>
+            <a:r>
+              <a:rPr lang="en-US" sz="1200" b="0" i="0" kern="1200" dirty="0">
+                <a:solidFill>
+                  <a:schemeClr val="tx1"/>
+                </a:solidFill>
+                <a:effectLst/>
+                <a:latin typeface="+mn-lt"/>
+                <a:ea typeface="+mn-ea"/>
+                <a:cs typeface="+mn-cs"/>
+              </a:rPr>
+              <a:t>Red = background, blue = foreground</a:t>
+            </a:r>
+          </a:p>
+          <a:p>
+            <a:pPr marL="171450" indent="-171450">
+              <a:buFont typeface="Arial" panose="020B0604020202020204" pitchFamily="34" charset="0"/>
+              <a:buChar char="•"/>
+            </a:pPr>
+            <a:r>
+              <a:rPr lang="en-US" sz="1200" b="0" i="0" kern="1200" dirty="0">
+                <a:solidFill>
+                  <a:schemeClr val="tx1"/>
+                </a:solidFill>
+                <a:effectLst/>
+                <a:latin typeface="+mn-lt"/>
+                <a:ea typeface="+mn-ea"/>
+                <a:cs typeface="+mn-cs"/>
+              </a:rPr>
+              <a:t>Bottom image = feature vector image with preprocessed data</a:t>
+            </a:r>
+          </a:p>
+          <a:p>
+            <a:pPr marL="171450" indent="-171450">
+              <a:buFont typeface="Arial" panose="020B0604020202020204" pitchFamily="34" charset="0"/>
+              <a:buChar char="•"/>
+            </a:pPr>
+            <a:endParaRPr lang="en-US" dirty="0"/>
           </a:p>
         </p:txBody>
       </p:sp>
@@ -923,7 +1273,7 @@
           <a:p>
             <a:fld id="{1B8B4FD3-9156-3F45-86A6-2A512E7D4DAE}" type="slidenum">
               <a:rPr lang="en-US" smtClean="0"/>
-              <a:t>6</a:t>
+              <a:t>5</a:t>
             </a:fld>
             <a:endParaRPr lang="en-US"/>
           </a:p>
@@ -932,7 +1282,7 @@
     </p:spTree>
     <p:extLst>
       <p:ext uri="{BB962C8B-B14F-4D97-AF65-F5344CB8AC3E}">
-        <p14:creationId xmlns:p14="http://schemas.microsoft.com/office/powerpoint/2010/main" val="698586686"/>
+        <p14:creationId xmlns:p14="http://schemas.microsoft.com/office/powerpoint/2010/main" val="2973449022"/>
       </p:ext>
     </p:extLst>
   </p:cSld>
@@ -986,14 +1336,103 @@
           <a:bodyPr/>
           <a:lstStyle/>
           <a:p>
+            <a:endParaRPr lang="en-US" dirty="0"/>
+          </a:p>
+        </p:txBody>
+      </p:sp>
+      <p:sp>
+        <p:nvSpPr>
+          <p:cNvPr id="4" name="Slide Number Placeholder 3"/>
+          <p:cNvSpPr>
+            <a:spLocks noGrp="1"/>
+          </p:cNvSpPr>
+          <p:nvPr>
+            <p:ph type="sldNum" sz="quarter" idx="10"/>
+          </p:nvPr>
+        </p:nvSpPr>
+        <p:spPr/>
+        <p:txBody>
+          <a:bodyPr/>
+          <a:lstStyle/>
+          <a:p>
+            <a:fld id="{1B8B4FD3-9156-3F45-86A6-2A512E7D4DAE}" type="slidenum">
+              <a:rPr lang="en-US" smtClean="0"/>
+              <a:t>6</a:t>
+            </a:fld>
+            <a:endParaRPr lang="en-US"/>
+          </a:p>
+        </p:txBody>
+      </p:sp>
+    </p:spTree>
+    <p:extLst>
+      <p:ext uri="{BB962C8B-B14F-4D97-AF65-F5344CB8AC3E}">
+        <p14:creationId xmlns:p14="http://schemas.microsoft.com/office/powerpoint/2010/main" val="1147834750"/>
+      </p:ext>
+    </p:extLst>
+  </p:cSld>
+  <p:clrMapOvr>
+    <a:masterClrMapping/>
+  </p:clrMapOvr>
+</p:notes>
+</file>
+
+<file path=ppt/notesSlides/notesSlide5.xml><?xml version="1.0" encoding="utf-8"?>
+<p:notes xmlns:a="http://schemas.openxmlformats.org/drawingml/2006/main" xmlns:r="http://schemas.openxmlformats.org/officeDocument/2006/relationships" xmlns:p="http://schemas.openxmlformats.org/presentationml/2006/main">
+  <p:cSld>
+    <p:spTree>
+      <p:nvGrpSpPr>
+        <p:cNvPr id="1" name=""/>
+        <p:cNvGrpSpPr/>
+        <p:nvPr/>
+      </p:nvGrpSpPr>
+      <p:grpSpPr>
+        <a:xfrm>
+          <a:off x="0" y="0"/>
+          <a:ext cx="0" cy="0"/>
+          <a:chOff x="0" y="0"/>
+          <a:chExt cx="0" cy="0"/>
+        </a:xfrm>
+      </p:grpSpPr>
+      <p:sp>
+        <p:nvSpPr>
+          <p:cNvPr id="2" name="Slide Image Placeholder 1"/>
+          <p:cNvSpPr>
+            <a:spLocks noGrp="1" noRot="1" noChangeAspect="1"/>
+          </p:cNvSpPr>
+          <p:nvPr>
+            <p:ph type="sldImg"/>
+          </p:nvPr>
+        </p:nvSpPr>
+        <p:spPr/>
+      </p:sp>
+      <p:sp>
+        <p:nvSpPr>
+          <p:cNvPr id="3" name="Notes Placeholder 2"/>
+          <p:cNvSpPr>
+            <a:spLocks noGrp="1"/>
+          </p:cNvSpPr>
+          <p:nvPr>
+            <p:ph type="body" idx="1"/>
+          </p:nvPr>
+        </p:nvSpPr>
+        <p:spPr/>
+        <p:txBody>
+          <a:bodyPr/>
+          <a:lstStyle/>
+          <a:p>
             <a:pPr marL="171450" indent="-171450">
               <a:buFont typeface="Arial" panose="020B0604020202020204" pitchFamily="34" charset="0"/>
               <a:buChar char="•"/>
             </a:pPr>
             <a:r>
               <a:rPr lang="en-US" dirty="0"/>
-              <a:t>Split dataset into train and test sets</a:t>
-            </a:r>
+              <a:t>Use following parameters – got from </a:t>
+            </a:r>
+            <a:r>
+              <a:rPr lang="en-US" dirty="0" err="1"/>
+              <a:t>paramgridbuilder</a:t>
+            </a:r>
+            <a:endParaRPr lang="en-US" dirty="0"/>
           </a:p>
           <a:p>
             <a:pPr marL="171450" indent="-171450">
@@ -1002,37 +1441,7 @@
             </a:pPr>
             <a:r>
               <a:rPr lang="en-US" dirty="0"/>
-              <a:t>Train the model</a:t>
-            </a:r>
-          </a:p>
-          <a:p>
-            <a:pPr marL="171450" indent="-171450">
-              <a:buFont typeface="Arial" panose="020B0604020202020204" pitchFamily="34" charset="0"/>
-              <a:buChar char="•"/>
-            </a:pPr>
-            <a:r>
-              <a:rPr lang="en-US" dirty="0"/>
-              <a:t>Predict with both training and testing</a:t>
-            </a:r>
-          </a:p>
-          <a:p>
-            <a:pPr marL="171450" indent="-171450">
-              <a:buFont typeface="Arial" panose="020B0604020202020204" pitchFamily="34" charset="0"/>
-              <a:buChar char="•"/>
-            </a:pPr>
-            <a:r>
-              <a:rPr lang="en-US" dirty="0"/>
-              <a:t>Measure error in the predictions (in both sets)</a:t>
-            </a:r>
-          </a:p>
-          <a:p>
-            <a:pPr marL="171450" indent="-171450">
-              <a:buFont typeface="Arial" panose="020B0604020202020204" pitchFamily="34" charset="0"/>
-              <a:buChar char="•"/>
-            </a:pPr>
-            <a:r>
-              <a:rPr lang="en-US" dirty="0"/>
-              <a:t>Compare the error of the two data sets</a:t>
+              <a:t>Gini used since it doesn't require to compute logarithmic functions (which is calculated in entropy), which are computationally intensive.</a:t>
             </a:r>
           </a:p>
         </p:txBody>
@@ -1063,7 +1472,541 @@
     </p:spTree>
     <p:extLst>
       <p:ext uri="{BB962C8B-B14F-4D97-AF65-F5344CB8AC3E}">
+        <p14:creationId xmlns:p14="http://schemas.microsoft.com/office/powerpoint/2010/main" val="698586686"/>
+      </p:ext>
+    </p:extLst>
+  </p:cSld>
+  <p:clrMapOvr>
+    <a:masterClrMapping/>
+  </p:clrMapOvr>
+</p:notes>
+</file>
+
+<file path=ppt/notesSlides/notesSlide6.xml><?xml version="1.0" encoding="utf-8"?>
+<p:notes xmlns:a="http://schemas.openxmlformats.org/drawingml/2006/main" xmlns:r="http://schemas.openxmlformats.org/officeDocument/2006/relationships" xmlns:p="http://schemas.openxmlformats.org/presentationml/2006/main">
+  <p:cSld>
+    <p:spTree>
+      <p:nvGrpSpPr>
+        <p:cNvPr id="1" name=""/>
+        <p:cNvGrpSpPr/>
+        <p:nvPr/>
+      </p:nvGrpSpPr>
+      <p:grpSpPr>
+        <a:xfrm>
+          <a:off x="0" y="0"/>
+          <a:ext cx="0" cy="0"/>
+          <a:chOff x="0" y="0"/>
+          <a:chExt cx="0" cy="0"/>
+        </a:xfrm>
+      </p:grpSpPr>
+      <p:sp>
+        <p:nvSpPr>
+          <p:cNvPr id="2" name="Slide Image Placeholder 1"/>
+          <p:cNvSpPr>
+            <a:spLocks noGrp="1" noRot="1" noChangeAspect="1"/>
+          </p:cNvSpPr>
+          <p:nvPr>
+            <p:ph type="sldImg"/>
+          </p:nvPr>
+        </p:nvSpPr>
+        <p:spPr/>
+      </p:sp>
+      <p:sp>
+        <p:nvSpPr>
+          <p:cNvPr id="3" name="Notes Placeholder 2"/>
+          <p:cNvSpPr>
+            <a:spLocks noGrp="1"/>
+          </p:cNvSpPr>
+          <p:nvPr>
+            <p:ph type="body" idx="1"/>
+          </p:nvPr>
+        </p:nvSpPr>
+        <p:spPr/>
+        <p:txBody>
+          <a:bodyPr/>
+          <a:lstStyle/>
+          <a:p>
+            <a:pPr marL="171450" indent="-171450">
+              <a:buFont typeface="Arial" panose="020B0604020202020204" pitchFamily="34" charset="0"/>
+              <a:buChar char="•"/>
+            </a:pPr>
+            <a:r>
+              <a:rPr lang="en-US" dirty="0"/>
+              <a:t>No form of randomization</a:t>
+            </a:r>
+          </a:p>
+          <a:p>
+            <a:pPr marL="171450" indent="-171450">
+              <a:buFont typeface="Arial" panose="020B0604020202020204" pitchFamily="34" charset="0"/>
+              <a:buChar char="•"/>
+            </a:pPr>
+            <a:r>
+              <a:rPr lang="en-US" dirty="0"/>
+              <a:t>Didn’t use cross validation from </a:t>
+            </a:r>
+            <a:r>
+              <a:rPr lang="en-US" dirty="0" err="1"/>
+              <a:t>scala</a:t>
+            </a:r>
+            <a:r>
+              <a:rPr lang="en-US" dirty="0"/>
+              <a:t> spark, we implemented ourselves</a:t>
+            </a:r>
+          </a:p>
+          <a:p>
+            <a:pPr marL="171450" indent="-171450">
+              <a:buFont typeface="Arial" panose="020B0604020202020204" pitchFamily="34" charset="0"/>
+              <a:buChar char="•"/>
+            </a:pPr>
+            <a:r>
+              <a:rPr lang="en-US" dirty="0"/>
+              <a:t>Use 1,2,3,4 and 6 </a:t>
+            </a:r>
+            <a:r>
+              <a:rPr lang="en-US" dirty="0" err="1"/>
+              <a:t>bc</a:t>
+            </a:r>
+            <a:r>
+              <a:rPr lang="en-US" dirty="0"/>
+              <a:t> we didn’t want data from test inside train (used 4 image for train, 1 for test). This way NO test sample was used during training.</a:t>
+            </a:r>
+          </a:p>
+          <a:p>
+            <a:pPr marL="171450" indent="-171450">
+              <a:buFont typeface="Arial" panose="020B0604020202020204" pitchFamily="34" charset="0"/>
+              <a:buChar char="•"/>
+            </a:pPr>
+            <a:r>
+              <a:rPr lang="en-US" dirty="0"/>
+              <a:t>Split dataset into train and test sets</a:t>
+            </a:r>
+          </a:p>
+          <a:p>
+            <a:pPr marL="171450" indent="-171450">
+              <a:buFont typeface="Arial" panose="020B0604020202020204" pitchFamily="34" charset="0"/>
+              <a:buChar char="•"/>
+            </a:pPr>
+            <a:r>
+              <a:rPr lang="en-US" dirty="0"/>
+              <a:t>Train the model</a:t>
+            </a:r>
+          </a:p>
+          <a:p>
+            <a:pPr marL="171450" indent="-171450">
+              <a:buFont typeface="Arial" panose="020B0604020202020204" pitchFamily="34" charset="0"/>
+              <a:buChar char="•"/>
+            </a:pPr>
+            <a:r>
+              <a:rPr lang="en-US" dirty="0"/>
+              <a:t>Predict with both training and testing</a:t>
+            </a:r>
+          </a:p>
+          <a:p>
+            <a:pPr marL="171450" indent="-171450">
+              <a:buFont typeface="Arial" panose="020B0604020202020204" pitchFamily="34" charset="0"/>
+              <a:buChar char="•"/>
+            </a:pPr>
+            <a:r>
+              <a:rPr lang="en-US" dirty="0"/>
+              <a:t>Measure error in the predictions (in both sets)</a:t>
+            </a:r>
+          </a:p>
+          <a:p>
+            <a:pPr marL="171450" indent="-171450">
+              <a:buFont typeface="Arial" panose="020B0604020202020204" pitchFamily="34" charset="0"/>
+              <a:buChar char="•"/>
+            </a:pPr>
+            <a:r>
+              <a:rPr lang="en-US" dirty="0"/>
+              <a:t>Compare the error of the two data sets</a:t>
+            </a:r>
+          </a:p>
+          <a:p>
+            <a:pPr marL="171450" indent="-171450">
+              <a:buFont typeface="Arial" panose="020B0604020202020204" pitchFamily="34" charset="0"/>
+              <a:buChar char="•"/>
+            </a:pPr>
+            <a:r>
+              <a:rPr lang="en-US" dirty="0"/>
+              <a:t>Trained on diff images and tested</a:t>
+            </a:r>
+          </a:p>
+        </p:txBody>
+      </p:sp>
+      <p:sp>
+        <p:nvSpPr>
+          <p:cNvPr id="4" name="Slide Number Placeholder 3"/>
+          <p:cNvSpPr>
+            <a:spLocks noGrp="1"/>
+          </p:cNvSpPr>
+          <p:nvPr>
+            <p:ph type="sldNum" sz="quarter" idx="10"/>
+          </p:nvPr>
+        </p:nvSpPr>
+        <p:spPr/>
+        <p:txBody>
+          <a:bodyPr/>
+          <a:lstStyle/>
+          <a:p>
+            <a:fld id="{1B8B4FD3-9156-3F45-86A6-2A512E7D4DAE}" type="slidenum">
+              <a:rPr lang="en-US" smtClean="0"/>
+              <a:t>8</a:t>
+            </a:fld>
+            <a:endParaRPr lang="en-US"/>
+          </a:p>
+        </p:txBody>
+      </p:sp>
+    </p:spTree>
+    <p:extLst>
+      <p:ext uri="{BB962C8B-B14F-4D97-AF65-F5344CB8AC3E}">
         <p14:creationId xmlns:p14="http://schemas.microsoft.com/office/powerpoint/2010/main" val="3104478743"/>
+      </p:ext>
+    </p:extLst>
+  </p:cSld>
+  <p:clrMapOvr>
+    <a:masterClrMapping/>
+  </p:clrMapOvr>
+</p:notes>
+</file>
+
+<file path=ppt/notesSlides/notesSlide7.xml><?xml version="1.0" encoding="utf-8"?>
+<p:notes xmlns:a="http://schemas.openxmlformats.org/drawingml/2006/main" xmlns:r="http://schemas.openxmlformats.org/officeDocument/2006/relationships" xmlns:p="http://schemas.openxmlformats.org/presentationml/2006/main">
+  <p:cSld>
+    <p:spTree>
+      <p:nvGrpSpPr>
+        <p:cNvPr id="1" name=""/>
+        <p:cNvGrpSpPr/>
+        <p:nvPr/>
+      </p:nvGrpSpPr>
+      <p:grpSpPr>
+        <a:xfrm>
+          <a:off x="0" y="0"/>
+          <a:ext cx="0" cy="0"/>
+          <a:chOff x="0" y="0"/>
+          <a:chExt cx="0" cy="0"/>
+        </a:xfrm>
+      </p:grpSpPr>
+      <p:sp>
+        <p:nvSpPr>
+          <p:cNvPr id="2" name="Slide Image Placeholder 1"/>
+          <p:cNvSpPr>
+            <a:spLocks noGrp="1" noRot="1" noChangeAspect="1"/>
+          </p:cNvSpPr>
+          <p:nvPr>
+            <p:ph type="sldImg"/>
+          </p:nvPr>
+        </p:nvSpPr>
+        <p:spPr/>
+      </p:sp>
+      <p:sp>
+        <p:nvSpPr>
+          <p:cNvPr id="3" name="Notes Placeholder 2"/>
+          <p:cNvSpPr>
+            <a:spLocks noGrp="1"/>
+          </p:cNvSpPr>
+          <p:nvPr>
+            <p:ph type="body" idx="1"/>
+          </p:nvPr>
+        </p:nvSpPr>
+        <p:spPr/>
+        <p:txBody>
+          <a:bodyPr/>
+          <a:lstStyle/>
+          <a:p>
+            <a:endParaRPr lang="en-US" dirty="0"/>
+          </a:p>
+          <a:p>
+            <a:pPr marL="171450" indent="-171450">
+              <a:buFont typeface="Arial" panose="020B0604020202020204" pitchFamily="34" charset="0"/>
+              <a:buChar char="•"/>
+            </a:pPr>
+            <a:r>
+              <a:rPr lang="en-US" dirty="0"/>
+              <a:t>First, preprocessing was 1 job per image. It is a map only job.</a:t>
+            </a:r>
+          </a:p>
+          <a:p>
+            <a:pPr marL="171450" indent="-171450">
+              <a:buFont typeface="Arial" panose="020B0604020202020204" pitchFamily="34" charset="0"/>
+              <a:buChar char="•"/>
+            </a:pPr>
+            <a:r>
+              <a:rPr lang="en-US" dirty="0"/>
+              <a:t>Pre-processing transformations 6GB image on 65MB image</a:t>
+            </a:r>
+          </a:p>
+          <a:p>
+            <a:pPr marL="171450" indent="-171450">
+              <a:buFont typeface="Arial" panose="020B0604020202020204" pitchFamily="34" charset="0"/>
+              <a:buChar char="•"/>
+            </a:pPr>
+            <a:r>
+              <a:rPr lang="en-US" dirty="0"/>
+              <a:t>The training image are fed to the random forest model to train</a:t>
+            </a:r>
+          </a:p>
+          <a:p>
+            <a:pPr marL="171450" indent="-171450">
+              <a:buFont typeface="Arial" panose="020B0604020202020204" pitchFamily="34" charset="0"/>
+              <a:buChar char="•"/>
+            </a:pPr>
+            <a:r>
+              <a:rPr lang="en-US" dirty="0"/>
+              <a:t>We persist the image, which is a job that shuffles the data depending on the the parameters (shuffling correlated with </a:t>
+            </a:r>
+            <a:r>
+              <a:rPr lang="en-US" dirty="0" err="1"/>
+              <a:t>params</a:t>
+            </a:r>
+            <a:r>
+              <a:rPr lang="en-US" dirty="0"/>
+              <a:t> – it depends more on the depth &amp; number of trees)</a:t>
+            </a:r>
+          </a:p>
+          <a:p>
+            <a:pPr marL="171450" indent="-171450">
+              <a:buFont typeface="Arial" panose="020B0604020202020204" pitchFamily="34" charset="0"/>
+              <a:buChar char="•"/>
+            </a:pPr>
+            <a:r>
+              <a:rPr lang="en-US" dirty="0"/>
+              <a:t>Classification job that has a persisted model and it receives only the image that we want to classify</a:t>
+            </a:r>
+          </a:p>
+          <a:p>
+            <a:pPr marL="171450" indent="-171450">
+              <a:buFont typeface="Arial" panose="020B0604020202020204" pitchFamily="34" charset="0"/>
+              <a:buChar char="•"/>
+            </a:pPr>
+            <a:r>
+              <a:rPr lang="en-US" dirty="0"/>
+              <a:t>because our feature vector is small we didn’t see much scaling on this one (firing up more than 4 workers isn’t necessary)</a:t>
+            </a:r>
+          </a:p>
+        </p:txBody>
+      </p:sp>
+      <p:sp>
+        <p:nvSpPr>
+          <p:cNvPr id="4" name="Slide Number Placeholder 3"/>
+          <p:cNvSpPr>
+            <a:spLocks noGrp="1"/>
+          </p:cNvSpPr>
+          <p:nvPr>
+            <p:ph type="sldNum" sz="quarter" idx="10"/>
+          </p:nvPr>
+        </p:nvSpPr>
+        <p:spPr/>
+        <p:txBody>
+          <a:bodyPr/>
+          <a:lstStyle/>
+          <a:p>
+            <a:fld id="{1B8B4FD3-9156-3F45-86A6-2A512E7D4DAE}" type="slidenum">
+              <a:rPr lang="en-US" smtClean="0"/>
+              <a:t>9</a:t>
+            </a:fld>
+            <a:endParaRPr lang="en-US"/>
+          </a:p>
+        </p:txBody>
+      </p:sp>
+    </p:spTree>
+    <p:extLst>
+      <p:ext uri="{BB962C8B-B14F-4D97-AF65-F5344CB8AC3E}">
+        <p14:creationId xmlns:p14="http://schemas.microsoft.com/office/powerpoint/2010/main" val="3737493002"/>
+      </p:ext>
+    </p:extLst>
+  </p:cSld>
+  <p:clrMapOvr>
+    <a:masterClrMapping/>
+  </p:clrMapOvr>
+</p:notes>
+</file>
+
+<file path=ppt/notesSlides/notesSlide8.xml><?xml version="1.0" encoding="utf-8"?>
+<p:notes xmlns:a="http://schemas.openxmlformats.org/drawingml/2006/main" xmlns:r="http://schemas.openxmlformats.org/officeDocument/2006/relationships" xmlns:p="http://schemas.openxmlformats.org/presentationml/2006/main">
+  <p:cSld>
+    <p:spTree>
+      <p:nvGrpSpPr>
+        <p:cNvPr id="1" name=""/>
+        <p:cNvGrpSpPr/>
+        <p:nvPr/>
+      </p:nvGrpSpPr>
+      <p:grpSpPr>
+        <a:xfrm>
+          <a:off x="0" y="0"/>
+          <a:ext cx="0" cy="0"/>
+          <a:chOff x="0" y="0"/>
+          <a:chExt cx="0" cy="0"/>
+        </a:xfrm>
+      </p:grpSpPr>
+      <p:sp>
+        <p:nvSpPr>
+          <p:cNvPr id="2" name="Slide Image Placeholder 1"/>
+          <p:cNvSpPr>
+            <a:spLocks noGrp="1" noRot="1" noChangeAspect="1"/>
+          </p:cNvSpPr>
+          <p:nvPr>
+            <p:ph type="sldImg"/>
+          </p:nvPr>
+        </p:nvSpPr>
+        <p:spPr/>
+      </p:sp>
+      <p:sp>
+        <p:nvSpPr>
+          <p:cNvPr id="3" name="Notes Placeholder 2"/>
+          <p:cNvSpPr>
+            <a:spLocks noGrp="1"/>
+          </p:cNvSpPr>
+          <p:nvPr>
+            <p:ph type="body" idx="1"/>
+          </p:nvPr>
+        </p:nvSpPr>
+        <p:spPr/>
+        <p:txBody>
+          <a:bodyPr/>
+          <a:lstStyle/>
+          <a:p>
+            <a:r>
+              <a:rPr lang="en-US" dirty="0"/>
+              <a:t>Highlight best model</a:t>
+            </a:r>
+          </a:p>
+          <a:p>
+            <a:r>
+              <a:rPr lang="en-US" dirty="0"/>
+              <a:t>* Right table shows scaling of training</a:t>
+            </a:r>
+          </a:p>
+          <a:p>
+            <a:r>
+              <a:rPr lang="en-US" dirty="0"/>
+              <a:t>What was scaling of processing – parallel</a:t>
+            </a:r>
+          </a:p>
+          <a:p>
+            <a:r>
+              <a:rPr lang="en-US" dirty="0"/>
+              <a:t>Classification – not that parallel (small feature vectors, fit into 65MB for 1 image, then make splits on this thing). If we split beyond 4 parts, the time it takes to fire up other machines it is expensive. </a:t>
+            </a:r>
+          </a:p>
+          <a:p>
+            <a:r>
+              <a:rPr lang="en-US" dirty="0"/>
+              <a:t>* After 4 workers, which is 16 splits, no real scaling </a:t>
+            </a:r>
+          </a:p>
+        </p:txBody>
+      </p:sp>
+      <p:sp>
+        <p:nvSpPr>
+          <p:cNvPr id="4" name="Slide Number Placeholder 3"/>
+          <p:cNvSpPr>
+            <a:spLocks noGrp="1"/>
+          </p:cNvSpPr>
+          <p:nvPr>
+            <p:ph type="sldNum" sz="quarter" idx="10"/>
+          </p:nvPr>
+        </p:nvSpPr>
+        <p:spPr/>
+        <p:txBody>
+          <a:bodyPr/>
+          <a:lstStyle/>
+          <a:p>
+            <a:fld id="{1B8B4FD3-9156-3F45-86A6-2A512E7D4DAE}" type="slidenum">
+              <a:rPr lang="en-US" smtClean="0"/>
+              <a:t>10</a:t>
+            </a:fld>
+            <a:endParaRPr lang="en-US"/>
+          </a:p>
+        </p:txBody>
+      </p:sp>
+    </p:spTree>
+    <p:extLst>
+      <p:ext uri="{BB962C8B-B14F-4D97-AF65-F5344CB8AC3E}">
+        <p14:creationId xmlns:p14="http://schemas.microsoft.com/office/powerpoint/2010/main" val="663596552"/>
+      </p:ext>
+    </p:extLst>
+  </p:cSld>
+  <p:clrMapOvr>
+    <a:masterClrMapping/>
+  </p:clrMapOvr>
+</p:notes>
+</file>
+
+<file path=ppt/notesSlides/notesSlide9.xml><?xml version="1.0" encoding="utf-8"?>
+<p:notes xmlns:a="http://schemas.openxmlformats.org/drawingml/2006/main" xmlns:r="http://schemas.openxmlformats.org/officeDocument/2006/relationships" xmlns:p="http://schemas.openxmlformats.org/presentationml/2006/main">
+  <p:cSld>
+    <p:spTree>
+      <p:nvGrpSpPr>
+        <p:cNvPr id="1" name=""/>
+        <p:cNvGrpSpPr/>
+        <p:nvPr/>
+      </p:nvGrpSpPr>
+      <p:grpSpPr>
+        <a:xfrm>
+          <a:off x="0" y="0"/>
+          <a:ext cx="0" cy="0"/>
+          <a:chOff x="0" y="0"/>
+          <a:chExt cx="0" cy="0"/>
+        </a:xfrm>
+      </p:grpSpPr>
+      <p:sp>
+        <p:nvSpPr>
+          <p:cNvPr id="2" name="Slide Image Placeholder 1"/>
+          <p:cNvSpPr>
+            <a:spLocks noGrp="1" noRot="1" noChangeAspect="1"/>
+          </p:cNvSpPr>
+          <p:nvPr>
+            <p:ph type="sldImg"/>
+          </p:nvPr>
+        </p:nvSpPr>
+        <p:spPr/>
+      </p:sp>
+      <p:sp>
+        <p:nvSpPr>
+          <p:cNvPr id="3" name="Notes Placeholder 2"/>
+          <p:cNvSpPr>
+            <a:spLocks noGrp="1"/>
+          </p:cNvSpPr>
+          <p:nvPr>
+            <p:ph type="body" idx="1"/>
+          </p:nvPr>
+        </p:nvSpPr>
+        <p:spPr/>
+        <p:txBody>
+          <a:bodyPr/>
+          <a:lstStyle/>
+          <a:p>
+            <a:endParaRPr lang="en-US" dirty="0"/>
+          </a:p>
+        </p:txBody>
+      </p:sp>
+      <p:sp>
+        <p:nvSpPr>
+          <p:cNvPr id="4" name="Slide Number Placeholder 3"/>
+          <p:cNvSpPr>
+            <a:spLocks noGrp="1"/>
+          </p:cNvSpPr>
+          <p:nvPr>
+            <p:ph type="sldNum" sz="quarter" idx="10"/>
+          </p:nvPr>
+        </p:nvSpPr>
+        <p:spPr/>
+        <p:txBody>
+          <a:bodyPr/>
+          <a:lstStyle/>
+          <a:p>
+            <a:fld id="{1B8B4FD3-9156-3F45-86A6-2A512E7D4DAE}" type="slidenum">
+              <a:rPr lang="en-US" smtClean="0"/>
+              <a:t>11</a:t>
+            </a:fld>
+            <a:endParaRPr lang="en-US"/>
+          </a:p>
+        </p:txBody>
+      </p:sp>
+    </p:spTree>
+    <p:extLst>
+      <p:ext uri="{BB962C8B-B14F-4D97-AF65-F5344CB8AC3E}">
+        <p14:creationId xmlns:p14="http://schemas.microsoft.com/office/powerpoint/2010/main" val="1580661599"/>
       </p:ext>
     </p:extLst>
   </p:cSld>
@@ -1856,7 +2799,7 @@
           <a:p>
             <a:fld id="{B7154F30-3877-734E-854C-19E66CA08E5E}" type="datetime4">
               <a:rPr lang="en-US" smtClean="0"/>
-              <a:t>April 22, 2018</a:t>
+              <a:t>April 23, 2018</a:t>
             </a:fld>
             <a:endParaRPr lang="en-US" dirty="0"/>
           </a:p>
@@ -2155,7 +3098,7 @@
           <a:p>
             <a:fld id="{AB387ED7-E26B-424C-9711-F96B35D63E91}" type="datetime4">
               <a:rPr lang="en-US" smtClean="0"/>
-              <a:t>April 22, 2018</a:t>
+              <a:t>April 23, 2018</a:t>
             </a:fld>
             <a:endParaRPr lang="en-US"/>
           </a:p>
@@ -3246,7 +4189,7 @@
           <a:p>
             <a:r>
               <a:rPr lang="en-US" sz="2200" dirty="0"/>
-              <a:t>Asha </a:t>
+              <a:t>Asha Chen-</a:t>
             </a:r>
             <a:r>
               <a:rPr lang="en-US" sz="2200" dirty="0" err="1"/>
@@ -3268,7 +4211,7 @@
           <a:p>
             <a:r>
               <a:rPr lang="en-US" sz="2200" dirty="0"/>
-              <a:t>Tristin Sweeney</a:t>
+              <a:t>Tristan Sweeney</a:t>
             </a:r>
           </a:p>
           <a:p>
@@ -3293,7 +4236,7 @@
           <a:p>
             <a:r>
               <a:rPr lang="en-US" dirty="0"/>
-              <a:t>April 24, 2018</a:t>
+              <a:t>April 26, 2018</a:t>
             </a:r>
           </a:p>
         </p:txBody>
@@ -3392,7 +4335,7 @@
           <a:p>
             <a:r>
               <a:rPr lang="en-US" dirty="0"/>
-              <a:t>Confusion Matrix</a:t>
+              <a:t>Parallel Processing Results</a:t>
             </a:r>
           </a:p>
         </p:txBody>
@@ -3464,10 +4407,267 @@
           </a:p>
         </p:txBody>
       </p:sp>
+      <p:sp>
+        <p:nvSpPr>
+          <p:cNvPr id="8" name="TextBox 7">
+            <a:extLst>
+              <a:ext uri="{FF2B5EF4-FFF2-40B4-BE49-F238E27FC236}">
+                <a16:creationId xmlns:a16="http://schemas.microsoft.com/office/drawing/2014/main" id="{3A9FD87F-5F28-8F48-995F-A32FE79C6964}"/>
+              </a:ext>
+            </a:extLst>
+          </p:cNvPr>
+          <p:cNvSpPr txBox="1"/>
+          <p:nvPr/>
+        </p:nvSpPr>
+        <p:spPr>
+          <a:xfrm>
+            <a:off x="239614" y="1850038"/>
+            <a:ext cx="1145542" cy="646331"/>
+          </a:xfrm>
+          <a:prstGeom prst="rect">
+            <a:avLst/>
+          </a:prstGeom>
+          <a:noFill/>
+        </p:spPr>
+        <p:txBody>
+          <a:bodyPr wrap="square" rtlCol="0">
+            <a:spAutoFit/>
+          </a:bodyPr>
+          <a:lstStyle/>
+          <a:p>
+            <a:r>
+              <a:rPr lang="en-US" dirty="0"/>
+              <a:t>Varying Trees</a:t>
+            </a:r>
+          </a:p>
+        </p:txBody>
+      </p:sp>
+      <p:sp>
+        <p:nvSpPr>
+          <p:cNvPr id="9" name="TextBox 8">
+            <a:extLst>
+              <a:ext uri="{FF2B5EF4-FFF2-40B4-BE49-F238E27FC236}">
+                <a16:creationId xmlns:a16="http://schemas.microsoft.com/office/drawing/2014/main" id="{1A52EB5D-B011-B440-AB1F-29BB2700B285}"/>
+              </a:ext>
+            </a:extLst>
+          </p:cNvPr>
+          <p:cNvSpPr txBox="1"/>
+          <p:nvPr/>
+        </p:nvSpPr>
+        <p:spPr>
+          <a:xfrm>
+            <a:off x="239614" y="2970350"/>
+            <a:ext cx="1244600" cy="369332"/>
+          </a:xfrm>
+          <a:prstGeom prst="rect">
+            <a:avLst/>
+          </a:prstGeom>
+          <a:noFill/>
+        </p:spPr>
+        <p:txBody>
+          <a:bodyPr wrap="square" rtlCol="0">
+            <a:spAutoFit/>
+          </a:bodyPr>
+          <a:lstStyle/>
+          <a:p>
+            <a:r>
+              <a:rPr lang="en-US" dirty="0"/>
+              <a:t>Depth</a:t>
+            </a:r>
+          </a:p>
+        </p:txBody>
+      </p:sp>
+      <p:sp>
+        <p:nvSpPr>
+          <p:cNvPr id="10" name="TextBox 9">
+            <a:extLst>
+              <a:ext uri="{FF2B5EF4-FFF2-40B4-BE49-F238E27FC236}">
+                <a16:creationId xmlns:a16="http://schemas.microsoft.com/office/drawing/2014/main" id="{57E0A458-0C33-AB4B-B572-F6B804BCE9C6}"/>
+              </a:ext>
+            </a:extLst>
+          </p:cNvPr>
+          <p:cNvSpPr txBox="1"/>
+          <p:nvPr/>
+        </p:nvSpPr>
+        <p:spPr>
+          <a:xfrm>
+            <a:off x="239614" y="4110410"/>
+            <a:ext cx="1244600" cy="369332"/>
+          </a:xfrm>
+          <a:prstGeom prst="rect">
+            <a:avLst/>
+          </a:prstGeom>
+          <a:noFill/>
+        </p:spPr>
+        <p:txBody>
+          <a:bodyPr wrap="square" rtlCol="0">
+            <a:spAutoFit/>
+          </a:bodyPr>
+          <a:lstStyle/>
+          <a:p>
+            <a:r>
+              <a:rPr lang="en-US" dirty="0"/>
+              <a:t>Bins</a:t>
+            </a:r>
+          </a:p>
+        </p:txBody>
+      </p:sp>
+      <p:sp>
+        <p:nvSpPr>
+          <p:cNvPr id="11" name="TextBox 10">
+            <a:extLst>
+              <a:ext uri="{FF2B5EF4-FFF2-40B4-BE49-F238E27FC236}">
+                <a16:creationId xmlns:a16="http://schemas.microsoft.com/office/drawing/2014/main" id="{7746FB92-4770-1247-86C3-D2EDADAF9F72}"/>
+              </a:ext>
+            </a:extLst>
+          </p:cNvPr>
+          <p:cNvSpPr txBox="1"/>
+          <p:nvPr/>
+        </p:nvSpPr>
+        <p:spPr>
+          <a:xfrm>
+            <a:off x="5914692" y="3556412"/>
+            <a:ext cx="2281905" cy="923330"/>
+          </a:xfrm>
+          <a:prstGeom prst="rect">
+            <a:avLst/>
+          </a:prstGeom>
+          <a:noFill/>
+        </p:spPr>
+        <p:txBody>
+          <a:bodyPr wrap="square" rtlCol="0">
+            <a:spAutoFit/>
+          </a:bodyPr>
+          <a:lstStyle/>
+          <a:p>
+            <a:r>
+              <a:rPr lang="en-US" dirty="0"/>
+              <a:t>*Increasing trees past 50 did not increase accuracy significantly</a:t>
+            </a:r>
+          </a:p>
+        </p:txBody>
+      </p:sp>
+      <p:pic>
+        <p:nvPicPr>
+          <p:cNvPr id="13" name="Picture 12">
+            <a:extLst>
+              <a:ext uri="{FF2B5EF4-FFF2-40B4-BE49-F238E27FC236}">
+                <a16:creationId xmlns:a16="http://schemas.microsoft.com/office/drawing/2014/main" id="{EE7EEDF9-2E8F-0544-B52E-4C11F368FFD9}"/>
+              </a:ext>
+            </a:extLst>
+          </p:cNvPr>
+          <p:cNvPicPr>
+            <a:picLocks noChangeAspect="1"/>
+          </p:cNvPicPr>
+          <p:nvPr/>
+        </p:nvPicPr>
+        <p:blipFill>
+          <a:blip r:embed="rId3"/>
+          <a:stretch>
+            <a:fillRect/>
+          </a:stretch>
+        </p:blipFill>
+        <p:spPr>
+          <a:xfrm>
+            <a:off x="1052430" y="1356309"/>
+            <a:ext cx="4049446" cy="4198505"/>
+          </a:xfrm>
+          <a:prstGeom prst="rect">
+            <a:avLst/>
+          </a:prstGeom>
+        </p:spPr>
+      </p:pic>
+      <p:pic>
+        <p:nvPicPr>
+          <p:cNvPr id="17" name="Picture 16">
+            <a:extLst>
+              <a:ext uri="{FF2B5EF4-FFF2-40B4-BE49-F238E27FC236}">
+                <a16:creationId xmlns:a16="http://schemas.microsoft.com/office/drawing/2014/main" id="{9CD96D8A-9E38-F948-8D33-18BD7CCF38EA}"/>
+              </a:ext>
+            </a:extLst>
+          </p:cNvPr>
+          <p:cNvPicPr>
+            <a:picLocks noChangeAspect="1"/>
+          </p:cNvPicPr>
+          <p:nvPr/>
+        </p:nvPicPr>
+        <p:blipFill>
+          <a:blip r:embed="rId4"/>
+          <a:stretch>
+            <a:fillRect/>
+          </a:stretch>
+        </p:blipFill>
+        <p:spPr>
+          <a:xfrm>
+            <a:off x="5391436" y="1356309"/>
+            <a:ext cx="3733354" cy="1089794"/>
+          </a:xfrm>
+          <a:prstGeom prst="rect">
+            <a:avLst/>
+          </a:prstGeom>
+        </p:spPr>
+      </p:pic>
+      <p:sp>
+        <p:nvSpPr>
+          <p:cNvPr id="21" name="Right Arrow 20">
+            <a:extLst>
+              <a:ext uri="{FF2B5EF4-FFF2-40B4-BE49-F238E27FC236}">
+                <a16:creationId xmlns:a16="http://schemas.microsoft.com/office/drawing/2014/main" id="{555A877B-4B5B-A945-AA5B-ACD195435069}"/>
+              </a:ext>
+            </a:extLst>
+          </p:cNvPr>
+          <p:cNvSpPr/>
+          <p:nvPr/>
+        </p:nvSpPr>
+        <p:spPr>
+          <a:xfrm rot="10800000">
+            <a:off x="5101876" y="4903958"/>
+            <a:ext cx="1047465" cy="589447"/>
+          </a:xfrm>
+          <a:prstGeom prst="rightArrow">
+            <a:avLst/>
+          </a:prstGeom>
+          <a:solidFill>
+            <a:srgbClr val="FFDA03"/>
+          </a:solidFill>
+          <a:ln>
+            <a:noFill/>
+          </a:ln>
+          <a:effectLst>
+            <a:outerShdw blurRad="40000" dist="23000" dir="5400000" rotWithShape="0">
+              <a:srgbClr val="000000">
+                <a:alpha val="0"/>
+              </a:srgbClr>
+            </a:outerShdw>
+          </a:effectLst>
+        </p:spPr>
+        <p:style>
+          <a:lnRef idx="1">
+            <a:schemeClr val="accent1"/>
+          </a:lnRef>
+          <a:fillRef idx="3">
+            <a:schemeClr val="accent1"/>
+          </a:fillRef>
+          <a:effectRef idx="2">
+            <a:schemeClr val="accent1"/>
+          </a:effectRef>
+          <a:fontRef idx="minor">
+            <a:schemeClr val="lt1"/>
+          </a:fontRef>
+        </p:style>
+        <p:txBody>
+          <a:bodyPr rtlCol="0" anchor="ctr"/>
+          <a:lstStyle/>
+          <a:p>
+            <a:pPr algn="ctr"/>
+            <a:endParaRPr lang="en-US"/>
+          </a:p>
+        </p:txBody>
+      </p:sp>
     </p:spTree>
     <p:extLst>
       <p:ext uri="{BB962C8B-B14F-4D97-AF65-F5344CB8AC3E}">
-        <p14:creationId xmlns:p14="http://schemas.microsoft.com/office/powerpoint/2010/main" val="297681821"/>
+        <p14:creationId xmlns:p14="http://schemas.microsoft.com/office/powerpoint/2010/main" val="4066051979"/>
       </p:ext>
     </p:extLst>
   </p:cSld>
@@ -3496,6 +4696,278 @@
       </p:grpSpPr>
       <p:sp>
         <p:nvSpPr>
+          <p:cNvPr id="2" name="Title 1"/>
+          <p:cNvSpPr>
+            <a:spLocks noGrp="1"/>
+          </p:cNvSpPr>
+          <p:nvPr>
+            <p:ph type="title"/>
+          </p:nvPr>
+        </p:nvSpPr>
+        <p:spPr/>
+        <p:txBody>
+          <a:bodyPr>
+            <a:normAutofit fontScale="90000"/>
+          </a:bodyPr>
+          <a:lstStyle/>
+          <a:p>
+            <a:r>
+              <a:rPr lang="en-US" dirty="0"/>
+              <a:t>Single Processor Results</a:t>
+            </a:r>
+          </a:p>
+        </p:txBody>
+      </p:sp>
+      <p:sp>
+        <p:nvSpPr>
+          <p:cNvPr id="4" name="Date Placeholder 3"/>
+          <p:cNvSpPr>
+            <a:spLocks noGrp="1"/>
+          </p:cNvSpPr>
+          <p:nvPr>
+            <p:ph type="dt" sz="half" idx="10"/>
+          </p:nvPr>
+        </p:nvSpPr>
+        <p:spPr/>
+        <p:txBody>
+          <a:bodyPr/>
+          <a:lstStyle/>
+          <a:p>
+            <a:r>
+              <a:rPr lang="en-US" dirty="0"/>
+              <a:t>April 24, 2018</a:t>
+            </a:r>
+          </a:p>
+        </p:txBody>
+      </p:sp>
+      <p:sp>
+        <p:nvSpPr>
+          <p:cNvPr id="5" name="Footer Placeholder 4"/>
+          <p:cNvSpPr>
+            <a:spLocks noGrp="1"/>
+          </p:cNvSpPr>
+          <p:nvPr>
+            <p:ph type="ftr" sz="quarter" idx="11"/>
+          </p:nvPr>
+        </p:nvSpPr>
+        <p:spPr/>
+        <p:txBody>
+          <a:bodyPr/>
+          <a:lstStyle/>
+          <a:p>
+            <a:r>
+              <a:rPr lang="en-US" dirty="0"/>
+              <a:t>Classifying High-Resolution Brain Scans</a:t>
+            </a:r>
+          </a:p>
+        </p:txBody>
+      </p:sp>
+      <p:sp>
+        <p:nvSpPr>
+          <p:cNvPr id="6" name="Slide Number Placeholder 5"/>
+          <p:cNvSpPr>
+            <a:spLocks noGrp="1"/>
+          </p:cNvSpPr>
+          <p:nvPr>
+            <p:ph type="sldNum" sz="quarter" idx="12"/>
+          </p:nvPr>
+        </p:nvSpPr>
+        <p:spPr/>
+        <p:txBody>
+          <a:bodyPr/>
+          <a:lstStyle/>
+          <a:p>
+            <a:fld id="{A85782A5-310D-064D-97B2-7CD9DCF5F4D7}" type="slidenum">
+              <a:rPr lang="en-US" smtClean="0"/>
+              <a:t>11</a:t>
+            </a:fld>
+            <a:endParaRPr lang="en-US"/>
+          </a:p>
+        </p:txBody>
+      </p:sp>
+    </p:spTree>
+    <p:extLst>
+      <p:ext uri="{BB962C8B-B14F-4D97-AF65-F5344CB8AC3E}">
+        <p14:creationId xmlns:p14="http://schemas.microsoft.com/office/powerpoint/2010/main" val="1500565145"/>
+      </p:ext>
+    </p:extLst>
+  </p:cSld>
+  <p:clrMapOvr>
+    <a:masterClrMapping/>
+  </p:clrMapOvr>
+</p:sld>
+</file>
+
+<file path=ppt/slides/slide12.xml><?xml version="1.0" encoding="utf-8"?>
+<p:sld xmlns:a="http://schemas.openxmlformats.org/drawingml/2006/main" xmlns:r="http://schemas.openxmlformats.org/officeDocument/2006/relationships" xmlns:p="http://schemas.openxmlformats.org/presentationml/2006/main">
+  <p:cSld>
+    <p:spTree>
+      <p:nvGrpSpPr>
+        <p:cNvPr id="1" name=""/>
+        <p:cNvGrpSpPr/>
+        <p:nvPr/>
+      </p:nvGrpSpPr>
+      <p:grpSpPr>
+        <a:xfrm>
+          <a:off x="0" y="0"/>
+          <a:ext cx="0" cy="0"/>
+          <a:chOff x="0" y="0"/>
+          <a:chExt cx="0" cy="0"/>
+        </a:xfrm>
+      </p:grpSpPr>
+      <p:sp>
+        <p:nvSpPr>
+          <p:cNvPr id="2" name="Title 1"/>
+          <p:cNvSpPr>
+            <a:spLocks noGrp="1"/>
+          </p:cNvSpPr>
+          <p:nvPr>
+            <p:ph type="title"/>
+          </p:nvPr>
+        </p:nvSpPr>
+        <p:spPr/>
+        <p:txBody>
+          <a:bodyPr>
+            <a:normAutofit fontScale="90000"/>
+          </a:bodyPr>
+          <a:lstStyle/>
+          <a:p>
+            <a:r>
+              <a:rPr lang="en-US" dirty="0"/>
+              <a:t>Confusion Matrix – Image 2</a:t>
+            </a:r>
+          </a:p>
+        </p:txBody>
+      </p:sp>
+      <p:sp>
+        <p:nvSpPr>
+          <p:cNvPr id="4" name="Date Placeholder 3"/>
+          <p:cNvSpPr>
+            <a:spLocks noGrp="1"/>
+          </p:cNvSpPr>
+          <p:nvPr>
+            <p:ph type="dt" sz="half" idx="10"/>
+          </p:nvPr>
+        </p:nvSpPr>
+        <p:spPr/>
+        <p:txBody>
+          <a:bodyPr/>
+          <a:lstStyle/>
+          <a:p>
+            <a:r>
+              <a:rPr lang="en-US" dirty="0"/>
+              <a:t>April 24, 2018</a:t>
+            </a:r>
+          </a:p>
+        </p:txBody>
+      </p:sp>
+      <p:sp>
+        <p:nvSpPr>
+          <p:cNvPr id="5" name="Footer Placeholder 4"/>
+          <p:cNvSpPr>
+            <a:spLocks noGrp="1"/>
+          </p:cNvSpPr>
+          <p:nvPr>
+            <p:ph type="ftr" sz="quarter" idx="11"/>
+          </p:nvPr>
+        </p:nvSpPr>
+        <p:spPr/>
+        <p:txBody>
+          <a:bodyPr/>
+          <a:lstStyle/>
+          <a:p>
+            <a:r>
+              <a:rPr lang="en-US" dirty="0"/>
+              <a:t>Classifying High-Resolution Brain Scans</a:t>
+            </a:r>
+          </a:p>
+        </p:txBody>
+      </p:sp>
+      <p:sp>
+        <p:nvSpPr>
+          <p:cNvPr id="6" name="Slide Number Placeholder 5"/>
+          <p:cNvSpPr>
+            <a:spLocks noGrp="1"/>
+          </p:cNvSpPr>
+          <p:nvPr>
+            <p:ph type="sldNum" sz="quarter" idx="12"/>
+          </p:nvPr>
+        </p:nvSpPr>
+        <p:spPr/>
+        <p:txBody>
+          <a:bodyPr/>
+          <a:lstStyle/>
+          <a:p>
+            <a:fld id="{A85782A5-310D-064D-97B2-7CD9DCF5F4D7}" type="slidenum">
+              <a:rPr lang="en-US" smtClean="0"/>
+              <a:t>12</a:t>
+            </a:fld>
+            <a:endParaRPr lang="en-US"/>
+          </a:p>
+        </p:txBody>
+      </p:sp>
+      <p:pic>
+        <p:nvPicPr>
+          <p:cNvPr id="8" name="Picture 7">
+            <a:extLst>
+              <a:ext uri="{FF2B5EF4-FFF2-40B4-BE49-F238E27FC236}">
+                <a16:creationId xmlns:a16="http://schemas.microsoft.com/office/drawing/2014/main" id="{63C622F7-ADF7-C04D-B466-D9D1FAF5BFC2}"/>
+              </a:ext>
+            </a:extLst>
+          </p:cNvPr>
+          <p:cNvPicPr>
+            <a:picLocks noChangeAspect="1"/>
+          </p:cNvPicPr>
+          <p:nvPr/>
+        </p:nvPicPr>
+        <p:blipFill>
+          <a:blip r:embed="rId3"/>
+          <a:stretch>
+            <a:fillRect/>
+          </a:stretch>
+        </p:blipFill>
+        <p:spPr>
+          <a:xfrm>
+            <a:off x="1998133" y="1309780"/>
+            <a:ext cx="5350933" cy="4301504"/>
+          </a:xfrm>
+          <a:prstGeom prst="rect">
+            <a:avLst/>
+          </a:prstGeom>
+        </p:spPr>
+      </p:pic>
+    </p:spTree>
+    <p:extLst>
+      <p:ext uri="{BB962C8B-B14F-4D97-AF65-F5344CB8AC3E}">
+        <p14:creationId xmlns:p14="http://schemas.microsoft.com/office/powerpoint/2010/main" val="2308104413"/>
+      </p:ext>
+    </p:extLst>
+  </p:cSld>
+  <p:clrMapOvr>
+    <a:masterClrMapping/>
+  </p:clrMapOvr>
+</p:sld>
+</file>
+
+<file path=ppt/slides/slide13.xml><?xml version="1.0" encoding="utf-8"?>
+<p:sld xmlns:a="http://schemas.openxmlformats.org/drawingml/2006/main" xmlns:r="http://schemas.openxmlformats.org/officeDocument/2006/relationships" xmlns:p="http://schemas.openxmlformats.org/presentationml/2006/main">
+  <p:cSld>
+    <p:spTree>
+      <p:nvGrpSpPr>
+        <p:cNvPr id="1" name=""/>
+        <p:cNvGrpSpPr/>
+        <p:nvPr/>
+      </p:nvGrpSpPr>
+      <p:grpSpPr>
+        <a:xfrm>
+          <a:off x="0" y="0"/>
+          <a:ext cx="0" cy="0"/>
+          <a:chOff x="0" y="0"/>
+          <a:chExt cx="0" cy="0"/>
+        </a:xfrm>
+      </p:grpSpPr>
+      <p:sp>
+        <p:nvSpPr>
           <p:cNvPr id="10" name="Title 9"/>
           <p:cNvSpPr>
             <a:spLocks noGrp="1"/>
@@ -3637,7 +5109,7 @@
           <a:p>
             <a:fld id="{A85782A5-310D-064D-97B2-7CD9DCF5F4D7}" type="slidenum">
               <a:rPr lang="en-US" smtClean="0"/>
-              <a:t>11</a:t>
+              <a:t>13</a:t>
             </a:fld>
             <a:endParaRPr lang="en-US"/>
           </a:p>
@@ -3729,11 +5201,14 @@
           <a:bodyPr/>
           <a:lstStyle/>
           <a:p>
-            <a:fld id="{582F525F-F280-904A-8B95-120BA1BA5DAA}" type="datetime4">
-              <a:rPr lang="en-US" smtClean="0"/>
-              <a:t>April 22, 2018</a:t>
-            </a:fld>
-            <a:endParaRPr lang="en-US" dirty="0"/>
+            <a:r>
+              <a:rPr lang="en-US" dirty="0" err="1"/>
+              <a:t>Aprill</a:t>
+            </a:r>
+            <a:r>
+              <a:rPr lang="en-US" dirty="0"/>
+              <a:t> 26, 2018</a:t>
+            </a:r>
           </a:p>
         </p:txBody>
       </p:sp>
@@ -3879,7 +5354,7 @@
           <a:p>
             <a:fld id="{582F525F-F280-904A-8B95-120BA1BA5DAA}" type="datetime4">
               <a:rPr lang="en-US" smtClean="0"/>
-              <a:t>April 22, 2018</a:t>
+              <a:t>April 23, 2018</a:t>
             </a:fld>
             <a:endParaRPr lang="en-US" dirty="0"/>
           </a:p>
@@ -4006,49 +5481,6 @@
       </p:pic>
       <p:sp>
         <p:nvSpPr>
-          <p:cNvPr id="11" name="TextBox 10">
-            <a:extLst>
-              <a:ext uri="{FF2B5EF4-FFF2-40B4-BE49-F238E27FC236}">
-                <a16:creationId xmlns:a16="http://schemas.microsoft.com/office/drawing/2014/main" id="{785A7E84-660B-D144-9291-2218C58DABFB}"/>
-              </a:ext>
-            </a:extLst>
-          </p:cNvPr>
-          <p:cNvSpPr txBox="1"/>
-          <p:nvPr/>
-        </p:nvSpPr>
-        <p:spPr>
-          <a:xfrm>
-            <a:off x="128017" y="1140480"/>
-            <a:ext cx="1365444" cy="646331"/>
-          </a:xfrm>
-          <a:prstGeom prst="rect">
-            <a:avLst/>
-          </a:prstGeom>
-          <a:noFill/>
-        </p:spPr>
-        <p:txBody>
-          <a:bodyPr wrap="square" rtlCol="0">
-            <a:spAutoFit/>
-          </a:bodyPr>
-          <a:lstStyle/>
-          <a:p>
-            <a:r>
-              <a:rPr lang="en-US" b="1" dirty="0"/>
-              <a:t>Foreground on </a:t>
-            </a:r>
-            <a:r>
-              <a:rPr lang="en-US" b="1" dirty="0" err="1"/>
-              <a:t>xy</a:t>
-            </a:r>
-            <a:r>
-              <a:rPr lang="en-US" b="1" dirty="0"/>
-              <a:t> plane</a:t>
-            </a:r>
-          </a:p>
-        </p:txBody>
-      </p:sp>
-      <p:sp>
-        <p:nvSpPr>
           <p:cNvPr id="12" name="TextBox 11">
             <a:extLst>
               <a:ext uri="{FF2B5EF4-FFF2-40B4-BE49-F238E27FC236}">
@@ -4087,6 +5519,107 @@
               <a:rPr lang="en-US" b="1" dirty="0"/>
               <a:t> plane</a:t>
             </a:r>
+          </a:p>
+        </p:txBody>
+      </p:sp>
+      <p:sp>
+        <p:nvSpPr>
+          <p:cNvPr id="14" name="TextBox 13">
+            <a:extLst>
+              <a:ext uri="{FF2B5EF4-FFF2-40B4-BE49-F238E27FC236}">
+                <a16:creationId xmlns:a16="http://schemas.microsoft.com/office/drawing/2014/main" id="{E4D3BDFB-A4A0-F540-BE0C-AEC3538ADBEB}"/>
+              </a:ext>
+            </a:extLst>
+          </p:cNvPr>
+          <p:cNvSpPr txBox="1"/>
+          <p:nvPr/>
+        </p:nvSpPr>
+        <p:spPr>
+          <a:xfrm>
+            <a:off x="128017" y="1140480"/>
+            <a:ext cx="1365444" cy="4308872"/>
+          </a:xfrm>
+          <a:prstGeom prst="rect">
+            <a:avLst/>
+          </a:prstGeom>
+          <a:noFill/>
+        </p:spPr>
+        <p:txBody>
+          <a:bodyPr wrap="square" rtlCol="0">
+            <a:spAutoFit/>
+          </a:bodyPr>
+          <a:lstStyle/>
+          <a:p>
+            <a:r>
+              <a:rPr lang="en-US" b="1" dirty="0"/>
+              <a:t>Foreground on </a:t>
+            </a:r>
+            <a:r>
+              <a:rPr lang="en-US" b="1" dirty="0" err="1"/>
+              <a:t>xy</a:t>
+            </a:r>
+            <a:r>
+              <a:rPr lang="en-US" b="1" dirty="0"/>
+              <a:t> plane</a:t>
+            </a:r>
+          </a:p>
+          <a:p>
+            <a:endParaRPr lang="en-US" sz="1400" b="1" dirty="0"/>
+          </a:p>
+          <a:p>
+            <a:endParaRPr lang="en-US" sz="1400" b="1" dirty="0"/>
+          </a:p>
+          <a:p>
+            <a:r>
+              <a:rPr lang="en-US" sz="1400" b="1" dirty="0"/>
+              <a:t>1st image column </a:t>
+            </a:r>
+          </a:p>
+          <a:p>
+            <a:r>
+              <a:rPr lang="en-US" sz="1400" b="1" dirty="0"/>
+              <a:t>= raw</a:t>
+            </a:r>
+          </a:p>
+          <a:p>
+            <a:endParaRPr lang="en-US" sz="1400" b="1" dirty="0"/>
+          </a:p>
+          <a:p>
+            <a:r>
+              <a:rPr lang="en-US" sz="1400" b="1" dirty="0"/>
+              <a:t>2nd image column </a:t>
+            </a:r>
+          </a:p>
+          <a:p>
+            <a:r>
+              <a:rPr lang="en-US" sz="1400" b="1" dirty="0"/>
+              <a:t>= 2D FFT</a:t>
+            </a:r>
+          </a:p>
+          <a:p>
+            <a:endParaRPr lang="en-US" sz="1400" b="1" dirty="0"/>
+          </a:p>
+          <a:p>
+            <a:r>
+              <a:rPr lang="en-US" sz="1400" b="1" dirty="0"/>
+              <a:t>3rd image column = histogram</a:t>
+            </a:r>
+          </a:p>
+          <a:p>
+            <a:endParaRPr lang="en-US" sz="1400" b="1" dirty="0"/>
+          </a:p>
+          <a:p>
+            <a:r>
+              <a:rPr lang="en-US" sz="1400" b="1" dirty="0"/>
+              <a:t>4th image column</a:t>
+            </a:r>
+          </a:p>
+          <a:p>
+            <a:r>
+              <a:rPr lang="en-US" sz="1400" b="1" dirty="0"/>
+              <a:t>= statistics</a:t>
+            </a:r>
+            <a:endParaRPr lang="en-US" b="1" dirty="0"/>
           </a:p>
         </p:txBody>
       </p:sp>
@@ -4122,7 +5655,13 @@
       </p:grpSpPr>
       <p:sp>
         <p:nvSpPr>
-          <p:cNvPr id="2" name="Title 1"/>
+          <p:cNvPr id="2" name="Title 1">
+            <a:extLst>
+              <a:ext uri="{FF2B5EF4-FFF2-40B4-BE49-F238E27FC236}">
+                <a16:creationId xmlns:a16="http://schemas.microsoft.com/office/drawing/2014/main" id="{D0C554F5-C858-E449-829E-EFA19176E896}"/>
+              </a:ext>
+            </a:extLst>
+          </p:cNvPr>
           <p:cNvSpPr>
             <a:spLocks noGrp="1"/>
           </p:cNvSpPr>
@@ -4139,19 +5678,25 @@
           <a:p>
             <a:r>
               <a:rPr lang="en-US" dirty="0"/>
-              <a:t>Classification Comparison Test</a:t>
-            </a:r>
-          </a:p>
-        </p:txBody>
-      </p:sp>
-      <p:sp>
-        <p:nvSpPr>
-          <p:cNvPr id="3" name="Content Placeholder 2"/>
-          <p:cNvSpPr>
-            <a:spLocks noGrp="1"/>
-          </p:cNvSpPr>
-          <p:nvPr>
-            <p:ph idx="1"/>
+              <a:t>Visualizing the Data</a:t>
+            </a:r>
+          </a:p>
+        </p:txBody>
+      </p:sp>
+      <p:sp>
+        <p:nvSpPr>
+          <p:cNvPr id="3" name="Date Placeholder 2">
+            <a:extLst>
+              <a:ext uri="{FF2B5EF4-FFF2-40B4-BE49-F238E27FC236}">
+                <a16:creationId xmlns:a16="http://schemas.microsoft.com/office/drawing/2014/main" id="{FBC508B6-F739-8448-A686-A6E6AE95EBEE}"/>
+              </a:ext>
+            </a:extLst>
+          </p:cNvPr>
+          <p:cNvSpPr>
+            <a:spLocks noGrp="1"/>
+          </p:cNvSpPr>
+          <p:nvPr>
+            <p:ph type="dt" sz="half" idx="10"/>
           </p:nvPr>
         </p:nvSpPr>
         <p:spPr/>
@@ -4159,21 +5704,28 @@
           <a:bodyPr/>
           <a:lstStyle/>
           <a:p>
-            <a:r>
-              <a:rPr lang="en-US" dirty="0"/>
-              <a:t>Why Random Forest?</a:t>
-            </a:r>
-          </a:p>
-        </p:txBody>
-      </p:sp>
-      <p:sp>
-        <p:nvSpPr>
-          <p:cNvPr id="4" name="Date Placeholder 3"/>
-          <p:cNvSpPr>
-            <a:spLocks noGrp="1"/>
-          </p:cNvSpPr>
-          <p:nvPr>
-            <p:ph type="dt" sz="half" idx="10"/>
+            <a:fld id="{582F525F-F280-904A-8B95-120BA1BA5DAA}" type="datetime4">
+              <a:rPr lang="en-US" smtClean="0"/>
+              <a:t>April 23, 2018</a:t>
+            </a:fld>
+            <a:endParaRPr lang="en-US" dirty="0"/>
+          </a:p>
+        </p:txBody>
+      </p:sp>
+      <p:sp>
+        <p:nvSpPr>
+          <p:cNvPr id="4" name="Footer Placeholder 3">
+            <a:extLst>
+              <a:ext uri="{FF2B5EF4-FFF2-40B4-BE49-F238E27FC236}">
+                <a16:creationId xmlns:a16="http://schemas.microsoft.com/office/drawing/2014/main" id="{79EB2E83-37CA-0A4B-BCD1-17685E594C4C}"/>
+              </a:ext>
+            </a:extLst>
+          </p:cNvPr>
+          <p:cNvSpPr>
+            <a:spLocks noGrp="1"/>
+          </p:cNvSpPr>
+          <p:nvPr>
+            <p:ph type="ftr" sz="quarter" idx="11"/>
           </p:nvPr>
         </p:nvSpPr>
         <p:spPr/>
@@ -4182,37 +5734,22 @@
           <a:lstStyle/>
           <a:p>
             <a:r>
-              <a:rPr lang="en-US" dirty="0"/>
-              <a:t>April 24, 2018</a:t>
-            </a:r>
-          </a:p>
-        </p:txBody>
-      </p:sp>
-      <p:sp>
-        <p:nvSpPr>
-          <p:cNvPr id="5" name="Footer Placeholder 4"/>
-          <p:cNvSpPr>
-            <a:spLocks noGrp="1"/>
-          </p:cNvSpPr>
-          <p:nvPr>
-            <p:ph type="ftr" sz="quarter" idx="11"/>
-          </p:nvPr>
-        </p:nvSpPr>
-        <p:spPr/>
-        <p:txBody>
-          <a:bodyPr/>
-          <a:lstStyle/>
-          <a:p>
-            <a:r>
-              <a:rPr lang="en-US" dirty="0"/>
+              <a:rPr lang="en-US"/>
               <a:t>Classifying High-Resolution Brain Scans</a:t>
             </a:r>
-          </a:p>
-        </p:txBody>
-      </p:sp>
-      <p:sp>
-        <p:nvSpPr>
-          <p:cNvPr id="6" name="Slide Number Placeholder 5"/>
+            <a:endParaRPr lang="en-US" dirty="0"/>
+          </a:p>
+        </p:txBody>
+      </p:sp>
+      <p:sp>
+        <p:nvSpPr>
+          <p:cNvPr id="5" name="Slide Number Placeholder 4">
+            <a:extLst>
+              <a:ext uri="{FF2B5EF4-FFF2-40B4-BE49-F238E27FC236}">
+                <a16:creationId xmlns:a16="http://schemas.microsoft.com/office/drawing/2014/main" id="{2250E5A4-4D28-F44A-8CF9-4F7AFEC6F3E2}"/>
+              </a:ext>
+            </a:extLst>
+          </p:cNvPr>
           <p:cNvSpPr>
             <a:spLocks noGrp="1"/>
           </p:cNvSpPr>
@@ -4227,18 +5764,19 @@
           <a:p>
             <a:fld id="{A85782A5-310D-064D-97B2-7CD9DCF5F4D7}" type="slidenum">
               <a:rPr lang="en-US" smtClean="0"/>
+              <a:pPr/>
               <a:t>4</a:t>
             </a:fld>
-            <a:endParaRPr lang="en-US"/>
+            <a:endParaRPr lang="en-US" dirty="0"/>
           </a:p>
         </p:txBody>
       </p:sp>
       <p:pic>
         <p:nvPicPr>
-          <p:cNvPr id="8" name="Picture 7">
+          <p:cNvPr id="7" name="Picture 6">
             <a:extLst>
               <a:ext uri="{FF2B5EF4-FFF2-40B4-BE49-F238E27FC236}">
-                <a16:creationId xmlns:a16="http://schemas.microsoft.com/office/drawing/2014/main" id="{F523B2C9-7841-7F4E-9BFA-38F805662401}"/>
+                <a16:creationId xmlns:a16="http://schemas.microsoft.com/office/drawing/2014/main" id="{D3BC2BD0-5F2C-4C48-AAAF-234FA41EFD3C}"/>
               </a:ext>
             </a:extLst>
           </p:cNvPr>
@@ -4255,8 +5793,8 @@
         </p:blipFill>
         <p:spPr>
           <a:xfrm>
-            <a:off x="515233" y="2593535"/>
-            <a:ext cx="8113533" cy="1466402"/>
+            <a:off x="590308" y="1341578"/>
+            <a:ext cx="7911457" cy="3911157"/>
           </a:xfrm>
           <a:prstGeom prst="rect">
             <a:avLst/>
@@ -4266,7 +5804,7 @@
     </p:spTree>
     <p:extLst>
       <p:ext uri="{BB962C8B-B14F-4D97-AF65-F5344CB8AC3E}">
-        <p14:creationId xmlns:p14="http://schemas.microsoft.com/office/powerpoint/2010/main" val="1143457634"/>
+        <p14:creationId xmlns:p14="http://schemas.microsoft.com/office/powerpoint/2010/main" val="2345382414"/>
       </p:ext>
     </p:extLst>
   </p:cSld>
@@ -4295,131 +5833,236 @@
       </p:grpSpPr>
       <p:sp>
         <p:nvSpPr>
-          <p:cNvPr id="2" name="Title 1">
+          <p:cNvPr id="2" name="Title 1"/>
+          <p:cNvSpPr>
+            <a:spLocks noGrp="1"/>
+          </p:cNvSpPr>
+          <p:nvPr>
+            <p:ph type="title"/>
+          </p:nvPr>
+        </p:nvSpPr>
+        <p:spPr/>
+        <p:txBody>
+          <a:bodyPr>
+            <a:normAutofit fontScale="90000"/>
+          </a:bodyPr>
+          <a:lstStyle/>
+          <a:p>
+            <a:r>
+              <a:rPr lang="en-US" dirty="0"/>
+              <a:t>Why Random Forest?</a:t>
+            </a:r>
+          </a:p>
+        </p:txBody>
+      </p:sp>
+      <p:sp>
+        <p:nvSpPr>
+          <p:cNvPr id="3" name="Content Placeholder 2"/>
+          <p:cNvSpPr>
+            <a:spLocks noGrp="1"/>
+          </p:cNvSpPr>
+          <p:nvPr>
+            <p:ph idx="1"/>
+          </p:nvPr>
+        </p:nvSpPr>
+        <p:spPr>
+          <a:xfrm>
+            <a:off x="457199" y="1325880"/>
+            <a:ext cx="8229601" cy="4800283"/>
+          </a:xfrm>
+        </p:spPr>
+        <p:txBody>
+          <a:bodyPr>
+            <a:normAutofit/>
+          </a:bodyPr>
+          <a:lstStyle/>
+          <a:p>
+            <a:pPr marL="0" indent="0">
+              <a:buNone/>
+            </a:pPr>
+            <a:r>
+              <a:rPr lang="en-US" sz="2400" dirty="0"/>
+              <a:t>Classification Comparison Test:</a:t>
+            </a:r>
+          </a:p>
+          <a:p>
+            <a:pPr marL="0" indent="0">
+              <a:buNone/>
+            </a:pPr>
+            <a:endParaRPr lang="en-US" sz="2400" dirty="0"/>
+          </a:p>
+          <a:p>
+            <a:pPr marL="0" indent="0">
+              <a:buNone/>
+            </a:pPr>
+            <a:endParaRPr lang="en-US" sz="2400" dirty="0"/>
+          </a:p>
+          <a:p>
+            <a:pPr marL="0" indent="0">
+              <a:buNone/>
+            </a:pPr>
+            <a:endParaRPr lang="en-US" sz="2400" dirty="0"/>
+          </a:p>
+          <a:p>
+            <a:pPr marL="0" indent="0">
+              <a:buNone/>
+            </a:pPr>
+            <a:endParaRPr lang="en-US" sz="2400" dirty="0"/>
+          </a:p>
+          <a:p>
+            <a:pPr marL="0" indent="0">
+              <a:buNone/>
+            </a:pPr>
+            <a:endParaRPr lang="en-US" sz="2400" dirty="0"/>
+          </a:p>
+          <a:p>
+            <a:pPr marL="0" indent="0">
+              <a:buNone/>
+            </a:pPr>
+            <a:r>
+              <a:rPr lang="en-US" sz="2400" dirty="0"/>
+              <a:t>Feature Vector of Preprocess Data:</a:t>
+            </a:r>
+          </a:p>
+          <a:p>
+            <a:pPr marL="0" indent="0">
+              <a:buNone/>
+            </a:pPr>
+            <a:endParaRPr lang="en-US" sz="2400" dirty="0"/>
+          </a:p>
+        </p:txBody>
+      </p:sp>
+      <p:sp>
+        <p:nvSpPr>
+          <p:cNvPr id="4" name="Date Placeholder 3"/>
+          <p:cNvSpPr>
+            <a:spLocks noGrp="1"/>
+          </p:cNvSpPr>
+          <p:nvPr>
+            <p:ph type="dt" sz="half" idx="10"/>
+          </p:nvPr>
+        </p:nvSpPr>
+        <p:spPr/>
+        <p:txBody>
+          <a:bodyPr/>
+          <a:lstStyle/>
+          <a:p>
+            <a:r>
+              <a:rPr lang="en-US" dirty="0"/>
+              <a:t>April 24, 2018</a:t>
+            </a:r>
+          </a:p>
+        </p:txBody>
+      </p:sp>
+      <p:sp>
+        <p:nvSpPr>
+          <p:cNvPr id="5" name="Footer Placeholder 4"/>
+          <p:cNvSpPr>
+            <a:spLocks noGrp="1"/>
+          </p:cNvSpPr>
+          <p:nvPr>
+            <p:ph type="ftr" sz="quarter" idx="11"/>
+          </p:nvPr>
+        </p:nvSpPr>
+        <p:spPr/>
+        <p:txBody>
+          <a:bodyPr/>
+          <a:lstStyle/>
+          <a:p>
+            <a:r>
+              <a:rPr lang="en-US" dirty="0"/>
+              <a:t>Classifying High-Resolution Brain Scans</a:t>
+            </a:r>
+          </a:p>
+        </p:txBody>
+      </p:sp>
+      <p:sp>
+        <p:nvSpPr>
+          <p:cNvPr id="6" name="Slide Number Placeholder 5"/>
+          <p:cNvSpPr>
+            <a:spLocks noGrp="1"/>
+          </p:cNvSpPr>
+          <p:nvPr>
+            <p:ph type="sldNum" sz="quarter" idx="12"/>
+          </p:nvPr>
+        </p:nvSpPr>
+        <p:spPr/>
+        <p:txBody>
+          <a:bodyPr/>
+          <a:lstStyle/>
+          <a:p>
+            <a:fld id="{A85782A5-310D-064D-97B2-7CD9DCF5F4D7}" type="slidenum">
+              <a:rPr lang="en-US" smtClean="0"/>
+              <a:t>5</a:t>
+            </a:fld>
+            <a:endParaRPr lang="en-US"/>
+          </a:p>
+        </p:txBody>
+      </p:sp>
+      <p:pic>
+        <p:nvPicPr>
+          <p:cNvPr id="9" name="Picture 8">
             <a:extLst>
               <a:ext uri="{FF2B5EF4-FFF2-40B4-BE49-F238E27FC236}">
-                <a16:creationId xmlns:a16="http://schemas.microsoft.com/office/drawing/2014/main" id="{B71D9872-CE0B-7C4F-AE1F-471D79FB2122}"/>
+                <a16:creationId xmlns:a16="http://schemas.microsoft.com/office/drawing/2014/main" id="{C2BA4831-02CB-1340-9274-9C5C14FED17A}"/>
               </a:ext>
             </a:extLst>
           </p:cNvPr>
-          <p:cNvSpPr>
-            <a:spLocks noGrp="1"/>
-          </p:cNvSpPr>
-          <p:nvPr>
-            <p:ph type="title"/>
-          </p:nvPr>
-        </p:nvSpPr>
+          <p:cNvPicPr>
+            <a:picLocks noChangeAspect="1"/>
+          </p:cNvPicPr>
+          <p:nvPr/>
+        </p:nvPicPr>
+        <p:blipFill>
+          <a:blip r:embed="rId3"/>
+          <a:stretch>
+            <a:fillRect/>
+          </a:stretch>
+        </p:blipFill>
         <p:spPr>
           <a:xfrm>
-            <a:off x="634792" y="2313432"/>
-            <a:ext cx="8229600" cy="1344167"/>
+            <a:off x="228599" y="2086051"/>
+            <a:ext cx="8686801" cy="1570012"/>
           </a:xfrm>
+          <a:prstGeom prst="rect">
+            <a:avLst/>
+          </a:prstGeom>
         </p:spPr>
-        <p:txBody>
-          <a:bodyPr>
-            <a:normAutofit/>
-          </a:bodyPr>
-          <a:lstStyle/>
-          <a:p>
-            <a:r>
-              <a:rPr lang="en-US" dirty="0"/>
-              <a:t>Model &amp; Results</a:t>
-            </a:r>
-          </a:p>
-        </p:txBody>
-      </p:sp>
-      <p:sp>
-        <p:nvSpPr>
-          <p:cNvPr id="3" name="Date Placeholder 2">
+      </p:pic>
+      <p:pic>
+        <p:nvPicPr>
+          <p:cNvPr id="12" name="Picture 11">
             <a:extLst>
               <a:ext uri="{FF2B5EF4-FFF2-40B4-BE49-F238E27FC236}">
-                <a16:creationId xmlns:a16="http://schemas.microsoft.com/office/drawing/2014/main" id="{CD148C30-E7AE-384B-8149-C970B06234A7}"/>
+                <a16:creationId xmlns:a16="http://schemas.microsoft.com/office/drawing/2014/main" id="{F28D4739-872E-1441-9359-63D5EC346AB9}"/>
               </a:ext>
             </a:extLst>
           </p:cNvPr>
-          <p:cNvSpPr>
-            <a:spLocks noGrp="1"/>
-          </p:cNvSpPr>
-          <p:nvPr>
-            <p:ph type="dt" sz="half" idx="10"/>
-          </p:nvPr>
-        </p:nvSpPr>
-        <p:spPr/>
-        <p:txBody>
-          <a:bodyPr/>
-          <a:lstStyle/>
-          <a:p>
-            <a:fld id="{582F525F-F280-904A-8B95-120BA1BA5DAA}" type="datetime4">
-              <a:rPr lang="en-US" smtClean="0"/>
-              <a:t>April 22, 2018</a:t>
-            </a:fld>
-            <a:endParaRPr lang="en-US" dirty="0"/>
-          </a:p>
-        </p:txBody>
-      </p:sp>
-      <p:sp>
-        <p:nvSpPr>
-          <p:cNvPr id="4" name="Footer Placeholder 3">
-            <a:extLst>
-              <a:ext uri="{FF2B5EF4-FFF2-40B4-BE49-F238E27FC236}">
-                <a16:creationId xmlns:a16="http://schemas.microsoft.com/office/drawing/2014/main" id="{F778F496-B983-7440-AE28-05D9A7EC6156}"/>
-              </a:ext>
-            </a:extLst>
-          </p:cNvPr>
-          <p:cNvSpPr>
-            <a:spLocks noGrp="1"/>
-          </p:cNvSpPr>
-          <p:nvPr>
-            <p:ph type="ftr" sz="quarter" idx="11"/>
-          </p:nvPr>
-        </p:nvSpPr>
-        <p:spPr/>
-        <p:txBody>
-          <a:bodyPr/>
-          <a:lstStyle/>
-          <a:p>
-            <a:r>
-              <a:rPr lang="en-US"/>
-              <a:t>Classifying High-Resolution Brain Scans</a:t>
-            </a:r>
-            <a:endParaRPr lang="en-US" dirty="0"/>
-          </a:p>
-        </p:txBody>
-      </p:sp>
-      <p:sp>
-        <p:nvSpPr>
-          <p:cNvPr id="5" name="Slide Number Placeholder 4">
-            <a:extLst>
-              <a:ext uri="{FF2B5EF4-FFF2-40B4-BE49-F238E27FC236}">
-                <a16:creationId xmlns:a16="http://schemas.microsoft.com/office/drawing/2014/main" id="{7352E32E-D968-0A4C-876C-5B38829E1E5B}"/>
-              </a:ext>
-            </a:extLst>
-          </p:cNvPr>
-          <p:cNvSpPr>
-            <a:spLocks noGrp="1"/>
-          </p:cNvSpPr>
-          <p:nvPr>
-            <p:ph type="sldNum" sz="quarter" idx="12"/>
-          </p:nvPr>
-        </p:nvSpPr>
-        <p:spPr/>
-        <p:txBody>
-          <a:bodyPr/>
-          <a:lstStyle/>
-          <a:p>
-            <a:fld id="{A85782A5-310D-064D-97B2-7CD9DCF5F4D7}" type="slidenum">
-              <a:rPr lang="en-US" smtClean="0"/>
-              <a:pPr/>
-              <a:t>5</a:t>
-            </a:fld>
-            <a:endParaRPr lang="en-US" dirty="0"/>
-          </a:p>
-        </p:txBody>
-      </p:sp>
+          <p:cNvPicPr>
+            <a:picLocks noChangeAspect="1"/>
+          </p:cNvPicPr>
+          <p:nvPr/>
+        </p:nvPicPr>
+        <p:blipFill>
+          <a:blip r:embed="rId4"/>
+          <a:stretch>
+            <a:fillRect/>
+          </a:stretch>
+        </p:blipFill>
+        <p:spPr>
+          <a:xfrm>
+            <a:off x="1887612" y="4467729"/>
+            <a:ext cx="5707172" cy="1410641"/>
+          </a:xfrm>
+          <a:prstGeom prst="rect">
+            <a:avLst/>
+          </a:prstGeom>
+        </p:spPr>
+      </p:pic>
     </p:spTree>
     <p:extLst>
       <p:ext uri="{BB962C8B-B14F-4D97-AF65-F5344CB8AC3E}">
-        <p14:creationId xmlns:p14="http://schemas.microsoft.com/office/powerpoint/2010/main" val="1884191572"/>
+        <p14:creationId xmlns:p14="http://schemas.microsoft.com/office/powerpoint/2010/main" val="1456638104"/>
       </p:ext>
     </p:extLst>
   </p:cSld>
@@ -4448,7 +6091,13 @@
       </p:grpSpPr>
       <p:sp>
         <p:nvSpPr>
-          <p:cNvPr id="2" name="Title 1"/>
+          <p:cNvPr id="2" name="Title 1">
+            <a:extLst>
+              <a:ext uri="{FF2B5EF4-FFF2-40B4-BE49-F238E27FC236}">
+                <a16:creationId xmlns:a16="http://schemas.microsoft.com/office/drawing/2014/main" id="{B71D9872-CE0B-7C4F-AE1F-471D79FB2122}"/>
+              </a:ext>
+            </a:extLst>
+          </p:cNvPr>
           <p:cNvSpPr>
             <a:spLocks noGrp="1"/>
           </p:cNvSpPr>
@@ -4456,123 +6105,34 @@
             <p:ph type="title"/>
           </p:nvPr>
         </p:nvSpPr>
-        <p:spPr/>
+        <p:spPr>
+          <a:xfrm>
+            <a:off x="634792" y="2313432"/>
+            <a:ext cx="8229600" cy="1344167"/>
+          </a:xfrm>
+        </p:spPr>
         <p:txBody>
           <a:bodyPr>
-            <a:normAutofit fontScale="90000"/>
+            <a:normAutofit/>
           </a:bodyPr>
           <a:lstStyle/>
           <a:p>
             <a:r>
               <a:rPr lang="en-US" dirty="0"/>
-              <a:t>Parameter Tuning</a:t>
-            </a:r>
-          </a:p>
-        </p:txBody>
-      </p:sp>
-      <p:sp>
-        <p:nvSpPr>
-          <p:cNvPr id="3" name="Content Placeholder 2"/>
-          <p:cNvSpPr>
-            <a:spLocks noGrp="1"/>
-          </p:cNvSpPr>
-          <p:nvPr>
-            <p:ph idx="1"/>
-          </p:nvPr>
-        </p:nvSpPr>
-        <p:spPr/>
-        <p:txBody>
-          <a:bodyPr>
-            <a:normAutofit fontScale="85000" lnSpcReduction="10000"/>
-          </a:bodyPr>
-          <a:lstStyle/>
-          <a:p>
-            <a:r>
-              <a:rPr lang="en-US" b="1" dirty="0" err="1"/>
-              <a:t>ParamGridBuilder</a:t>
-            </a:r>
-            <a:r>
-              <a:rPr lang="en-US" b="1" dirty="0"/>
-              <a:t>() </a:t>
-            </a:r>
-            <a:r>
-              <a:rPr lang="en-US" dirty="0"/>
-              <a:t>– constructs a grid of parameters to search over</a:t>
-            </a:r>
-          </a:p>
-          <a:p>
-            <a:r>
-              <a:rPr lang="en-US" b="1" dirty="0" err="1"/>
-              <a:t>TrainValidationSplit</a:t>
-            </a:r>
-            <a:r>
-              <a:rPr lang="en-US" b="1" dirty="0"/>
-              <a:t>() </a:t>
-            </a:r>
-            <a:r>
-              <a:rPr lang="en-US" dirty="0"/>
-              <a:t>– tries all combinations of values and determines the best model</a:t>
-            </a:r>
-          </a:p>
-          <a:p>
-            <a:r>
-              <a:rPr lang="en-US" b="1" dirty="0" err="1"/>
-              <a:t>numTrees</a:t>
-            </a:r>
-            <a:r>
-              <a:rPr lang="en-US" b="1" dirty="0"/>
-              <a:t> </a:t>
-            </a:r>
-            <a:r>
-              <a:rPr lang="en-US" dirty="0"/>
-              <a:t>– increasing lead to better accuracy and less compute time</a:t>
-            </a:r>
-          </a:p>
-          <a:p>
-            <a:r>
-              <a:rPr lang="en-US" b="1" dirty="0" err="1"/>
-              <a:t>maxDepth</a:t>
-            </a:r>
-            <a:r>
-              <a:rPr lang="en-US" dirty="0"/>
-              <a:t> - higher values lead to overfitting and increased run time of the model</a:t>
-            </a:r>
-            <a:endParaRPr lang="en-US" b="1" dirty="0"/>
-          </a:p>
-          <a:p>
-            <a:r>
-              <a:rPr lang="en-US" b="1" dirty="0" err="1"/>
-              <a:t>maxBins</a:t>
-            </a:r>
-            <a:r>
-              <a:rPr lang="en-US" dirty="0"/>
-              <a:t> - maximum number of bins used for splitting features</a:t>
-            </a:r>
-            <a:endParaRPr lang="en-US" b="1" dirty="0"/>
-          </a:p>
-          <a:p>
-            <a:r>
-              <a:rPr lang="en-US" b="1" dirty="0"/>
-              <a:t>impurity</a:t>
-            </a:r>
-            <a:r>
-              <a:rPr lang="en-US" dirty="0"/>
-              <a:t> – criterion (</a:t>
-            </a:r>
-            <a:r>
-              <a:rPr lang="en-US" dirty="0" err="1"/>
-              <a:t>gini</a:t>
-            </a:r>
-            <a:r>
-              <a:rPr lang="en-US" dirty="0"/>
-              <a:t>)</a:t>
-            </a:r>
-          </a:p>
-        </p:txBody>
-      </p:sp>
-      <p:sp>
-        <p:nvSpPr>
-          <p:cNvPr id="4" name="Date Placeholder 3"/>
+              <a:t>Model &amp; Results</a:t>
+            </a:r>
+          </a:p>
+        </p:txBody>
+      </p:sp>
+      <p:sp>
+        <p:nvSpPr>
+          <p:cNvPr id="3" name="Date Placeholder 2">
+            <a:extLst>
+              <a:ext uri="{FF2B5EF4-FFF2-40B4-BE49-F238E27FC236}">
+                <a16:creationId xmlns:a16="http://schemas.microsoft.com/office/drawing/2014/main" id="{CD148C30-E7AE-384B-8149-C970B06234A7}"/>
+              </a:ext>
+            </a:extLst>
+          </p:cNvPr>
           <p:cNvSpPr>
             <a:spLocks noGrp="1"/>
           </p:cNvSpPr>
@@ -4585,16 +6145,23 @@
           <a:bodyPr/>
           <a:lstStyle/>
           <a:p>
-            <a:r>
-              <a:rPr lang="en-US" dirty="0"/>
-              <a:t>April 24, 2018</a:t>
-            </a:r>
-          </a:p>
-        </p:txBody>
-      </p:sp>
-      <p:sp>
-        <p:nvSpPr>
-          <p:cNvPr id="5" name="Footer Placeholder 4"/>
+            <a:fld id="{582F525F-F280-904A-8B95-120BA1BA5DAA}" type="datetime4">
+              <a:rPr lang="en-US" smtClean="0"/>
+              <a:t>April 23, 2018</a:t>
+            </a:fld>
+            <a:endParaRPr lang="en-US" dirty="0"/>
+          </a:p>
+        </p:txBody>
+      </p:sp>
+      <p:sp>
+        <p:nvSpPr>
+          <p:cNvPr id="4" name="Footer Placeholder 3">
+            <a:extLst>
+              <a:ext uri="{FF2B5EF4-FFF2-40B4-BE49-F238E27FC236}">
+                <a16:creationId xmlns:a16="http://schemas.microsoft.com/office/drawing/2014/main" id="{F778F496-B983-7440-AE28-05D9A7EC6156}"/>
+              </a:ext>
+            </a:extLst>
+          </p:cNvPr>
           <p:cNvSpPr>
             <a:spLocks noGrp="1"/>
           </p:cNvSpPr>
@@ -4608,15 +6175,22 @@
           <a:lstStyle/>
           <a:p>
             <a:r>
-              <a:rPr lang="en-US" dirty="0"/>
+              <a:rPr lang="en-US"/>
               <a:t>Classifying High-Resolution Brain Scans</a:t>
             </a:r>
-          </a:p>
-        </p:txBody>
-      </p:sp>
-      <p:sp>
-        <p:nvSpPr>
-          <p:cNvPr id="6" name="Slide Number Placeholder 5"/>
+            <a:endParaRPr lang="en-US" dirty="0"/>
+          </a:p>
+        </p:txBody>
+      </p:sp>
+      <p:sp>
+        <p:nvSpPr>
+          <p:cNvPr id="5" name="Slide Number Placeholder 4">
+            <a:extLst>
+              <a:ext uri="{FF2B5EF4-FFF2-40B4-BE49-F238E27FC236}">
+                <a16:creationId xmlns:a16="http://schemas.microsoft.com/office/drawing/2014/main" id="{7352E32E-D968-0A4C-876C-5B38829E1E5B}"/>
+              </a:ext>
+            </a:extLst>
+          </p:cNvPr>
           <p:cNvSpPr>
             <a:spLocks noGrp="1"/>
           </p:cNvSpPr>
@@ -4631,16 +6205,17 @@
           <a:p>
             <a:fld id="{A85782A5-310D-064D-97B2-7CD9DCF5F4D7}" type="slidenum">
               <a:rPr lang="en-US" smtClean="0"/>
+              <a:pPr/>
               <a:t>6</a:t>
             </a:fld>
-            <a:endParaRPr lang="en-US"/>
+            <a:endParaRPr lang="en-US" dirty="0"/>
           </a:p>
         </p:txBody>
       </p:sp>
     </p:spTree>
     <p:extLst>
       <p:ext uri="{BB962C8B-B14F-4D97-AF65-F5344CB8AC3E}">
-        <p14:creationId xmlns:p14="http://schemas.microsoft.com/office/powerpoint/2010/main" val="4063819120"/>
+        <p14:creationId xmlns:p14="http://schemas.microsoft.com/office/powerpoint/2010/main" val="1884191572"/>
       </p:ext>
     </p:extLst>
   </p:cSld>
@@ -4686,7 +6261,7 @@
           <a:p>
             <a:r>
               <a:rPr lang="en-US" dirty="0"/>
-              <a:t>Splitting the Dataset</a:t>
+              <a:t>Parameter Tuning</a:t>
             </a:r>
           </a:p>
         </p:txBody>
@@ -4704,25 +6279,75 @@
         <p:spPr/>
         <p:txBody>
           <a:bodyPr>
-            <a:normAutofit/>
+            <a:normAutofit fontScale="92500"/>
           </a:bodyPr>
           <a:lstStyle/>
           <a:p>
             <a:r>
+              <a:rPr lang="en-US" b="1" dirty="0" err="1"/>
+              <a:t>ParamGridBuilder</a:t>
+            </a:r>
+            <a:r>
+              <a:rPr lang="en-US" b="1" dirty="0"/>
+              <a:t>() </a:t>
+            </a:r>
+            <a:r>
               <a:rPr lang="en-US" dirty="0"/>
-              <a:t>Cross-Validation: how well a model “generalizes” (ability to accurately predict using previously-unseen data)</a:t>
-            </a:r>
-          </a:p>
-          <a:p>
+              <a:t>– constructs a grid of parameters to search over</a:t>
+            </a:r>
+          </a:p>
+          <a:p>
+            <a:r>
+              <a:rPr lang="en-US" b="1" dirty="0" err="1"/>
+              <a:t>numTrees</a:t>
+            </a:r>
+            <a:r>
+              <a:rPr lang="en-US" b="1" dirty="0"/>
+              <a:t> </a:t>
+            </a:r>
             <a:r>
               <a:rPr lang="en-US" dirty="0"/>
-              <a:t>Training data RDD (80%)</a:t>
-            </a:r>
-          </a:p>
-          <a:p>
+              <a:t>– increasing lead to better accuracy and less compute time</a:t>
+            </a:r>
+          </a:p>
+          <a:p>
+            <a:r>
+              <a:rPr lang="en-US" b="1" dirty="0" err="1"/>
+              <a:t>maxDepth</a:t>
+            </a:r>
             <a:r>
               <a:rPr lang="en-US" dirty="0"/>
-              <a:t>Validation data RDD (20%)</a:t>
+              <a:t> - higher values lead to overfitting and increased run time of the model</a:t>
+            </a:r>
+            <a:endParaRPr lang="en-US" b="1" dirty="0"/>
+          </a:p>
+          <a:p>
+            <a:r>
+              <a:rPr lang="en-US" b="1" dirty="0" err="1"/>
+              <a:t>maxBins</a:t>
+            </a:r>
+            <a:r>
+              <a:rPr lang="en-US" dirty="0"/>
+              <a:t> - maximum number of bins used for splitting features</a:t>
+            </a:r>
+            <a:endParaRPr lang="en-US" b="1" dirty="0"/>
+          </a:p>
+          <a:p>
+            <a:r>
+              <a:rPr lang="en-US" b="1" dirty="0"/>
+              <a:t>impurity</a:t>
+            </a:r>
+            <a:r>
+              <a:rPr lang="en-US" dirty="0"/>
+              <a:t> – criterion (</a:t>
+            </a:r>
+            <a:r>
+              <a:rPr lang="en-US" dirty="0" err="1"/>
+              <a:t>gini</a:t>
+            </a:r>
+            <a:r>
+              <a:rPr lang="en-US" dirty="0"/>
+              <a:t>)</a:t>
             </a:r>
           </a:p>
         </p:txBody>
@@ -4797,7 +6422,7 @@
     </p:spTree>
     <p:extLst>
       <p:ext uri="{BB962C8B-B14F-4D97-AF65-F5344CB8AC3E}">
-        <p14:creationId xmlns:p14="http://schemas.microsoft.com/office/powerpoint/2010/main" val="404897761"/>
+        <p14:creationId xmlns:p14="http://schemas.microsoft.com/office/powerpoint/2010/main" val="4063819120"/>
       </p:ext>
     </p:extLst>
   </p:cSld>
@@ -4826,6 +6451,163 @@
       </p:grpSpPr>
       <p:sp>
         <p:nvSpPr>
+          <p:cNvPr id="2" name="Title 1"/>
+          <p:cNvSpPr>
+            <a:spLocks noGrp="1"/>
+          </p:cNvSpPr>
+          <p:nvPr>
+            <p:ph type="title"/>
+          </p:nvPr>
+        </p:nvSpPr>
+        <p:spPr/>
+        <p:txBody>
+          <a:bodyPr>
+            <a:normAutofit fontScale="90000"/>
+          </a:bodyPr>
+          <a:lstStyle/>
+          <a:p>
+            <a:r>
+              <a:rPr lang="en-US" dirty="0"/>
+              <a:t>Splitting the Dataset</a:t>
+            </a:r>
+          </a:p>
+        </p:txBody>
+      </p:sp>
+      <p:sp>
+        <p:nvSpPr>
+          <p:cNvPr id="3" name="Content Placeholder 2"/>
+          <p:cNvSpPr>
+            <a:spLocks noGrp="1"/>
+          </p:cNvSpPr>
+          <p:nvPr>
+            <p:ph idx="1"/>
+          </p:nvPr>
+        </p:nvSpPr>
+        <p:spPr/>
+        <p:txBody>
+          <a:bodyPr>
+            <a:normAutofit/>
+          </a:bodyPr>
+          <a:lstStyle/>
+          <a:p>
+            <a:r>
+              <a:rPr lang="en-US" dirty="0"/>
+              <a:t>Cross-Validation: how well a model “generalizes” (ability to accurately predict using previously-unseen data)</a:t>
+            </a:r>
+          </a:p>
+          <a:p>
+            <a:r>
+              <a:rPr lang="en-US" dirty="0"/>
+              <a:t>Training data RDD (80%)</a:t>
+            </a:r>
+          </a:p>
+          <a:p>
+            <a:r>
+              <a:rPr lang="en-US" dirty="0"/>
+              <a:t>Validation data RDD (20%)</a:t>
+            </a:r>
+          </a:p>
+        </p:txBody>
+      </p:sp>
+      <p:sp>
+        <p:nvSpPr>
+          <p:cNvPr id="4" name="Date Placeholder 3"/>
+          <p:cNvSpPr>
+            <a:spLocks noGrp="1"/>
+          </p:cNvSpPr>
+          <p:nvPr>
+            <p:ph type="dt" sz="half" idx="10"/>
+          </p:nvPr>
+        </p:nvSpPr>
+        <p:spPr/>
+        <p:txBody>
+          <a:bodyPr/>
+          <a:lstStyle/>
+          <a:p>
+            <a:r>
+              <a:rPr lang="en-US" dirty="0"/>
+              <a:t>April 24, 2018</a:t>
+            </a:r>
+          </a:p>
+        </p:txBody>
+      </p:sp>
+      <p:sp>
+        <p:nvSpPr>
+          <p:cNvPr id="5" name="Footer Placeholder 4"/>
+          <p:cNvSpPr>
+            <a:spLocks noGrp="1"/>
+          </p:cNvSpPr>
+          <p:nvPr>
+            <p:ph type="ftr" sz="quarter" idx="11"/>
+          </p:nvPr>
+        </p:nvSpPr>
+        <p:spPr/>
+        <p:txBody>
+          <a:bodyPr/>
+          <a:lstStyle/>
+          <a:p>
+            <a:r>
+              <a:rPr lang="en-US" dirty="0"/>
+              <a:t>Classifying High-Resolution Brain Scans</a:t>
+            </a:r>
+          </a:p>
+        </p:txBody>
+      </p:sp>
+      <p:sp>
+        <p:nvSpPr>
+          <p:cNvPr id="6" name="Slide Number Placeholder 5"/>
+          <p:cNvSpPr>
+            <a:spLocks noGrp="1"/>
+          </p:cNvSpPr>
+          <p:nvPr>
+            <p:ph type="sldNum" sz="quarter" idx="12"/>
+          </p:nvPr>
+        </p:nvSpPr>
+        <p:spPr/>
+        <p:txBody>
+          <a:bodyPr/>
+          <a:lstStyle/>
+          <a:p>
+            <a:fld id="{A85782A5-310D-064D-97B2-7CD9DCF5F4D7}" type="slidenum">
+              <a:rPr lang="en-US" smtClean="0"/>
+              <a:t>8</a:t>
+            </a:fld>
+            <a:endParaRPr lang="en-US"/>
+          </a:p>
+        </p:txBody>
+      </p:sp>
+    </p:spTree>
+    <p:extLst>
+      <p:ext uri="{BB962C8B-B14F-4D97-AF65-F5344CB8AC3E}">
+        <p14:creationId xmlns:p14="http://schemas.microsoft.com/office/powerpoint/2010/main" val="404897761"/>
+      </p:ext>
+    </p:extLst>
+  </p:cSld>
+  <p:clrMapOvr>
+    <a:masterClrMapping/>
+  </p:clrMapOvr>
+</p:sld>
+</file>
+
+<file path=ppt/slides/slide9.xml><?xml version="1.0" encoding="utf-8"?>
+<p:sld xmlns:a="http://schemas.openxmlformats.org/drawingml/2006/main" xmlns:r="http://schemas.openxmlformats.org/officeDocument/2006/relationships" xmlns:p="http://schemas.openxmlformats.org/presentationml/2006/main">
+  <p:cSld>
+    <p:spTree>
+      <p:nvGrpSpPr>
+        <p:cNvPr id="1" name=""/>
+        <p:cNvGrpSpPr/>
+        <p:nvPr/>
+      </p:nvGrpSpPr>
+      <p:grpSpPr>
+        <a:xfrm>
+          <a:off x="0" y="0"/>
+          <a:ext cx="0" cy="0"/>
+          <a:chOff x="0" y="0"/>
+          <a:chExt cx="0" cy="0"/>
+        </a:xfrm>
+      </p:grpSpPr>
+      <p:sp>
+        <p:nvSpPr>
           <p:cNvPr id="2" name="Title 1">
             <a:extLst>
               <a:ext uri="{FF2B5EF4-FFF2-40B4-BE49-F238E27FC236}">
@@ -4955,7 +6737,7 @@
           <a:p>
             <a:fld id="{A85782A5-310D-064D-97B2-7CD9DCF5F4D7}" type="slidenum">
               <a:rPr lang="en-US" smtClean="0"/>
-              <a:t>8</a:t>
+              <a:t>9</a:t>
             </a:fld>
             <a:endParaRPr lang="en-US"/>
           </a:p>
@@ -5547,7 +7329,7 @@
         </p:nvSpPr>
         <p:spPr>
           <a:xfrm>
-            <a:off x="1960635" y="1257813"/>
+            <a:off x="1715651" y="1232822"/>
             <a:ext cx="255181" cy="324808"/>
           </a:xfrm>
           <a:prstGeom prst="downArrow">
@@ -5597,7 +7379,7 @@
         </p:nvSpPr>
         <p:spPr>
           <a:xfrm>
-            <a:off x="1343843" y="876319"/>
+            <a:off x="1133349" y="878648"/>
             <a:ext cx="938783" cy="369332"/>
           </a:xfrm>
           <a:prstGeom prst="rect">
@@ -6054,7 +7836,7 @@
                   </a:schemeClr>
                 </a:solidFill>
               </a:rPr>
-              <a:t>GGB/image.csv</a:t>
+              <a:t>6 GB/image.csv</a:t>
             </a:r>
           </a:p>
         </p:txBody>
@@ -6151,8 +7933,8 @@
         </p:nvSpPr>
         <p:spPr>
           <a:xfrm>
-            <a:off x="3151263" y="1216662"/>
-            <a:ext cx="1560812" cy="369332"/>
+            <a:off x="2236835" y="1063314"/>
+            <a:ext cx="2507097" cy="523220"/>
           </a:xfrm>
           <a:prstGeom prst="rect">
             <a:avLst/>
@@ -6166,12 +7948,22 @@
           <a:lstStyle/>
           <a:p>
             <a:r>
-              <a:rPr lang="en-US" b="1" dirty="0">
+              <a:rPr lang="en-US" sz="1400" b="1" dirty="0">
                 <a:solidFill>
                   <a:srgbClr val="FF0000"/>
                 </a:solidFill>
               </a:rPr>
-              <a:t>Diff. Partitions</a:t>
+              <a:t>Split data in several Partitions</a:t>
+            </a:r>
+          </a:p>
+          <a:p>
+            <a:r>
+              <a:rPr lang="en-US" sz="1400" b="1" dirty="0">
+                <a:solidFill>
+                  <a:srgbClr val="FF0000"/>
+                </a:solidFill>
+              </a:rPr>
+              <a:t>(1 job per image, map only job)</a:t>
             </a:r>
           </a:p>
         </p:txBody>
@@ -6190,8 +7982,8 @@
         </p:nvSpPr>
         <p:spPr>
           <a:xfrm>
-            <a:off x="6985335" y="2409523"/>
-            <a:ext cx="1717868" cy="369332"/>
+            <a:off x="6985334" y="2409523"/>
+            <a:ext cx="1988016" cy="369332"/>
           </a:xfrm>
           <a:prstGeom prst="rect">
             <a:avLst/>
@@ -6212,7 +8004,7 @@
                   </a:schemeClr>
                 </a:solidFill>
               </a:rPr>
-              <a:t>~65 MB image</a:t>
+              <a:t>~65 MB / image</a:t>
             </a:r>
           </a:p>
         </p:txBody>
@@ -6231,8 +8023,8 @@
         </p:nvSpPr>
         <p:spPr>
           <a:xfrm>
-            <a:off x="3647021" y="3021832"/>
-            <a:ext cx="1121765" cy="923330"/>
+            <a:off x="7565035" y="2739137"/>
+            <a:ext cx="1121765" cy="1200329"/>
           </a:xfrm>
           <a:prstGeom prst="rect">
             <a:avLst/>
@@ -6252,7 +8044,86 @@
                   <a:srgbClr val="FF0000"/>
                 </a:solidFill>
               </a:rPr>
-              <a:t>Persist during training</a:t>
+              <a:t>Persist data during training</a:t>
+            </a:r>
+          </a:p>
+        </p:txBody>
+      </p:sp>
+      <p:sp>
+        <p:nvSpPr>
+          <p:cNvPr id="44" name="TextBox 43">
+            <a:extLst>
+              <a:ext uri="{FF2B5EF4-FFF2-40B4-BE49-F238E27FC236}">
+                <a16:creationId xmlns:a16="http://schemas.microsoft.com/office/drawing/2014/main" id="{C5213DD4-A7B8-C848-88F9-5FCFAC5E8ED6}"/>
+              </a:ext>
+            </a:extLst>
+          </p:cNvPr>
+          <p:cNvSpPr txBox="1"/>
+          <p:nvPr/>
+        </p:nvSpPr>
+        <p:spPr>
+          <a:xfrm>
+            <a:off x="126767" y="4922651"/>
+            <a:ext cx="1489800" cy="923330"/>
+          </a:xfrm>
+          <a:prstGeom prst="rect">
+            <a:avLst/>
+          </a:prstGeom>
+          <a:noFill/>
+        </p:spPr>
+        <p:txBody>
+          <a:bodyPr wrap="square" rtlCol="0">
+            <a:spAutoFit/>
+          </a:bodyPr>
+          <a:lstStyle/>
+          <a:p>
+            <a:pPr algn="ctr"/>
+            <a:r>
+              <a:rPr lang="en-US" b="1" dirty="0">
+                <a:solidFill>
+                  <a:srgbClr val="FF0000"/>
+                </a:solidFill>
+              </a:rPr>
+              <a:t>Persist model during classification</a:t>
+            </a:r>
+          </a:p>
+        </p:txBody>
+      </p:sp>
+      <p:sp>
+        <p:nvSpPr>
+          <p:cNvPr id="45" name="TextBox 44">
+            <a:extLst>
+              <a:ext uri="{FF2B5EF4-FFF2-40B4-BE49-F238E27FC236}">
+                <a16:creationId xmlns:a16="http://schemas.microsoft.com/office/drawing/2014/main" id="{CB8120C0-38D8-5E47-8D33-56F0019869BE}"/>
+              </a:ext>
+            </a:extLst>
+          </p:cNvPr>
+          <p:cNvSpPr txBox="1"/>
+          <p:nvPr/>
+        </p:nvSpPr>
+        <p:spPr>
+          <a:xfrm>
+            <a:off x="129146" y="1152109"/>
+            <a:ext cx="1558435" cy="954107"/>
+          </a:xfrm>
+          <a:prstGeom prst="rect">
+            <a:avLst/>
+          </a:prstGeom>
+          <a:noFill/>
+        </p:spPr>
+        <p:txBody>
+          <a:bodyPr wrap="square" rtlCol="0">
+            <a:spAutoFit/>
+          </a:bodyPr>
+          <a:lstStyle/>
+          <a:p>
+            <a:r>
+              <a:rPr lang="en-US" sz="1400" b="1" dirty="0">
+                <a:solidFill>
+                  <a:srgbClr val="FF0000"/>
+                </a:solidFill>
+              </a:rPr>
+              <a:t>*Each image took ~25 minutes to process, dual core machine 1 worker</a:t>
             </a:r>
           </a:p>
         </p:txBody>
@@ -6260,128 +8131,7 @@
     </p:spTree>
     <p:extLst>
       <p:ext uri="{BB962C8B-B14F-4D97-AF65-F5344CB8AC3E}">
-        <p14:creationId xmlns:p14="http://schemas.microsoft.com/office/powerpoint/2010/main" val="4098742230"/>
-      </p:ext>
-    </p:extLst>
-  </p:cSld>
-  <p:clrMapOvr>
-    <a:masterClrMapping/>
-  </p:clrMapOvr>
-</p:sld>
-</file>
-
-<file path=ppt/slides/slide9.xml><?xml version="1.0" encoding="utf-8"?>
-<p:sld xmlns:a="http://schemas.openxmlformats.org/drawingml/2006/main" xmlns:r="http://schemas.openxmlformats.org/officeDocument/2006/relationships" xmlns:p="http://schemas.openxmlformats.org/presentationml/2006/main">
-  <p:cSld>
-    <p:spTree>
-      <p:nvGrpSpPr>
-        <p:cNvPr id="1" name=""/>
-        <p:cNvGrpSpPr/>
-        <p:nvPr/>
-      </p:nvGrpSpPr>
-      <p:grpSpPr>
-        <a:xfrm>
-          <a:off x="0" y="0"/>
-          <a:ext cx="0" cy="0"/>
-          <a:chOff x="0" y="0"/>
-          <a:chExt cx="0" cy="0"/>
-        </a:xfrm>
-      </p:grpSpPr>
-      <p:sp>
-        <p:nvSpPr>
-          <p:cNvPr id="2" name="Title 1"/>
-          <p:cNvSpPr>
-            <a:spLocks noGrp="1"/>
-          </p:cNvSpPr>
-          <p:nvPr>
-            <p:ph type="title"/>
-          </p:nvPr>
-        </p:nvSpPr>
-        <p:spPr/>
-        <p:txBody>
-          <a:bodyPr>
-            <a:normAutofit fontScale="90000"/>
-          </a:bodyPr>
-          <a:lstStyle/>
-          <a:p>
-            <a:r>
-              <a:rPr lang="en-US" dirty="0"/>
-              <a:t>Results</a:t>
-            </a:r>
-          </a:p>
-        </p:txBody>
-      </p:sp>
-      <p:sp>
-        <p:nvSpPr>
-          <p:cNvPr id="4" name="Date Placeholder 3"/>
-          <p:cNvSpPr>
-            <a:spLocks noGrp="1"/>
-          </p:cNvSpPr>
-          <p:nvPr>
-            <p:ph type="dt" sz="half" idx="10"/>
-          </p:nvPr>
-        </p:nvSpPr>
-        <p:spPr/>
-        <p:txBody>
-          <a:bodyPr/>
-          <a:lstStyle/>
-          <a:p>
-            <a:r>
-              <a:rPr lang="en-US" dirty="0"/>
-              <a:t>April 24, 2018</a:t>
-            </a:r>
-          </a:p>
-        </p:txBody>
-      </p:sp>
-      <p:sp>
-        <p:nvSpPr>
-          <p:cNvPr id="5" name="Footer Placeholder 4"/>
-          <p:cNvSpPr>
-            <a:spLocks noGrp="1"/>
-          </p:cNvSpPr>
-          <p:nvPr>
-            <p:ph type="ftr" sz="quarter" idx="11"/>
-          </p:nvPr>
-        </p:nvSpPr>
-        <p:spPr/>
-        <p:txBody>
-          <a:bodyPr/>
-          <a:lstStyle/>
-          <a:p>
-            <a:r>
-              <a:rPr lang="en-US" dirty="0"/>
-              <a:t>Classifying High-Resolution Brain Scans</a:t>
-            </a:r>
-          </a:p>
-        </p:txBody>
-      </p:sp>
-      <p:sp>
-        <p:nvSpPr>
-          <p:cNvPr id="6" name="Slide Number Placeholder 5"/>
-          <p:cNvSpPr>
-            <a:spLocks noGrp="1"/>
-          </p:cNvSpPr>
-          <p:nvPr>
-            <p:ph type="sldNum" sz="quarter" idx="12"/>
-          </p:nvPr>
-        </p:nvSpPr>
-        <p:spPr/>
-        <p:txBody>
-          <a:bodyPr/>
-          <a:lstStyle/>
-          <a:p>
-            <a:fld id="{A85782A5-310D-064D-97B2-7CD9DCF5F4D7}" type="slidenum">
-              <a:rPr lang="en-US" smtClean="0"/>
-              <a:t>9</a:t>
-            </a:fld>
-            <a:endParaRPr lang="en-US"/>
-          </a:p>
-        </p:txBody>
-      </p:sp>
-    </p:spTree>
-    <p:extLst>
-      <p:ext uri="{BB962C8B-B14F-4D97-AF65-F5344CB8AC3E}">
-        <p14:creationId xmlns:p14="http://schemas.microsoft.com/office/powerpoint/2010/main" val="1500565145"/>
+        <p14:creationId xmlns:p14="http://schemas.microsoft.com/office/powerpoint/2010/main" val="3653623932"/>
       </p:ext>
     </p:extLst>
   </p:cSld>

</xml_diff>

<commit_message>
update pres and report
</commit_message>
<xml_diff>
--- a/presentation/DutileOtentiPhangSweeney.pptx
+++ b/presentation/DutileOtentiPhangSweeney.pptx
@@ -5,10 +5,10 @@
     <p:sldMasterId id="2147483648" r:id="rId1"/>
   </p:sldMasterIdLst>
   <p:notesMasterIdLst>
-    <p:notesMasterId r:id="rId16"/>
+    <p:notesMasterId r:id="rId18"/>
   </p:notesMasterIdLst>
   <p:handoutMasterIdLst>
-    <p:handoutMasterId r:id="rId17"/>
+    <p:handoutMasterId r:id="rId19"/>
   </p:handoutMasterIdLst>
   <p:sldIdLst>
     <p:sldId id="256" r:id="rId2"/>
@@ -16,15 +16,17 @@
     <p:sldId id="283" r:id="rId4"/>
     <p:sldId id="273" r:id="rId5"/>
     <p:sldId id="274" r:id="rId6"/>
-    <p:sldId id="279" r:id="rId7"/>
+    <p:sldId id="285" r:id="rId7"/>
     <p:sldId id="275" r:id="rId8"/>
-    <p:sldId id="271" r:id="rId9"/>
-    <p:sldId id="276" r:id="rId10"/>
-    <p:sldId id="280" r:id="rId11"/>
-    <p:sldId id="281" r:id="rId12"/>
-    <p:sldId id="262" r:id="rId13"/>
-    <p:sldId id="284" r:id="rId14"/>
-    <p:sldId id="261" r:id="rId15"/>
+    <p:sldId id="279" r:id="rId9"/>
+    <p:sldId id="271" r:id="rId10"/>
+    <p:sldId id="276" r:id="rId11"/>
+    <p:sldId id="280" r:id="rId12"/>
+    <p:sldId id="281" r:id="rId13"/>
+    <p:sldId id="286" r:id="rId14"/>
+    <p:sldId id="262" r:id="rId15"/>
+    <p:sldId id="284" r:id="rId16"/>
+    <p:sldId id="261" r:id="rId17"/>
   </p:sldIdLst>
   <p:sldSz cx="9144000" cy="6858000" type="screen4x3"/>
   <p:notesSz cx="6858000" cy="9144000"/>
@@ -795,19 +797,13 @@
           <a:bodyPr/>
           <a:lstStyle/>
           <a:p>
-            <a:r>
-              <a:rPr lang="en-US" dirty="0"/>
-              <a:t>EMILY</a:t>
-            </a:r>
-          </a:p>
-          <a:p>
             <a:pPr marL="171450" indent="-171450">
               <a:buFont typeface="Arial" panose="020B0604020202020204" pitchFamily="34" charset="0"/>
               <a:buChar char="•"/>
             </a:pPr>
             <a:r>
               <a:rPr lang="en-US" dirty="0"/>
-              <a:t>First, preprocessing was 1 job per image. It is a map only job.</a:t>
+              <a:t>ASHA</a:t>
             </a:r>
           </a:p>
           <a:p>
@@ -817,7 +813,7 @@
             </a:pPr>
             <a:r>
               <a:rPr lang="en-US" dirty="0"/>
-              <a:t>Pre-processing transformations 6GB image on 65MB image</a:t>
+              <a:t>No form of randomization</a:t>
             </a:r>
           </a:p>
           <a:p>
@@ -827,7 +823,15 @@
             </a:pPr>
             <a:r>
               <a:rPr lang="en-US" dirty="0"/>
-              <a:t>The training image are fed to the random forest model to train</a:t>
+              <a:t>Didn’t use cross validation from </a:t>
+            </a:r>
+            <a:r>
+              <a:rPr lang="en-US" dirty="0" err="1"/>
+              <a:t>scala</a:t>
+            </a:r>
+            <a:r>
+              <a:rPr lang="en-US" dirty="0"/>
+              <a:t> spark, we implemented ourselves</a:t>
             </a:r>
           </a:p>
           <a:p>
@@ -837,15 +841,15 @@
             </a:pPr>
             <a:r>
               <a:rPr lang="en-US" dirty="0"/>
-              <a:t>We persist the image, which is a job that shuffles the data depending on the the parameters (shuffling correlated with </a:t>
+              <a:t>Use 1,2,3,4 and 6 </a:t>
             </a:r>
             <a:r>
               <a:rPr lang="en-US" dirty="0" err="1"/>
-              <a:t>params</a:t>
-            </a:r>
-            <a:r>
-              <a:rPr lang="en-US" dirty="0"/>
-              <a:t> – it depends more on the depth &amp; number of trees)</a:t>
+              <a:t>bc</a:t>
+            </a:r>
+            <a:r>
+              <a:rPr lang="en-US" dirty="0"/>
+              <a:t> we didn’t want data from test inside train (used 4 image for train, 1 for test). This way NO test sample was used during training.</a:t>
             </a:r>
           </a:p>
           <a:p>
@@ -855,7 +859,7 @@
             </a:pPr>
             <a:r>
               <a:rPr lang="en-US" dirty="0"/>
-              <a:t>Classification job that has a persisted model and it receives only the image that we want to classify</a:t>
+              <a:t>Split dataset into train and test sets</a:t>
             </a:r>
           </a:p>
           <a:p>
@@ -865,7 +869,47 @@
             </a:pPr>
             <a:r>
               <a:rPr lang="en-US" dirty="0"/>
-              <a:t>because our feature vector is small we didn’t see much scaling on this one (firing up more than 4 workers isn’t necessary)</a:t>
+              <a:t>Train the model</a:t>
+            </a:r>
+          </a:p>
+          <a:p>
+            <a:pPr marL="171450" indent="-171450">
+              <a:buFont typeface="Arial" panose="020B0604020202020204" pitchFamily="34" charset="0"/>
+              <a:buChar char="•"/>
+            </a:pPr>
+            <a:r>
+              <a:rPr lang="en-US" dirty="0"/>
+              <a:t>Predict with both training and testing</a:t>
+            </a:r>
+          </a:p>
+          <a:p>
+            <a:pPr marL="171450" indent="-171450">
+              <a:buFont typeface="Arial" panose="020B0604020202020204" pitchFamily="34" charset="0"/>
+              <a:buChar char="•"/>
+            </a:pPr>
+            <a:r>
+              <a:rPr lang="en-US" dirty="0"/>
+              <a:t>Measure error in the predictions (in both sets)</a:t>
+            </a:r>
+          </a:p>
+          <a:p>
+            <a:pPr marL="171450" indent="-171450">
+              <a:buFont typeface="Arial" panose="020B0604020202020204" pitchFamily="34" charset="0"/>
+              <a:buChar char="•"/>
+            </a:pPr>
+            <a:r>
+              <a:rPr lang="en-US" dirty="0"/>
+              <a:t>Compare the error of the two data sets</a:t>
+            </a:r>
+          </a:p>
+          <a:p>
+            <a:pPr marL="171450" indent="-171450">
+              <a:buFont typeface="Arial" panose="020B0604020202020204" pitchFamily="34" charset="0"/>
+              <a:buChar char="•"/>
+            </a:pPr>
+            <a:r>
+              <a:rPr lang="en-US" dirty="0"/>
+              <a:t>Trained on diff images and tested</a:t>
             </a:r>
           </a:p>
         </p:txBody>
@@ -896,7 +940,7 @@
     </p:spTree>
     <p:extLst>
       <p:ext uri="{BB962C8B-B14F-4D97-AF65-F5344CB8AC3E}">
-        <p14:creationId xmlns:p14="http://schemas.microsoft.com/office/powerpoint/2010/main" val="3737493002"/>
+        <p14:creationId xmlns:p14="http://schemas.microsoft.com/office/powerpoint/2010/main" val="3104478743"/>
       </p:ext>
     </p:extLst>
   </p:cSld>
@@ -956,40 +1000,13 @@
             </a:r>
           </a:p>
           <a:p>
-            <a:endParaRPr lang="en-US" dirty="0"/>
-          </a:p>
-          <a:p>
-            <a:r>
-              <a:rPr lang="en-US" dirty="0"/>
-              <a:t>Highlight best model</a:t>
-            </a:r>
-          </a:p>
-          <a:p>
-            <a:r>
-              <a:rPr lang="en-US" dirty="0"/>
-              <a:t>* Right table shows scaling of training</a:t>
-            </a:r>
-          </a:p>
-          <a:p>
-            <a:r>
-              <a:rPr lang="en-US" dirty="0"/>
-              <a:t>What was scaling of processing – parallel</a:t>
-            </a:r>
-          </a:p>
-          <a:p>
-            <a:r>
-              <a:rPr lang="en-US" dirty="0"/>
-              <a:t>Classification – not that parallel (small feature vectors, fit into 65MB for 1 image, then make splits on this thing). If we split beyond 4 parts, the time it takes to fire up other machines it is expensive. </a:t>
-            </a:r>
-          </a:p>
-          <a:p>
             <a:pPr marL="171450" indent="-171450">
               <a:buFont typeface="Arial" panose="020B0604020202020204" pitchFamily="34" charset="0"/>
               <a:buChar char="•"/>
             </a:pPr>
             <a:r>
               <a:rPr lang="en-US" dirty="0"/>
-              <a:t>After 4 workers, which is 16 splits, no real scaling </a:t>
+              <a:t>First, preprocessing was 1 job per image. It is a map only job.</a:t>
             </a:r>
           </a:p>
           <a:p>
@@ -997,43 +1014,19 @@
               <a:buFont typeface="Arial" panose="020B0604020202020204" pitchFamily="34" charset="0"/>
               <a:buChar char="•"/>
             </a:pPr>
-            <a:endParaRPr lang="en-US" dirty="0"/>
+            <a:r>
+              <a:rPr lang="en-US" dirty="0"/>
+              <a:t>Pre-processing transformations 6GB image on 65MB image</a:t>
+            </a:r>
           </a:p>
           <a:p>
             <a:pPr marL="171450" indent="-171450">
               <a:buFont typeface="Arial" panose="020B0604020202020204" pitchFamily="34" charset="0"/>
               <a:buChar char="•"/>
             </a:pPr>
-            <a:endParaRPr lang="en-US" dirty="0"/>
-          </a:p>
-          <a:p>
-            <a:r>
-              <a:rPr lang="en-US" dirty="0"/>
-              <a:t>IMAGE 2 = validation, train on the rest of the data.</a:t>
-            </a:r>
-          </a:p>
-          <a:p>
-            <a:r>
-              <a:rPr lang="en-US" dirty="0"/>
-              <a:t>Base accuracy = total number of samples / negatives</a:t>
-            </a:r>
-          </a:p>
-          <a:p>
-            <a:r>
-              <a:rPr lang="en-US" dirty="0"/>
-              <a:t>Best = TN + TP / total</a:t>
-            </a:r>
-          </a:p>
-          <a:p>
-            <a:r>
-              <a:rPr lang="en-US" dirty="0"/>
-              <a:t>Don’t have as good sensitivity for foreground. Getting a better sensitivity for foreground we lose on background.</a:t>
-            </a:r>
-          </a:p>
-          <a:p>
-            <a:r>
-              <a:rPr lang="en-US" dirty="0"/>
-              <a:t>Similar to classifying patients with cancer, by selecting accuracy metric – true negatives is important. Have the smallest false positive rate.</a:t>
+            <a:r>
+              <a:rPr lang="en-US" dirty="0"/>
+              <a:t>The training image are fed to the random forest model to train</a:t>
             </a:r>
           </a:p>
           <a:p>
@@ -1041,7 +1034,38 @@
               <a:buFont typeface="Arial" panose="020B0604020202020204" pitchFamily="34" charset="0"/>
               <a:buChar char="•"/>
             </a:pPr>
-            <a:endParaRPr lang="en-US" dirty="0"/>
+            <a:r>
+              <a:rPr lang="en-US" dirty="0"/>
+              <a:t>We persist the image, which is a job that shuffles the data depending on the the parameters (shuffling correlated with </a:t>
+            </a:r>
+            <a:r>
+              <a:rPr lang="en-US" dirty="0" err="1"/>
+              <a:t>params</a:t>
+            </a:r>
+            <a:r>
+              <a:rPr lang="en-US" dirty="0"/>
+              <a:t> – it depends more on the depth &amp; number of trees)</a:t>
+            </a:r>
+          </a:p>
+          <a:p>
+            <a:pPr marL="171450" indent="-171450">
+              <a:buFont typeface="Arial" panose="020B0604020202020204" pitchFamily="34" charset="0"/>
+              <a:buChar char="•"/>
+            </a:pPr>
+            <a:r>
+              <a:rPr lang="en-US" dirty="0"/>
+              <a:t>Classification job that has a persisted model and it receives only the image that we want to classify</a:t>
+            </a:r>
+          </a:p>
+          <a:p>
+            <a:pPr marL="171450" indent="-171450">
+              <a:buFont typeface="Arial" panose="020B0604020202020204" pitchFamily="34" charset="0"/>
+              <a:buChar char="•"/>
+            </a:pPr>
+            <a:r>
+              <a:rPr lang="en-US" dirty="0"/>
+              <a:t>because our feature vector is small we didn’t see much scaling on this one (firing up more than 4 workers isn’t necessary)</a:t>
+            </a:r>
           </a:p>
         </p:txBody>
       </p:sp>
@@ -1071,7 +1095,7 @@
     </p:spTree>
     <p:extLst>
       <p:ext uri="{BB962C8B-B14F-4D97-AF65-F5344CB8AC3E}">
-        <p14:creationId xmlns:p14="http://schemas.microsoft.com/office/powerpoint/2010/main" val="663596552"/>
+        <p14:creationId xmlns:p14="http://schemas.microsoft.com/office/powerpoint/2010/main" val="3737493002"/>
       </p:ext>
     </p:extLst>
   </p:cSld>
@@ -1127,8 +1151,96 @@
           <a:p>
             <a:r>
               <a:rPr lang="en-US" dirty="0"/>
-              <a:t>NATE</a:t>
-            </a:r>
+              <a:t>EMILY</a:t>
+            </a:r>
+          </a:p>
+          <a:p>
+            <a:endParaRPr lang="en-US" dirty="0"/>
+          </a:p>
+          <a:p>
+            <a:r>
+              <a:rPr lang="en-US" dirty="0"/>
+              <a:t>Highlight best model</a:t>
+            </a:r>
+          </a:p>
+          <a:p>
+            <a:r>
+              <a:rPr lang="en-US" dirty="0"/>
+              <a:t>* Right table shows scaling of training</a:t>
+            </a:r>
+          </a:p>
+          <a:p>
+            <a:r>
+              <a:rPr lang="en-US" dirty="0"/>
+              <a:t>What was scaling of processing – parallel</a:t>
+            </a:r>
+          </a:p>
+          <a:p>
+            <a:r>
+              <a:rPr lang="en-US" dirty="0"/>
+              <a:t>Classification – not that parallel (small feature vectors, fit into 65MB for 1 image, then make splits on this thing). If we split beyond 4 parts, the time it takes to fire up other machines it is expensive. </a:t>
+            </a:r>
+          </a:p>
+          <a:p>
+            <a:pPr marL="171450" indent="-171450">
+              <a:buFont typeface="Arial" panose="020B0604020202020204" pitchFamily="34" charset="0"/>
+              <a:buChar char="•"/>
+            </a:pPr>
+            <a:r>
+              <a:rPr lang="en-US" dirty="0"/>
+              <a:t>After 4 workers, which is 16 splits, no real scaling </a:t>
+            </a:r>
+          </a:p>
+          <a:p>
+            <a:pPr marL="171450" indent="-171450">
+              <a:buFont typeface="Arial" panose="020B0604020202020204" pitchFamily="34" charset="0"/>
+              <a:buChar char="•"/>
+            </a:pPr>
+            <a:endParaRPr lang="en-US" dirty="0"/>
+          </a:p>
+          <a:p>
+            <a:pPr marL="171450" indent="-171450">
+              <a:buFont typeface="Arial" panose="020B0604020202020204" pitchFamily="34" charset="0"/>
+              <a:buChar char="•"/>
+            </a:pPr>
+            <a:endParaRPr lang="en-US" dirty="0"/>
+          </a:p>
+          <a:p>
+            <a:r>
+              <a:rPr lang="en-US" dirty="0"/>
+              <a:t>IMAGE 2 = validation, train on the rest of the data.</a:t>
+            </a:r>
+          </a:p>
+          <a:p>
+            <a:r>
+              <a:rPr lang="en-US" dirty="0"/>
+              <a:t>Base accuracy = total number of samples / negatives</a:t>
+            </a:r>
+          </a:p>
+          <a:p>
+            <a:r>
+              <a:rPr lang="en-US" dirty="0"/>
+              <a:t>Best = TN + TP / total</a:t>
+            </a:r>
+          </a:p>
+          <a:p>
+            <a:r>
+              <a:rPr lang="en-US" dirty="0"/>
+              <a:t>Don’t have as good sensitivity for foreground. Getting a better sensitivity for foreground we lose on background.</a:t>
+            </a:r>
+          </a:p>
+          <a:p>
+            <a:r>
+              <a:rPr lang="en-US" dirty="0"/>
+              <a:t>Similar to classifying patients with cancer, by selecting accuracy metric – true negatives is important. Have the smallest false positive rate.</a:t>
+            </a:r>
+          </a:p>
+          <a:p>
+            <a:pPr marL="171450" indent="-171450">
+              <a:buFont typeface="Arial" panose="020B0604020202020204" pitchFamily="34" charset="0"/>
+              <a:buChar char="•"/>
+            </a:pPr>
+            <a:endParaRPr lang="en-US" dirty="0"/>
           </a:p>
         </p:txBody>
       </p:sp>
@@ -1158,7 +1270,7 @@
     </p:spTree>
     <p:extLst>
       <p:ext uri="{BB962C8B-B14F-4D97-AF65-F5344CB8AC3E}">
-        <p14:creationId xmlns:p14="http://schemas.microsoft.com/office/powerpoint/2010/main" val="1580661599"/>
+        <p14:creationId xmlns:p14="http://schemas.microsoft.com/office/powerpoint/2010/main" val="663596552"/>
       </p:ext>
     </p:extLst>
   </p:cSld>
@@ -1214,7 +1326,7 @@
           <a:p>
             <a:r>
               <a:rPr lang="en-US" dirty="0"/>
-              <a:t>TRISTAN</a:t>
+              <a:t>NATE</a:t>
             </a:r>
           </a:p>
         </p:txBody>
@@ -1236,7 +1348,94 @@
           <a:p>
             <a:fld id="{1B8B4FD3-9156-3F45-86A6-2A512E7D4DAE}" type="slidenum">
               <a:rPr lang="en-US" smtClean="0"/>
-              <a:t>13</a:t>
+              <a:t>14</a:t>
+            </a:fld>
+            <a:endParaRPr lang="en-US"/>
+          </a:p>
+        </p:txBody>
+      </p:sp>
+    </p:spTree>
+    <p:extLst>
+      <p:ext uri="{BB962C8B-B14F-4D97-AF65-F5344CB8AC3E}">
+        <p14:creationId xmlns:p14="http://schemas.microsoft.com/office/powerpoint/2010/main" val="1580661599"/>
+      </p:ext>
+    </p:extLst>
+  </p:cSld>
+  <p:clrMapOvr>
+    <a:masterClrMapping/>
+  </p:clrMapOvr>
+</p:notes>
+</file>
+
+<file path=ppt/notesSlides/notesSlide14.xml><?xml version="1.0" encoding="utf-8"?>
+<p:notes xmlns:a="http://schemas.openxmlformats.org/drawingml/2006/main" xmlns:r="http://schemas.openxmlformats.org/officeDocument/2006/relationships" xmlns:p="http://schemas.openxmlformats.org/presentationml/2006/main">
+  <p:cSld>
+    <p:spTree>
+      <p:nvGrpSpPr>
+        <p:cNvPr id="1" name=""/>
+        <p:cNvGrpSpPr/>
+        <p:nvPr/>
+      </p:nvGrpSpPr>
+      <p:grpSpPr>
+        <a:xfrm>
+          <a:off x="0" y="0"/>
+          <a:ext cx="0" cy="0"/>
+          <a:chOff x="0" y="0"/>
+          <a:chExt cx="0" cy="0"/>
+        </a:xfrm>
+      </p:grpSpPr>
+      <p:sp>
+        <p:nvSpPr>
+          <p:cNvPr id="2" name="Slide Image Placeholder 1"/>
+          <p:cNvSpPr>
+            <a:spLocks noGrp="1" noRot="1" noChangeAspect="1"/>
+          </p:cNvSpPr>
+          <p:nvPr>
+            <p:ph type="sldImg"/>
+          </p:nvPr>
+        </p:nvSpPr>
+        <p:spPr/>
+      </p:sp>
+      <p:sp>
+        <p:nvSpPr>
+          <p:cNvPr id="3" name="Notes Placeholder 2"/>
+          <p:cNvSpPr>
+            <a:spLocks noGrp="1"/>
+          </p:cNvSpPr>
+          <p:nvPr>
+            <p:ph type="body" idx="1"/>
+          </p:nvPr>
+        </p:nvSpPr>
+        <p:spPr/>
+        <p:txBody>
+          <a:bodyPr/>
+          <a:lstStyle/>
+          <a:p>
+            <a:r>
+              <a:rPr lang="en-US" dirty="0"/>
+              <a:t>TRISTAN</a:t>
+            </a:r>
+          </a:p>
+        </p:txBody>
+      </p:sp>
+      <p:sp>
+        <p:nvSpPr>
+          <p:cNvPr id="4" name="Slide Number Placeholder 3"/>
+          <p:cNvSpPr>
+            <a:spLocks noGrp="1"/>
+          </p:cNvSpPr>
+          <p:nvPr>
+            <p:ph type="sldNum" sz="quarter" idx="10"/>
+          </p:nvPr>
+        </p:nvSpPr>
+        <p:spPr/>
+        <p:txBody>
+          <a:bodyPr/>
+          <a:lstStyle/>
+          <a:p>
+            <a:fld id="{1B8B4FD3-9156-3F45-86A6-2A512E7D4DAE}" type="slidenum">
+              <a:rPr lang="en-US" smtClean="0"/>
+              <a:t>15</a:t>
             </a:fld>
             <a:endParaRPr lang="en-US"/>
           </a:p>
@@ -1708,115 +1907,6 @@
               </a:rPr>
               <a:t>Features selected (small feature vector): center pixel, overall # of pixels &gt; threshold, FFT</a:t>
             </a:r>
-          </a:p>
-          <a:p>
-            <a:pPr marL="171450" indent="-171450">
-              <a:buFont typeface="Arial" panose="020B0604020202020204" pitchFamily="34" charset="0"/>
-              <a:buChar char="•"/>
-            </a:pPr>
-            <a:r>
-              <a:rPr lang="en-US" sz="1200" b="0" i="0" kern="1200" dirty="0">
-                <a:solidFill>
-                  <a:schemeClr val="tx1"/>
-                </a:solidFill>
-                <a:effectLst/>
-                <a:latin typeface="+mn-lt"/>
-                <a:ea typeface="+mn-ea"/>
-                <a:cs typeface="+mn-cs"/>
-              </a:rPr>
-              <a:t>We looked at the distribution of the data to identify class imbalance - a term used to describe when a target class within a data set is outnumbered by another target class (or classes). This can create misleading accuracy metrics, known as an accuracy paradox</a:t>
-            </a:r>
-          </a:p>
-          <a:p>
-            <a:pPr marL="171450" indent="-171450">
-              <a:buFont typeface="Arial" panose="020B0604020202020204" pitchFamily="34" charset="0"/>
-              <a:buChar char="•"/>
-            </a:pPr>
-            <a:r>
-              <a:rPr lang="en-US" sz="1200" b="0" i="0" kern="1200" dirty="0">
-                <a:solidFill>
-                  <a:schemeClr val="tx1"/>
-                </a:solidFill>
-                <a:effectLst/>
-                <a:latin typeface="+mn-lt"/>
-                <a:ea typeface="+mn-ea"/>
-                <a:cs typeface="+mn-cs"/>
-              </a:rPr>
-              <a:t>CENTER VALUE FOR FOREGROUND WAS MUCH LARGER</a:t>
-            </a:r>
-          </a:p>
-          <a:p>
-            <a:pPr marL="171450" indent="-171450">
-              <a:buFont typeface="Arial" panose="020B0604020202020204" pitchFamily="34" charset="0"/>
-              <a:buChar char="•"/>
-            </a:pPr>
-            <a:r>
-              <a:rPr lang="en-US" sz="1200" b="0" i="0" kern="1200" dirty="0">
-                <a:solidFill>
-                  <a:schemeClr val="tx1"/>
-                </a:solidFill>
-                <a:effectLst/>
-                <a:latin typeface="+mn-lt"/>
-                <a:ea typeface="+mn-ea"/>
-                <a:cs typeface="+mn-cs"/>
-              </a:rPr>
-              <a:t>Decision tree and RF splits the samples on the features</a:t>
-            </a:r>
-          </a:p>
-          <a:p>
-            <a:pPr marL="171450" indent="-171450">
-              <a:buFont typeface="Arial" panose="020B0604020202020204" pitchFamily="34" charset="0"/>
-              <a:buChar char="•"/>
-            </a:pPr>
-            <a:r>
-              <a:rPr lang="en-US" sz="1200" b="0" i="0" kern="1200" dirty="0">
-                <a:solidFill>
-                  <a:schemeClr val="tx1"/>
-                </a:solidFill>
-                <a:effectLst/>
-                <a:latin typeface="+mn-lt"/>
-                <a:ea typeface="+mn-ea"/>
-                <a:cs typeface="+mn-cs"/>
-              </a:rPr>
-              <a:t>Foreground image has a higher value than background</a:t>
-            </a:r>
-          </a:p>
-          <a:p>
-            <a:pPr marL="171450" marR="0" lvl="0" indent="-171450" algn="l" defTabSz="457200" rtl="0" eaLnBrk="1" fontAlgn="auto" latinLnBrk="0" hangingPunct="1">
-              <a:lnSpc>
-                <a:spcPct val="100000"/>
-              </a:lnSpc>
-              <a:spcBef>
-                <a:spcPts val="0"/>
-              </a:spcBef>
-              <a:spcAft>
-                <a:spcPts val="0"/>
-              </a:spcAft>
-              <a:buClrTx/>
-              <a:buSzTx/>
-              <a:buFont typeface="Arial" panose="020B0604020202020204" pitchFamily="34" charset="0"/>
-              <a:buChar char="•"/>
-              <a:tabLst/>
-              <a:defRPr/>
-            </a:pPr>
-            <a:r>
-              <a:rPr lang="en-US" sz="1200" b="0" i="0" kern="1200" dirty="0">
-                <a:solidFill>
-                  <a:schemeClr val="tx1"/>
-                </a:solidFill>
-                <a:effectLst/>
-                <a:latin typeface="+mn-lt"/>
-                <a:ea typeface="+mn-ea"/>
-                <a:cs typeface="+mn-cs"/>
-              </a:rPr>
-              <a:t>FEATURE VECTOR = Bottom image = feature vector image with preprocessed data</a:t>
-            </a:r>
-          </a:p>
-          <a:p>
-            <a:pPr marL="171450" indent="-171450">
-              <a:buFont typeface="Arial" panose="020B0604020202020204" pitchFamily="34" charset="0"/>
-              <a:buChar char="•"/>
-            </a:pPr>
             <a:endParaRPr lang="en-US" dirty="0"/>
           </a:p>
           <a:p>
@@ -1930,7 +2020,7 @@
                 <a:ea typeface="+mn-ea"/>
                 <a:cs typeface="+mn-cs"/>
               </a:rPr>
-              <a:t>TRISTAN</a:t>
+              <a:t>CENTER VALUE FOR FOREGROUND WAS MUCH LARGER</a:t>
             </a:r>
           </a:p>
           <a:p>
@@ -1948,7 +2038,7 @@
                 <a:ea typeface="+mn-ea"/>
                 <a:cs typeface="+mn-cs"/>
               </a:rPr>
-              <a:t>Ran a subset of samples, Using cross validation, we can create multiple training and test sets and average the scores to give us a less biased metric.</a:t>
+              <a:t>Decision tree and RF splits the samples on the features</a:t>
             </a:r>
           </a:p>
           <a:p>
@@ -1966,61 +2056,7 @@
                 <a:ea typeface="+mn-ea"/>
                 <a:cs typeface="+mn-cs"/>
               </a:rPr>
-              <a:t>Decision trees, RF, AdaBoost ensembles doing best</a:t>
-            </a:r>
-          </a:p>
-          <a:p>
-            <a:pPr marL="171450" indent="-171450">
-              <a:buFont typeface="Arial" panose="020B0604020202020204" pitchFamily="34" charset="0"/>
-              <a:buChar char="•"/>
-            </a:pPr>
-            <a:r>
-              <a:rPr lang="en-US" sz="1200" b="0" i="0" kern="1200" dirty="0">
-                <a:solidFill>
-                  <a:schemeClr val="tx1"/>
-                </a:solidFill>
-                <a:effectLst/>
-                <a:latin typeface="+mn-lt"/>
-                <a:ea typeface="+mn-ea"/>
-                <a:cs typeface="+mn-cs"/>
-              </a:rPr>
-              <a:t>RF scaled the best with framework</a:t>
-            </a:r>
-          </a:p>
-          <a:p>
-            <a:pPr marL="171450" indent="-171450">
-              <a:buFont typeface="Arial" panose="020B0604020202020204" pitchFamily="34" charset="0"/>
-              <a:buChar char="•"/>
-            </a:pPr>
-            <a:r>
-              <a:rPr lang="en-US" sz="1200" b="0" i="0" kern="1200" dirty="0">
-                <a:solidFill>
-                  <a:schemeClr val="tx1"/>
-                </a:solidFill>
-                <a:effectLst/>
-                <a:latin typeface="+mn-lt"/>
-                <a:ea typeface="+mn-ea"/>
-                <a:cs typeface="+mn-cs"/>
-              </a:rPr>
-              <a:t>Image shows subset of samples as background or foreground</a:t>
-            </a:r>
-          </a:p>
-          <a:p>
-            <a:pPr marL="171450" indent="-171450">
-              <a:buFont typeface="Arial" panose="020B0604020202020204" pitchFamily="34" charset="0"/>
-              <a:buChar char="•"/>
-            </a:pPr>
-            <a:r>
-              <a:rPr lang="en-US" sz="1200" b="0" i="0" kern="1200" dirty="0">
-                <a:solidFill>
-                  <a:schemeClr val="tx1"/>
-                </a:solidFill>
-                <a:effectLst/>
-                <a:latin typeface="+mn-lt"/>
-                <a:ea typeface="+mn-ea"/>
-                <a:cs typeface="+mn-cs"/>
-              </a:rPr>
-              <a:t>Red = background, blue = foreground</a:t>
+              <a:t>Foreground image has a higher value than background</a:t>
             </a:r>
           </a:p>
         </p:txBody>
@@ -2051,7 +2087,7 @@
     </p:spTree>
     <p:extLst>
       <p:ext uri="{BB962C8B-B14F-4D97-AF65-F5344CB8AC3E}">
-        <p14:creationId xmlns:p14="http://schemas.microsoft.com/office/powerpoint/2010/main" val="2973449022"/>
+        <p14:creationId xmlns:p14="http://schemas.microsoft.com/office/powerpoint/2010/main" val="2775825680"/>
       </p:ext>
     </p:extLst>
   </p:cSld>
@@ -2194,8 +2230,16 @@
               <a:buChar char="•"/>
             </a:pPr>
             <a:r>
-              <a:rPr lang="en-US" dirty="0"/>
-              <a:t>ASHA</a:t>
+              <a:rPr lang="en-US" sz="1200" b="0" i="0" kern="1200" dirty="0">
+                <a:solidFill>
+                  <a:schemeClr val="tx1"/>
+                </a:solidFill>
+                <a:effectLst/>
+                <a:latin typeface="+mn-lt"/>
+                <a:ea typeface="+mn-ea"/>
+                <a:cs typeface="+mn-cs"/>
+              </a:rPr>
+              <a:t>TRISTAN</a:t>
             </a:r>
           </a:p>
           <a:p>
@@ -2204,14 +2248,17 @@
               <a:buChar char="•"/>
             </a:pPr>
             <a:r>
-              <a:rPr lang="en-US" dirty="0"/>
-              <a:t>Use following parameters – got from </a:t>
-            </a:r>
-            <a:r>
-              <a:rPr lang="en-US" dirty="0" err="1"/>
-              <a:t>paramgridbuilder</a:t>
-            </a:r>
-            <a:endParaRPr lang="en-US" dirty="0"/>
+              <a:rPr lang="en-US" sz="1200" b="0" i="0" kern="1200" dirty="0">
+                <a:solidFill>
+                  <a:schemeClr val="tx1"/>
+                </a:solidFill>
+                <a:effectLst/>
+                <a:latin typeface="+mn-lt"/>
+                <a:ea typeface="+mn-ea"/>
+                <a:cs typeface="+mn-cs"/>
+              </a:rPr>
+              <a:t>Ran a subset of samples, Using cross validation, we can create multiple training and test sets and average the scores to give us a less biased metric.</a:t>
+            </a:r>
           </a:p>
           <a:p>
             <a:pPr marL="171450" indent="-171450">
@@ -2219,8 +2266,70 @@
               <a:buChar char="•"/>
             </a:pPr>
             <a:r>
-              <a:rPr lang="en-US" dirty="0"/>
-              <a:t>Gini used since it doesn't require to compute logarithmic functions (which is calculated in entropy), which are computationally intensive.</a:t>
+              <a:rPr lang="en-US" sz="1200" b="0" i="0" kern="1200" dirty="0">
+                <a:solidFill>
+                  <a:schemeClr val="tx1"/>
+                </a:solidFill>
+                <a:effectLst/>
+                <a:latin typeface="+mn-lt"/>
+                <a:ea typeface="+mn-ea"/>
+                <a:cs typeface="+mn-cs"/>
+              </a:rPr>
+              <a:t>Decision trees, RF, AdaBoost ensembles doing best</a:t>
+            </a:r>
+          </a:p>
+          <a:p>
+            <a:pPr marL="171450" indent="-171450">
+              <a:buFont typeface="Arial" panose="020B0604020202020204" pitchFamily="34" charset="0"/>
+              <a:buChar char="•"/>
+            </a:pPr>
+            <a:r>
+              <a:rPr lang="en-US" sz="1200" b="0" i="0" kern="1200" dirty="0">
+                <a:solidFill>
+                  <a:schemeClr val="tx1"/>
+                </a:solidFill>
+                <a:effectLst/>
+                <a:latin typeface="+mn-lt"/>
+                <a:ea typeface="+mn-ea"/>
+                <a:cs typeface="+mn-cs"/>
+              </a:rPr>
+              <a:t>RF scaled the best with framework</a:t>
+            </a:r>
+          </a:p>
+          <a:p>
+            <a:pPr marL="171450" indent="-171450">
+              <a:buFont typeface="Arial" panose="020B0604020202020204" pitchFamily="34" charset="0"/>
+              <a:buChar char="•"/>
+            </a:pPr>
+            <a:r>
+              <a:rPr lang="en-US" sz="1200" b="0" i="0" kern="1200" dirty="0">
+                <a:solidFill>
+                  <a:schemeClr val="tx1"/>
+                </a:solidFill>
+                <a:effectLst/>
+                <a:latin typeface="+mn-lt"/>
+                <a:ea typeface="+mn-ea"/>
+                <a:cs typeface="+mn-cs"/>
+              </a:rPr>
+              <a:t>Image shows subset of samples as background or foreground</a:t>
+            </a:r>
+          </a:p>
+          <a:p>
+            <a:pPr marL="171450" indent="-171450">
+              <a:buFont typeface="Arial" panose="020B0604020202020204" pitchFamily="34" charset="0"/>
+              <a:buChar char="•"/>
+            </a:pPr>
+            <a:r>
+              <a:rPr lang="en-US" sz="1200" b="0" i="0" kern="1200" dirty="0">
+                <a:solidFill>
+                  <a:schemeClr val="tx1"/>
+                </a:solidFill>
+                <a:effectLst/>
+                <a:latin typeface="+mn-lt"/>
+                <a:ea typeface="+mn-ea"/>
+                <a:cs typeface="+mn-cs"/>
+              </a:rPr>
+              <a:t>Red = background, blue = foreground</a:t>
             </a:r>
           </a:p>
         </p:txBody>
@@ -2251,7 +2360,7 @@
     </p:spTree>
     <p:extLst>
       <p:ext uri="{BB962C8B-B14F-4D97-AF65-F5344CB8AC3E}">
-        <p14:creationId xmlns:p14="http://schemas.microsoft.com/office/powerpoint/2010/main" val="698586686"/>
+        <p14:creationId xmlns:p14="http://schemas.microsoft.com/office/powerpoint/2010/main" val="2973449022"/>
       </p:ext>
     </p:extLst>
   </p:cSld>
@@ -2321,8 +2430,13 @@
             </a:pPr>
             <a:r>
               <a:rPr lang="en-US" dirty="0"/>
-              <a:t>No form of randomization</a:t>
-            </a:r>
+              <a:t>Use following parameters – got from </a:t>
+            </a:r>
+            <a:r>
+              <a:rPr lang="en-US" dirty="0" err="1"/>
+              <a:t>paramgridbuilder</a:t>
+            </a:r>
+            <a:endParaRPr lang="en-US" dirty="0"/>
           </a:p>
           <a:p>
             <a:pPr marL="171450" indent="-171450">
@@ -2331,93 +2445,7 @@
             </a:pPr>
             <a:r>
               <a:rPr lang="en-US" dirty="0"/>
-              <a:t>Didn’t use cross validation from </a:t>
-            </a:r>
-            <a:r>
-              <a:rPr lang="en-US" dirty="0" err="1"/>
-              <a:t>scala</a:t>
-            </a:r>
-            <a:r>
-              <a:rPr lang="en-US" dirty="0"/>
-              <a:t> spark, we implemented ourselves</a:t>
-            </a:r>
-          </a:p>
-          <a:p>
-            <a:pPr marL="171450" indent="-171450">
-              <a:buFont typeface="Arial" panose="020B0604020202020204" pitchFamily="34" charset="0"/>
-              <a:buChar char="•"/>
-            </a:pPr>
-            <a:r>
-              <a:rPr lang="en-US" dirty="0"/>
-              <a:t>Use 1,2,3,4 and 6 </a:t>
-            </a:r>
-            <a:r>
-              <a:rPr lang="en-US" dirty="0" err="1"/>
-              <a:t>bc</a:t>
-            </a:r>
-            <a:r>
-              <a:rPr lang="en-US" dirty="0"/>
-              <a:t> we didn’t want data from test inside train (used 4 image for train, 1 for test). This way NO test sample was used during training.</a:t>
-            </a:r>
-          </a:p>
-          <a:p>
-            <a:pPr marL="171450" indent="-171450">
-              <a:buFont typeface="Arial" panose="020B0604020202020204" pitchFamily="34" charset="0"/>
-              <a:buChar char="•"/>
-            </a:pPr>
-            <a:r>
-              <a:rPr lang="en-US" dirty="0"/>
-              <a:t>Split dataset into train and test sets</a:t>
-            </a:r>
-          </a:p>
-          <a:p>
-            <a:pPr marL="171450" indent="-171450">
-              <a:buFont typeface="Arial" panose="020B0604020202020204" pitchFamily="34" charset="0"/>
-              <a:buChar char="•"/>
-            </a:pPr>
-            <a:r>
-              <a:rPr lang="en-US" dirty="0"/>
-              <a:t>Train the model</a:t>
-            </a:r>
-          </a:p>
-          <a:p>
-            <a:pPr marL="171450" indent="-171450">
-              <a:buFont typeface="Arial" panose="020B0604020202020204" pitchFamily="34" charset="0"/>
-              <a:buChar char="•"/>
-            </a:pPr>
-            <a:r>
-              <a:rPr lang="en-US" dirty="0"/>
-              <a:t>Predict with both training and testing</a:t>
-            </a:r>
-          </a:p>
-          <a:p>
-            <a:pPr marL="171450" indent="-171450">
-              <a:buFont typeface="Arial" panose="020B0604020202020204" pitchFamily="34" charset="0"/>
-              <a:buChar char="•"/>
-            </a:pPr>
-            <a:r>
-              <a:rPr lang="en-US" dirty="0"/>
-              <a:t>Measure error in the predictions (in both sets)</a:t>
-            </a:r>
-          </a:p>
-          <a:p>
-            <a:pPr marL="171450" indent="-171450">
-              <a:buFont typeface="Arial" panose="020B0604020202020204" pitchFamily="34" charset="0"/>
-              <a:buChar char="•"/>
-            </a:pPr>
-            <a:r>
-              <a:rPr lang="en-US" dirty="0"/>
-              <a:t>Compare the error of the two data sets</a:t>
-            </a:r>
-          </a:p>
-          <a:p>
-            <a:pPr marL="171450" indent="-171450">
-              <a:buFont typeface="Arial" panose="020B0604020202020204" pitchFamily="34" charset="0"/>
-              <a:buChar char="•"/>
-            </a:pPr>
-            <a:r>
-              <a:rPr lang="en-US" dirty="0"/>
-              <a:t>Trained on diff images and tested</a:t>
+              <a:t>Gini used since it doesn't require to compute logarithmic functions (which is calculated in entropy), which are computationally intensive.</a:t>
             </a:r>
           </a:p>
         </p:txBody>
@@ -2448,7 +2476,7 @@
     </p:spTree>
     <p:extLst>
       <p:ext uri="{BB962C8B-B14F-4D97-AF65-F5344CB8AC3E}">
-        <p14:creationId xmlns:p14="http://schemas.microsoft.com/office/powerpoint/2010/main" val="3104478743"/>
+        <p14:creationId xmlns:p14="http://schemas.microsoft.com/office/powerpoint/2010/main" val="698586686"/>
       </p:ext>
     </p:extLst>
   </p:cSld>
@@ -4760,6 +4788,162 @@
       </p:grpSpPr>
       <p:sp>
         <p:nvSpPr>
+          <p:cNvPr id="2" name="Title 1"/>
+          <p:cNvSpPr>
+            <a:spLocks noGrp="1"/>
+          </p:cNvSpPr>
+          <p:nvPr>
+            <p:ph type="title"/>
+          </p:nvPr>
+        </p:nvSpPr>
+        <p:spPr/>
+        <p:txBody>
+          <a:bodyPr>
+            <a:normAutofit fontScale="90000"/>
+          </a:bodyPr>
+          <a:lstStyle/>
+          <a:p>
+            <a:r>
+              <a:rPr lang="en-US" dirty="0"/>
+              <a:t>Splitting the Dataset</a:t>
+            </a:r>
+          </a:p>
+        </p:txBody>
+      </p:sp>
+      <p:sp>
+        <p:nvSpPr>
+          <p:cNvPr id="3" name="Content Placeholder 2"/>
+          <p:cNvSpPr>
+            <a:spLocks noGrp="1"/>
+          </p:cNvSpPr>
+          <p:nvPr>
+            <p:ph idx="1"/>
+          </p:nvPr>
+        </p:nvSpPr>
+        <p:spPr>
+          <a:xfrm>
+            <a:off x="457200" y="1475874"/>
+            <a:ext cx="8229600" cy="4650289"/>
+          </a:xfrm>
+        </p:spPr>
+        <p:txBody>
+          <a:bodyPr>
+            <a:normAutofit/>
+          </a:bodyPr>
+          <a:lstStyle/>
+          <a:p>
+            <a:r>
+              <a:rPr lang="en-US" dirty="0"/>
+              <a:t>Training &amp; Test data (image 1,2,3,4,6)</a:t>
+            </a:r>
+          </a:p>
+          <a:p>
+            <a:r>
+              <a:rPr lang="en-US" dirty="0"/>
+              <a:t>Validation data (image 5)</a:t>
+            </a:r>
+          </a:p>
+        </p:txBody>
+      </p:sp>
+      <p:sp>
+        <p:nvSpPr>
+          <p:cNvPr id="4" name="Date Placeholder 3"/>
+          <p:cNvSpPr>
+            <a:spLocks noGrp="1"/>
+          </p:cNvSpPr>
+          <p:nvPr>
+            <p:ph type="dt" sz="half" idx="10"/>
+          </p:nvPr>
+        </p:nvSpPr>
+        <p:spPr/>
+        <p:txBody>
+          <a:bodyPr/>
+          <a:lstStyle/>
+          <a:p>
+            <a:r>
+              <a:rPr lang="en-US" dirty="0"/>
+              <a:t>April 26, 2018</a:t>
+            </a:r>
+          </a:p>
+        </p:txBody>
+      </p:sp>
+      <p:sp>
+        <p:nvSpPr>
+          <p:cNvPr id="5" name="Footer Placeholder 4"/>
+          <p:cNvSpPr>
+            <a:spLocks noGrp="1"/>
+          </p:cNvSpPr>
+          <p:nvPr>
+            <p:ph type="ftr" sz="quarter" idx="11"/>
+          </p:nvPr>
+        </p:nvSpPr>
+        <p:spPr/>
+        <p:txBody>
+          <a:bodyPr/>
+          <a:lstStyle/>
+          <a:p>
+            <a:r>
+              <a:rPr lang="en-US" dirty="0"/>
+              <a:t>Classifying High-Resolution Brain Scans</a:t>
+            </a:r>
+          </a:p>
+        </p:txBody>
+      </p:sp>
+      <p:sp>
+        <p:nvSpPr>
+          <p:cNvPr id="6" name="Slide Number Placeholder 5"/>
+          <p:cNvSpPr>
+            <a:spLocks noGrp="1"/>
+          </p:cNvSpPr>
+          <p:nvPr>
+            <p:ph type="sldNum" sz="quarter" idx="12"/>
+          </p:nvPr>
+        </p:nvSpPr>
+        <p:spPr/>
+        <p:txBody>
+          <a:bodyPr/>
+          <a:lstStyle/>
+          <a:p>
+            <a:fld id="{A85782A5-310D-064D-97B2-7CD9DCF5F4D7}" type="slidenum">
+              <a:rPr lang="en-US" smtClean="0"/>
+              <a:t>10</a:t>
+            </a:fld>
+            <a:endParaRPr lang="en-US"/>
+          </a:p>
+        </p:txBody>
+      </p:sp>
+    </p:spTree>
+    <p:extLst>
+      <p:ext uri="{BB962C8B-B14F-4D97-AF65-F5344CB8AC3E}">
+        <p14:creationId xmlns:p14="http://schemas.microsoft.com/office/powerpoint/2010/main" val="404897761"/>
+      </p:ext>
+    </p:extLst>
+  </p:cSld>
+  <p:clrMapOvr>
+    <a:masterClrMapping/>
+  </p:clrMapOvr>
+</p:sld>
+</file>
+
+<file path=ppt/slides/slide11.xml><?xml version="1.0" encoding="utf-8"?>
+<p:sld xmlns:a="http://schemas.openxmlformats.org/drawingml/2006/main" xmlns:r="http://schemas.openxmlformats.org/officeDocument/2006/relationships" xmlns:p="http://schemas.openxmlformats.org/presentationml/2006/main">
+  <p:cSld>
+    <p:spTree>
+      <p:nvGrpSpPr>
+        <p:cNvPr id="1" name=""/>
+        <p:cNvGrpSpPr/>
+        <p:nvPr/>
+      </p:nvGrpSpPr>
+      <p:grpSpPr>
+        <a:xfrm>
+          <a:off x="0" y="0"/>
+          <a:ext cx="0" cy="0"/>
+          <a:chOff x="0" y="0"/>
+          <a:chExt cx="0" cy="0"/>
+        </a:xfrm>
+      </p:grpSpPr>
+      <p:sp>
+        <p:nvSpPr>
           <p:cNvPr id="2" name="Title 1">
             <a:extLst>
               <a:ext uri="{FF2B5EF4-FFF2-40B4-BE49-F238E27FC236}">
@@ -4788,7 +4972,7 @@
           <a:p>
             <a:r>
               <a:rPr lang="en-US" dirty="0"/>
-              <a:t>Application Pipeline</a:t>
+              <a:t>Spark Application Pipeline</a:t>
             </a:r>
           </a:p>
         </p:txBody>
@@ -4811,7 +4995,7 @@
         </p:nvSpPr>
         <p:spPr>
           <a:xfrm>
-            <a:off x="457199" y="6629040"/>
+            <a:off x="457199" y="6677166"/>
             <a:ext cx="2291085" cy="228959"/>
           </a:xfrm>
         </p:spPr>
@@ -4844,7 +5028,7 @@
         </p:nvSpPr>
         <p:spPr>
           <a:xfrm>
-            <a:off x="812385" y="6273754"/>
+            <a:off x="812385" y="6321880"/>
             <a:ext cx="7874415" cy="303487"/>
           </a:xfrm>
         </p:spPr>
@@ -4878,7 +5062,7 @@
         </p:nvSpPr>
         <p:spPr>
           <a:xfrm>
-            <a:off x="7594784" y="6630561"/>
+            <a:off x="7594784" y="6678687"/>
             <a:ext cx="1092016" cy="226932"/>
           </a:xfrm>
         </p:spPr>
@@ -4888,7 +5072,7 @@
           <a:p>
             <a:fld id="{A85782A5-310D-064D-97B2-7CD9DCF5F4D7}" type="slidenum">
               <a:rPr lang="en-US" smtClean="0"/>
-              <a:t>10</a:t>
+              <a:t>11</a:t>
             </a:fld>
             <a:endParaRPr lang="en-US"/>
           </a:p>
@@ -4908,7 +5092,7 @@
         </p:nvSpPr>
         <p:spPr>
           <a:xfrm>
-            <a:off x="4678854" y="2927663"/>
+            <a:off x="4678854" y="2975789"/>
             <a:ext cx="2727433" cy="1603745"/>
           </a:xfrm>
           <a:prstGeom prst="rect">
@@ -4968,7 +5152,7 @@
         </p:nvSpPr>
         <p:spPr>
           <a:xfrm>
-            <a:off x="1737713" y="1605450"/>
+            <a:off x="1737713" y="1653576"/>
             <a:ext cx="5668574" cy="746795"/>
           </a:xfrm>
           <a:prstGeom prst="rect">
@@ -5028,7 +5212,7 @@
         </p:nvSpPr>
         <p:spPr>
           <a:xfrm>
-            <a:off x="1696826" y="5053191"/>
+            <a:off x="1696826" y="5101317"/>
             <a:ext cx="2908875" cy="746795"/>
           </a:xfrm>
           <a:prstGeom prst="rect">
@@ -5088,7 +5272,7 @@
         </p:nvSpPr>
         <p:spPr>
           <a:xfrm rot="16200000" flipH="1">
-            <a:off x="5547453" y="4245650"/>
+            <a:off x="5547453" y="4293776"/>
             <a:ext cx="1265096" cy="1845097"/>
           </a:xfrm>
           <a:prstGeom prst="bentUpArrow">
@@ -5138,7 +5322,7 @@
         </p:nvSpPr>
         <p:spPr>
           <a:xfrm>
-            <a:off x="6698512" y="2352245"/>
+            <a:off x="6698512" y="2400371"/>
             <a:ext cx="255181" cy="575418"/>
           </a:xfrm>
           <a:prstGeom prst="downArrow">
@@ -5188,7 +5372,7 @@
         </p:nvSpPr>
         <p:spPr>
           <a:xfrm>
-            <a:off x="5990737" y="2357261"/>
+            <a:off x="5990737" y="2405387"/>
             <a:ext cx="255181" cy="575418"/>
           </a:xfrm>
           <a:prstGeom prst="downArrow">
@@ -5238,7 +5422,7 @@
         </p:nvSpPr>
         <p:spPr>
           <a:xfrm>
-            <a:off x="5257452" y="2357261"/>
+            <a:off x="5257452" y="2405387"/>
             <a:ext cx="255181" cy="575418"/>
           </a:xfrm>
           <a:prstGeom prst="downArrow">
@@ -5288,7 +5472,7 @@
         </p:nvSpPr>
         <p:spPr>
           <a:xfrm>
-            <a:off x="6698512" y="1269976"/>
+            <a:off x="6698512" y="1318102"/>
             <a:ext cx="255181" cy="324808"/>
           </a:xfrm>
           <a:prstGeom prst="downArrow">
@@ -5338,7 +5522,7 @@
         </p:nvSpPr>
         <p:spPr>
           <a:xfrm>
-            <a:off x="5990737" y="1274992"/>
+            <a:off x="5990737" y="1323118"/>
             <a:ext cx="255181" cy="324808"/>
           </a:xfrm>
           <a:prstGeom prst="downArrow">
@@ -5388,7 +5572,7 @@
         </p:nvSpPr>
         <p:spPr>
           <a:xfrm>
-            <a:off x="5257452" y="1274992"/>
+            <a:off x="5257452" y="1323118"/>
             <a:ext cx="255181" cy="324808"/>
           </a:xfrm>
           <a:prstGeom prst="downArrow">
@@ -5438,7 +5622,7 @@
         </p:nvCxnSpPr>
         <p:spPr>
           <a:xfrm>
-            <a:off x="4678854" y="1269976"/>
+            <a:off x="4678854" y="1318102"/>
             <a:ext cx="0" cy="1082269"/>
           </a:xfrm>
           <a:prstGeom prst="line">
@@ -5480,7 +5664,7 @@
         </p:nvSpPr>
         <p:spPr>
           <a:xfrm>
-            <a:off x="1715651" y="1232822"/>
+            <a:off x="1715651" y="1280948"/>
             <a:ext cx="255181" cy="324808"/>
           </a:xfrm>
           <a:prstGeom prst="downArrow">
@@ -5530,7 +5714,7 @@
         </p:nvSpPr>
         <p:spPr>
           <a:xfrm>
-            <a:off x="1133349" y="878648"/>
+            <a:off x="979021" y="992366"/>
             <a:ext cx="938783" cy="369332"/>
           </a:xfrm>
           <a:prstGeom prst="rect">
@@ -5571,7 +5755,7 @@
         </p:nvSpPr>
         <p:spPr>
           <a:xfrm>
-            <a:off x="2153968" y="1677165"/>
+            <a:off x="2153968" y="1725291"/>
             <a:ext cx="1472519" cy="646331"/>
           </a:xfrm>
           <a:prstGeom prst="rect">
@@ -5613,7 +5797,7 @@
         </p:nvSpPr>
         <p:spPr>
           <a:xfrm>
-            <a:off x="4818405" y="3508097"/>
+            <a:off x="4818405" y="3556223"/>
             <a:ext cx="2531719" cy="369332"/>
           </a:xfrm>
           <a:prstGeom prst="rect">
@@ -5648,7 +5832,7 @@
         </p:nvSpPr>
         <p:spPr>
           <a:xfrm>
-            <a:off x="5293311" y="1809978"/>
+            <a:off x="5293311" y="1858104"/>
             <a:ext cx="1833194" cy="369332"/>
           </a:xfrm>
           <a:prstGeom prst="rect">
@@ -5683,7 +5867,7 @@
         </p:nvSpPr>
         <p:spPr>
           <a:xfrm>
-            <a:off x="2029802" y="5125031"/>
+            <a:off x="2029802" y="5173157"/>
             <a:ext cx="2242922" cy="646331"/>
           </a:xfrm>
           <a:prstGeom prst="rect">
@@ -5726,7 +5910,7 @@
         </p:nvSpPr>
         <p:spPr>
           <a:xfrm>
-            <a:off x="3369991" y="5853306"/>
+            <a:off x="3369991" y="5901432"/>
             <a:ext cx="255181" cy="324808"/>
           </a:xfrm>
           <a:prstGeom prst="downArrow">
@@ -5776,7 +5960,7 @@
         </p:nvSpPr>
         <p:spPr>
           <a:xfrm>
-            <a:off x="3601892" y="5936427"/>
+            <a:off x="3601892" y="5984553"/>
             <a:ext cx="868956" cy="369332"/>
           </a:xfrm>
           <a:prstGeom prst="rect">
@@ -5815,7 +5999,7 @@
         </p:nvSpPr>
         <p:spPr>
           <a:xfrm>
-            <a:off x="2748284" y="2431784"/>
+            <a:off x="2748284" y="2479910"/>
             <a:ext cx="255181" cy="2610126"/>
           </a:xfrm>
           <a:prstGeom prst="downArrow">
@@ -5865,7 +6049,7 @@
         </p:nvSpPr>
         <p:spPr>
           <a:xfrm flipH="1" flipV="1">
-            <a:off x="2182425" y="4051907"/>
+            <a:off x="2182425" y="4100033"/>
             <a:ext cx="634309" cy="997999"/>
           </a:xfrm>
           <a:prstGeom prst="bentUpArrow">
@@ -5915,7 +6099,7 @@
         </p:nvSpPr>
         <p:spPr>
           <a:xfrm rot="10800000" flipH="1">
-            <a:off x="2935014" y="4051906"/>
+            <a:off x="2935014" y="4100032"/>
             <a:ext cx="634309" cy="988207"/>
           </a:xfrm>
           <a:prstGeom prst="bentUpArrow">
@@ -5965,7 +6149,7 @@
         </p:nvSpPr>
         <p:spPr>
           <a:xfrm>
-            <a:off x="6968932" y="1156579"/>
+            <a:off x="6968932" y="1204705"/>
             <a:ext cx="1717868" cy="369332"/>
           </a:xfrm>
           <a:prstGeom prst="rect">
@@ -6006,7 +6190,7 @@
         </p:nvSpPr>
         <p:spPr>
           <a:xfrm>
-            <a:off x="3569323" y="4570321"/>
+            <a:off x="3569323" y="4618447"/>
             <a:ext cx="1624932" cy="369332"/>
           </a:xfrm>
           <a:prstGeom prst="rect">
@@ -6045,7 +6229,7 @@
         </p:nvSpPr>
         <p:spPr>
           <a:xfrm>
-            <a:off x="7073108" y="4553319"/>
+            <a:off x="7073108" y="4601445"/>
             <a:ext cx="805029" cy="369332"/>
           </a:xfrm>
           <a:prstGeom prst="rect">
@@ -6084,7 +6268,7 @@
         </p:nvSpPr>
         <p:spPr>
           <a:xfrm>
-            <a:off x="2236835" y="1063314"/>
+            <a:off x="2236835" y="1111440"/>
             <a:ext cx="2507097" cy="523220"/>
           </a:xfrm>
           <a:prstGeom prst="rect">
@@ -6133,7 +6317,7 @@
         </p:nvSpPr>
         <p:spPr>
           <a:xfrm>
-            <a:off x="6985334" y="2409523"/>
+            <a:off x="6985334" y="2457649"/>
             <a:ext cx="1988016" cy="369332"/>
           </a:xfrm>
           <a:prstGeom prst="rect">
@@ -6174,7 +6358,7 @@
         </p:nvSpPr>
         <p:spPr>
           <a:xfrm>
-            <a:off x="7565035" y="2739137"/>
+            <a:off x="7565035" y="2787263"/>
             <a:ext cx="1121765" cy="1200329"/>
           </a:xfrm>
           <a:prstGeom prst="rect">
@@ -6214,7 +6398,7 @@
         </p:nvSpPr>
         <p:spPr>
           <a:xfrm>
-            <a:off x="126767" y="4922651"/>
+            <a:off x="126767" y="4970777"/>
             <a:ext cx="1489800" cy="923330"/>
           </a:xfrm>
           <a:prstGeom prst="rect">
@@ -6254,7 +6438,7 @@
         </p:nvSpPr>
         <p:spPr>
           <a:xfrm>
-            <a:off x="129146" y="1152109"/>
+            <a:off x="114201" y="1390918"/>
             <a:ext cx="1558435" cy="954107"/>
           </a:xfrm>
           <a:prstGeom prst="rect">
@@ -6292,7 +6476,7 @@
 </p:sld>
 </file>
 
-<file path=ppt/slides/slide11.xml><?xml version="1.0" encoding="utf-8"?>
+<file path=ppt/slides/slide12.xml><?xml version="1.0" encoding="utf-8"?>
 <p:sld xmlns:a="http://schemas.openxmlformats.org/drawingml/2006/main" xmlns:r="http://schemas.openxmlformats.org/officeDocument/2006/relationships" xmlns:p="http://schemas.openxmlformats.org/presentationml/2006/main">
   <p:cSld>
     <p:spTree>
@@ -6394,7 +6578,7 @@
           <a:p>
             <a:fld id="{A85782A5-310D-064D-97B2-7CD9DCF5F4D7}" type="slidenum">
               <a:rPr lang="en-US" smtClean="0"/>
-              <a:t>11</a:t>
+              <a:t>12</a:t>
             </a:fld>
             <a:endParaRPr lang="en-US"/>
           </a:p>
@@ -6414,7 +6598,7 @@
         </p:nvSpPr>
         <p:spPr>
           <a:xfrm>
-            <a:off x="0" y="1799772"/>
+            <a:off x="176463" y="2105338"/>
             <a:ext cx="1145542" cy="646331"/>
           </a:xfrm>
           <a:prstGeom prst="rect">
@@ -6449,7 +6633,7 @@
         </p:nvSpPr>
         <p:spPr>
           <a:xfrm>
-            <a:off x="23722" y="2924078"/>
+            <a:off x="200185" y="3229644"/>
             <a:ext cx="1244600" cy="369332"/>
           </a:xfrm>
           <a:prstGeom prst="rect">
@@ -6484,7 +6668,7 @@
         </p:nvSpPr>
         <p:spPr>
           <a:xfrm>
-            <a:off x="23722" y="3929252"/>
+            <a:off x="200185" y="4234818"/>
             <a:ext cx="1244600" cy="369332"/>
           </a:xfrm>
           <a:prstGeom prst="rect">
@@ -6519,8 +6703,8 @@
         </p:nvSpPr>
         <p:spPr>
           <a:xfrm>
-            <a:off x="1120900" y="5332370"/>
-            <a:ext cx="3724609" cy="646331"/>
+            <a:off x="5169586" y="3447769"/>
+            <a:ext cx="3443872" cy="646331"/>
           </a:xfrm>
           <a:prstGeom prst="rect">
             <a:avLst/>
@@ -6562,7 +6746,7 @@
         </p:blipFill>
         <p:spPr>
           <a:xfrm>
-            <a:off x="812385" y="1356309"/>
+            <a:off x="988848" y="1661875"/>
             <a:ext cx="3776758" cy="3915779"/>
           </a:xfrm>
           <a:prstGeom prst="rect">
@@ -6592,7 +6776,7 @@
         </p:blipFill>
         <p:spPr>
           <a:xfrm>
-            <a:off x="5391436" y="1356309"/>
+            <a:off x="4953446" y="2222670"/>
             <a:ext cx="3733354" cy="1089794"/>
           </a:xfrm>
           <a:prstGeom prst="rect">
@@ -6613,8 +6797,8 @@
           <p:nvPr/>
         </p:nvSpPr>
         <p:spPr>
-          <a:xfrm>
-            <a:off x="143872" y="4708540"/>
+          <a:xfrm rot="10800000">
+            <a:off x="4765606" y="4982068"/>
             <a:ext cx="668513" cy="589447"/>
           </a:xfrm>
           <a:prstGeom prst="rightArrow">
@@ -6657,36 +6841,6 @@
           </a:p>
         </p:txBody>
       </p:sp>
-      <p:pic>
-        <p:nvPicPr>
-          <p:cNvPr id="15" name="Picture 14">
-            <a:extLst>
-              <a:ext uri="{FF2B5EF4-FFF2-40B4-BE49-F238E27FC236}">
-                <a16:creationId xmlns:a16="http://schemas.microsoft.com/office/drawing/2014/main" id="{3F2843F9-DF95-854B-8582-3D82FB14EA42}"/>
-              </a:ext>
-            </a:extLst>
-          </p:cNvPr>
-          <p:cNvPicPr>
-            <a:picLocks noChangeAspect="1"/>
-          </p:cNvPicPr>
-          <p:nvPr/>
-        </p:nvPicPr>
-        <p:blipFill>
-          <a:blip r:embed="rId5"/>
-          <a:stretch>
-            <a:fillRect/>
-          </a:stretch>
-        </p:blipFill>
-        <p:spPr>
-          <a:xfrm>
-            <a:off x="4749592" y="2446103"/>
-            <a:ext cx="4630808" cy="3722610"/>
-          </a:xfrm>
-          <a:prstGeom prst="rect">
-            <a:avLst/>
-          </a:prstGeom>
-        </p:spPr>
-      </p:pic>
       <p:sp>
         <p:nvSpPr>
           <p:cNvPr id="3" name="TextBox 2">
@@ -6701,7 +6855,7 @@
         </p:nvSpPr>
         <p:spPr>
           <a:xfrm>
-            <a:off x="5377806" y="1101965"/>
+            <a:off x="4939816" y="1968326"/>
             <a:ext cx="2594941" cy="369332"/>
           </a:xfrm>
           <a:prstGeom prst="rect">
@@ -6736,7 +6890,7 @@
         </p:nvSpPr>
         <p:spPr>
           <a:xfrm>
-            <a:off x="824537" y="1098030"/>
+            <a:off x="1001000" y="1403596"/>
             <a:ext cx="2280624" cy="369332"/>
           </a:xfrm>
           <a:prstGeom prst="rect">
@@ -6757,131 +6911,45 @@
           </a:p>
         </p:txBody>
       </p:sp>
+      <p:sp>
+        <p:nvSpPr>
+          <p:cNvPr id="7" name="TextBox 6">
+            <a:extLst>
+              <a:ext uri="{FF2B5EF4-FFF2-40B4-BE49-F238E27FC236}">
+                <a16:creationId xmlns:a16="http://schemas.microsoft.com/office/drawing/2014/main" id="{FFC0C99F-D78B-4742-A35E-05E6C9ADCF66}"/>
+              </a:ext>
+            </a:extLst>
+          </p:cNvPr>
+          <p:cNvSpPr txBox="1"/>
+          <p:nvPr/>
+        </p:nvSpPr>
+        <p:spPr>
+          <a:xfrm>
+            <a:off x="5603492" y="5092126"/>
+            <a:ext cx="1698542" cy="369332"/>
+          </a:xfrm>
+          <a:prstGeom prst="rect">
+            <a:avLst/>
+          </a:prstGeom>
+          <a:noFill/>
+        </p:spPr>
+        <p:txBody>
+          <a:bodyPr wrap="none" rtlCol="0">
+            <a:spAutoFit/>
+          </a:bodyPr>
+          <a:lstStyle/>
+          <a:p>
+            <a:r>
+              <a:rPr lang="en-US" b="1" dirty="0"/>
+              <a:t>the best model!</a:t>
+            </a:r>
+          </a:p>
+        </p:txBody>
+      </p:sp>
     </p:spTree>
     <p:extLst>
       <p:ext uri="{BB962C8B-B14F-4D97-AF65-F5344CB8AC3E}">
         <p14:creationId xmlns:p14="http://schemas.microsoft.com/office/powerpoint/2010/main" val="4066051979"/>
-      </p:ext>
-    </p:extLst>
-  </p:cSld>
-  <p:clrMapOvr>
-    <a:masterClrMapping/>
-  </p:clrMapOvr>
-</p:sld>
-</file>
-
-<file path=ppt/slides/slide12.xml><?xml version="1.0" encoding="utf-8"?>
-<p:sld xmlns:a="http://schemas.openxmlformats.org/drawingml/2006/main" xmlns:r="http://schemas.openxmlformats.org/officeDocument/2006/relationships" xmlns:p="http://schemas.openxmlformats.org/presentationml/2006/main">
-  <p:cSld>
-    <p:spTree>
-      <p:nvGrpSpPr>
-        <p:cNvPr id="1" name=""/>
-        <p:cNvGrpSpPr/>
-        <p:nvPr/>
-      </p:nvGrpSpPr>
-      <p:grpSpPr>
-        <a:xfrm>
-          <a:off x="0" y="0"/>
-          <a:ext cx="0" cy="0"/>
-          <a:chOff x="0" y="0"/>
-          <a:chExt cx="0" cy="0"/>
-        </a:xfrm>
-      </p:grpSpPr>
-      <p:sp>
-        <p:nvSpPr>
-          <p:cNvPr id="2" name="Title 1"/>
-          <p:cNvSpPr>
-            <a:spLocks noGrp="1"/>
-          </p:cNvSpPr>
-          <p:nvPr>
-            <p:ph type="title"/>
-          </p:nvPr>
-        </p:nvSpPr>
-        <p:spPr/>
-        <p:txBody>
-          <a:bodyPr>
-            <a:normAutofit fontScale="90000"/>
-          </a:bodyPr>
-          <a:lstStyle/>
-          <a:p>
-            <a:r>
-              <a:rPr lang="en-US" dirty="0"/>
-              <a:t>Single Machine Results</a:t>
-            </a:r>
-          </a:p>
-        </p:txBody>
-      </p:sp>
-      <p:sp>
-        <p:nvSpPr>
-          <p:cNvPr id="4" name="Date Placeholder 3"/>
-          <p:cNvSpPr>
-            <a:spLocks noGrp="1"/>
-          </p:cNvSpPr>
-          <p:nvPr>
-            <p:ph type="dt" sz="half" idx="10"/>
-          </p:nvPr>
-        </p:nvSpPr>
-        <p:spPr/>
-        <p:txBody>
-          <a:bodyPr/>
-          <a:lstStyle/>
-          <a:p>
-            <a:r>
-              <a:rPr lang="en-US" dirty="0"/>
-              <a:t>April 26, 2018</a:t>
-            </a:r>
-          </a:p>
-        </p:txBody>
-      </p:sp>
-      <p:sp>
-        <p:nvSpPr>
-          <p:cNvPr id="5" name="Footer Placeholder 4"/>
-          <p:cNvSpPr>
-            <a:spLocks noGrp="1"/>
-          </p:cNvSpPr>
-          <p:nvPr>
-            <p:ph type="ftr" sz="quarter" idx="11"/>
-          </p:nvPr>
-        </p:nvSpPr>
-        <p:spPr/>
-        <p:txBody>
-          <a:bodyPr/>
-          <a:lstStyle/>
-          <a:p>
-            <a:r>
-              <a:rPr lang="en-US" dirty="0"/>
-              <a:t>Classifying High-Resolution Brain Scans</a:t>
-            </a:r>
-          </a:p>
-        </p:txBody>
-      </p:sp>
-      <p:sp>
-        <p:nvSpPr>
-          <p:cNvPr id="6" name="Slide Number Placeholder 5"/>
-          <p:cNvSpPr>
-            <a:spLocks noGrp="1"/>
-          </p:cNvSpPr>
-          <p:nvPr>
-            <p:ph type="sldNum" sz="quarter" idx="12"/>
-          </p:nvPr>
-        </p:nvSpPr>
-        <p:spPr/>
-        <p:txBody>
-          <a:bodyPr/>
-          <a:lstStyle/>
-          <a:p>
-            <a:fld id="{A85782A5-310D-064D-97B2-7CD9DCF5F4D7}" type="slidenum">
-              <a:rPr lang="en-US" smtClean="0"/>
-              <a:t>12</a:t>
-            </a:fld>
-            <a:endParaRPr lang="en-US"/>
-          </a:p>
-        </p:txBody>
-      </p:sp>
-    </p:spTree>
-    <p:extLst>
-      <p:ext uri="{BB962C8B-B14F-4D97-AF65-F5344CB8AC3E}">
-        <p14:creationId xmlns:p14="http://schemas.microsoft.com/office/powerpoint/2010/main" val="1500565145"/>
       </p:ext>
     </p:extLst>
   </p:cSld>
@@ -6913,7 +6981,7 @@
           <p:cNvPr id="2" name="Title 1">
             <a:extLst>
               <a:ext uri="{FF2B5EF4-FFF2-40B4-BE49-F238E27FC236}">
-                <a16:creationId xmlns:a16="http://schemas.microsoft.com/office/drawing/2014/main" id="{75017719-AC84-EC48-8634-0D585D1D6469}"/>
+                <a16:creationId xmlns:a16="http://schemas.microsoft.com/office/drawing/2014/main" id="{50CAC2F5-668A-894A-AEEF-31EDD50C71E4}"/>
               </a:ext>
             </a:extLst>
           </p:cNvPr>
@@ -6933,17 +7001,17 @@
           <a:p>
             <a:r>
               <a:rPr lang="en-US" dirty="0"/>
-              <a:t>Conclusion</a:t>
-            </a:r>
-          </a:p>
-        </p:txBody>
-      </p:sp>
-      <p:sp>
-        <p:nvSpPr>
-          <p:cNvPr id="3" name="Content Placeholder 2">
+              <a:t>Parallel Results – Cont.</a:t>
+            </a:r>
+          </a:p>
+        </p:txBody>
+      </p:sp>
+      <p:sp>
+        <p:nvSpPr>
+          <p:cNvPr id="4" name="Date Placeholder 3">
             <a:extLst>
               <a:ext uri="{FF2B5EF4-FFF2-40B4-BE49-F238E27FC236}">
-                <a16:creationId xmlns:a16="http://schemas.microsoft.com/office/drawing/2014/main" id="{69054E7C-2BCC-C442-BFD4-78BA3E0B6A16}"/>
+                <a16:creationId xmlns:a16="http://schemas.microsoft.com/office/drawing/2014/main" id="{0651DD29-D135-4145-A22A-BD6FB555F898}"/>
               </a:ext>
             </a:extLst>
           </p:cNvPr>
@@ -6951,7 +7019,7 @@
             <a:spLocks noGrp="1"/>
           </p:cNvSpPr>
           <p:nvPr>
-            <p:ph idx="1"/>
+            <p:ph type="dt" sz="half" idx="10"/>
           </p:nvPr>
         </p:nvSpPr>
         <p:spPr/>
@@ -6960,21 +7028,25 @@
           <a:lstStyle/>
           <a:p>
             <a:r>
-              <a:rPr lang="en-US" dirty="0"/>
-              <a:t>99.57% - Spark</a:t>
-            </a:r>
-          </a:p>
-          <a:p>
+              <a:rPr lang="en-US"/>
+              <a:t>April 26</a:t>
+            </a:r>
+          </a:p>
+          <a:p>
+            <a:r>
+              <a:rPr lang="en-US"/>
+              <a:t>, 2018</a:t>
+            </a:r>
             <a:endParaRPr lang="en-US" dirty="0"/>
           </a:p>
         </p:txBody>
       </p:sp>
       <p:sp>
         <p:nvSpPr>
-          <p:cNvPr id="4" name="Date Placeholder 3">
+          <p:cNvPr id="5" name="Footer Placeholder 4">
             <a:extLst>
               <a:ext uri="{FF2B5EF4-FFF2-40B4-BE49-F238E27FC236}">
-                <a16:creationId xmlns:a16="http://schemas.microsoft.com/office/drawing/2014/main" id="{1FFA86AD-7603-E34C-BF3E-F7DB8B2D8E43}"/>
+                <a16:creationId xmlns:a16="http://schemas.microsoft.com/office/drawing/2014/main" id="{50FF0C31-28C6-4F4A-AB5A-7088D4002862}"/>
               </a:ext>
             </a:extLst>
           </p:cNvPr>
@@ -6982,34 +7054,6 @@
             <a:spLocks noGrp="1"/>
           </p:cNvSpPr>
           <p:nvPr>
-            <p:ph type="dt" sz="half" idx="10"/>
-          </p:nvPr>
-        </p:nvSpPr>
-        <p:spPr/>
-        <p:txBody>
-          <a:bodyPr/>
-          <a:lstStyle/>
-          <a:p>
-            <a:r>
-              <a:rPr lang="en-US" dirty="0"/>
-              <a:t>April 26, 2018</a:t>
-            </a:r>
-          </a:p>
-        </p:txBody>
-      </p:sp>
-      <p:sp>
-        <p:nvSpPr>
-          <p:cNvPr id="5" name="Footer Placeholder 4">
-            <a:extLst>
-              <a:ext uri="{FF2B5EF4-FFF2-40B4-BE49-F238E27FC236}">
-                <a16:creationId xmlns:a16="http://schemas.microsoft.com/office/drawing/2014/main" id="{DCE103E8-3126-CC4D-871F-ECE83166BC19}"/>
-              </a:ext>
-            </a:extLst>
-          </p:cNvPr>
-          <p:cNvSpPr>
-            <a:spLocks noGrp="1"/>
-          </p:cNvSpPr>
-          <p:nvPr>
             <p:ph type="ftr" sz="quarter" idx="11"/>
           </p:nvPr>
         </p:nvSpPr>
@@ -7031,7 +7075,7 @@
           <p:cNvPr id="6" name="Slide Number Placeholder 5">
             <a:extLst>
               <a:ext uri="{FF2B5EF4-FFF2-40B4-BE49-F238E27FC236}">
-                <a16:creationId xmlns:a16="http://schemas.microsoft.com/office/drawing/2014/main" id="{5592808E-2182-C545-A0D1-306E3886A578}"/>
+                <a16:creationId xmlns:a16="http://schemas.microsoft.com/office/drawing/2014/main" id="{850E6C4C-E188-1B4A-B451-5182D786837D}"/>
               </a:ext>
             </a:extLst>
           </p:cNvPr>
@@ -7055,10 +7099,40 @@
           </a:p>
         </p:txBody>
       </p:sp>
+      <p:pic>
+        <p:nvPicPr>
+          <p:cNvPr id="7" name="Picture 6">
+            <a:extLst>
+              <a:ext uri="{FF2B5EF4-FFF2-40B4-BE49-F238E27FC236}">
+                <a16:creationId xmlns:a16="http://schemas.microsoft.com/office/drawing/2014/main" id="{E21E6372-DE03-0240-A3BE-F7F4674ABC4D}"/>
+              </a:ext>
+            </a:extLst>
+          </p:cNvPr>
+          <p:cNvPicPr>
+            <a:picLocks noChangeAspect="1"/>
+          </p:cNvPicPr>
+          <p:nvPr/>
+        </p:nvPicPr>
+        <p:blipFill>
+          <a:blip r:embed="rId2"/>
+          <a:stretch>
+            <a:fillRect/>
+          </a:stretch>
+        </p:blipFill>
+        <p:spPr>
+          <a:xfrm>
+            <a:off x="1542741" y="1140480"/>
+            <a:ext cx="6058517" cy="4870315"/>
+          </a:xfrm>
+          <a:prstGeom prst="rect">
+            <a:avLst/>
+          </a:prstGeom>
+        </p:spPr>
+      </p:pic>
     </p:spTree>
     <p:extLst>
       <p:ext uri="{BB962C8B-B14F-4D97-AF65-F5344CB8AC3E}">
-        <p14:creationId xmlns:p14="http://schemas.microsoft.com/office/powerpoint/2010/main" val="4239048240"/>
+        <p14:creationId xmlns:p14="http://schemas.microsoft.com/office/powerpoint/2010/main" val="4003271640"/>
       </p:ext>
     </p:extLst>
   </p:cSld>
@@ -7087,6 +7161,304 @@
       </p:grpSpPr>
       <p:sp>
         <p:nvSpPr>
+          <p:cNvPr id="2" name="Title 1"/>
+          <p:cNvSpPr>
+            <a:spLocks noGrp="1"/>
+          </p:cNvSpPr>
+          <p:nvPr>
+            <p:ph type="title"/>
+          </p:nvPr>
+        </p:nvSpPr>
+        <p:spPr/>
+        <p:txBody>
+          <a:bodyPr>
+            <a:normAutofit fontScale="90000"/>
+          </a:bodyPr>
+          <a:lstStyle/>
+          <a:p>
+            <a:r>
+              <a:rPr lang="en-US" dirty="0"/>
+              <a:t>Single Machine Results</a:t>
+            </a:r>
+          </a:p>
+        </p:txBody>
+      </p:sp>
+      <p:sp>
+        <p:nvSpPr>
+          <p:cNvPr id="4" name="Date Placeholder 3"/>
+          <p:cNvSpPr>
+            <a:spLocks noGrp="1"/>
+          </p:cNvSpPr>
+          <p:nvPr>
+            <p:ph type="dt" sz="half" idx="10"/>
+          </p:nvPr>
+        </p:nvSpPr>
+        <p:spPr/>
+        <p:txBody>
+          <a:bodyPr/>
+          <a:lstStyle/>
+          <a:p>
+            <a:r>
+              <a:rPr lang="en-US" dirty="0"/>
+              <a:t>April 26, 2018</a:t>
+            </a:r>
+          </a:p>
+        </p:txBody>
+      </p:sp>
+      <p:sp>
+        <p:nvSpPr>
+          <p:cNvPr id="5" name="Footer Placeholder 4"/>
+          <p:cNvSpPr>
+            <a:spLocks noGrp="1"/>
+          </p:cNvSpPr>
+          <p:nvPr>
+            <p:ph type="ftr" sz="quarter" idx="11"/>
+          </p:nvPr>
+        </p:nvSpPr>
+        <p:spPr/>
+        <p:txBody>
+          <a:bodyPr/>
+          <a:lstStyle/>
+          <a:p>
+            <a:r>
+              <a:rPr lang="en-US" dirty="0"/>
+              <a:t>Classifying High-Resolution Brain Scans</a:t>
+            </a:r>
+          </a:p>
+        </p:txBody>
+      </p:sp>
+      <p:sp>
+        <p:nvSpPr>
+          <p:cNvPr id="6" name="Slide Number Placeholder 5"/>
+          <p:cNvSpPr>
+            <a:spLocks noGrp="1"/>
+          </p:cNvSpPr>
+          <p:nvPr>
+            <p:ph type="sldNum" sz="quarter" idx="12"/>
+          </p:nvPr>
+        </p:nvSpPr>
+        <p:spPr/>
+        <p:txBody>
+          <a:bodyPr/>
+          <a:lstStyle/>
+          <a:p>
+            <a:fld id="{A85782A5-310D-064D-97B2-7CD9DCF5F4D7}" type="slidenum">
+              <a:rPr lang="en-US" smtClean="0"/>
+              <a:t>14</a:t>
+            </a:fld>
+            <a:endParaRPr lang="en-US"/>
+          </a:p>
+        </p:txBody>
+      </p:sp>
+    </p:spTree>
+    <p:extLst>
+      <p:ext uri="{BB962C8B-B14F-4D97-AF65-F5344CB8AC3E}">
+        <p14:creationId xmlns:p14="http://schemas.microsoft.com/office/powerpoint/2010/main" val="1500565145"/>
+      </p:ext>
+    </p:extLst>
+  </p:cSld>
+  <p:clrMapOvr>
+    <a:masterClrMapping/>
+  </p:clrMapOvr>
+</p:sld>
+</file>
+
+<file path=ppt/slides/slide15.xml><?xml version="1.0" encoding="utf-8"?>
+<p:sld xmlns:a="http://schemas.openxmlformats.org/drawingml/2006/main" xmlns:r="http://schemas.openxmlformats.org/officeDocument/2006/relationships" xmlns:p="http://schemas.openxmlformats.org/presentationml/2006/main">
+  <p:cSld>
+    <p:spTree>
+      <p:nvGrpSpPr>
+        <p:cNvPr id="1" name=""/>
+        <p:cNvGrpSpPr/>
+        <p:nvPr/>
+      </p:nvGrpSpPr>
+      <p:grpSpPr>
+        <a:xfrm>
+          <a:off x="0" y="0"/>
+          <a:ext cx="0" cy="0"/>
+          <a:chOff x="0" y="0"/>
+          <a:chExt cx="0" cy="0"/>
+        </a:xfrm>
+      </p:grpSpPr>
+      <p:sp>
+        <p:nvSpPr>
+          <p:cNvPr id="2" name="Title 1">
+            <a:extLst>
+              <a:ext uri="{FF2B5EF4-FFF2-40B4-BE49-F238E27FC236}">
+                <a16:creationId xmlns:a16="http://schemas.microsoft.com/office/drawing/2014/main" id="{75017719-AC84-EC48-8634-0D585D1D6469}"/>
+              </a:ext>
+            </a:extLst>
+          </p:cNvPr>
+          <p:cNvSpPr>
+            <a:spLocks noGrp="1"/>
+          </p:cNvSpPr>
+          <p:nvPr>
+            <p:ph type="title"/>
+          </p:nvPr>
+        </p:nvSpPr>
+        <p:spPr/>
+        <p:txBody>
+          <a:bodyPr>
+            <a:normAutofit fontScale="90000"/>
+          </a:bodyPr>
+          <a:lstStyle/>
+          <a:p>
+            <a:r>
+              <a:rPr lang="en-US" dirty="0"/>
+              <a:t>Conclusion</a:t>
+            </a:r>
+          </a:p>
+        </p:txBody>
+      </p:sp>
+      <p:sp>
+        <p:nvSpPr>
+          <p:cNvPr id="3" name="Content Placeholder 2">
+            <a:extLst>
+              <a:ext uri="{FF2B5EF4-FFF2-40B4-BE49-F238E27FC236}">
+                <a16:creationId xmlns:a16="http://schemas.microsoft.com/office/drawing/2014/main" id="{69054E7C-2BCC-C442-BFD4-78BA3E0B6A16}"/>
+              </a:ext>
+            </a:extLst>
+          </p:cNvPr>
+          <p:cNvSpPr>
+            <a:spLocks noGrp="1"/>
+          </p:cNvSpPr>
+          <p:nvPr>
+            <p:ph idx="1"/>
+          </p:nvPr>
+        </p:nvSpPr>
+        <p:spPr/>
+        <p:txBody>
+          <a:bodyPr/>
+          <a:lstStyle/>
+          <a:p>
+            <a:r>
+              <a:rPr lang="en-US" dirty="0"/>
+              <a:t>99.57% - Spark</a:t>
+            </a:r>
+          </a:p>
+          <a:p>
+            <a:endParaRPr lang="en-US" dirty="0"/>
+          </a:p>
+        </p:txBody>
+      </p:sp>
+      <p:sp>
+        <p:nvSpPr>
+          <p:cNvPr id="4" name="Date Placeholder 3">
+            <a:extLst>
+              <a:ext uri="{FF2B5EF4-FFF2-40B4-BE49-F238E27FC236}">
+                <a16:creationId xmlns:a16="http://schemas.microsoft.com/office/drawing/2014/main" id="{1FFA86AD-7603-E34C-BF3E-F7DB8B2D8E43}"/>
+              </a:ext>
+            </a:extLst>
+          </p:cNvPr>
+          <p:cNvSpPr>
+            <a:spLocks noGrp="1"/>
+          </p:cNvSpPr>
+          <p:nvPr>
+            <p:ph type="dt" sz="half" idx="10"/>
+          </p:nvPr>
+        </p:nvSpPr>
+        <p:spPr/>
+        <p:txBody>
+          <a:bodyPr/>
+          <a:lstStyle/>
+          <a:p>
+            <a:r>
+              <a:rPr lang="en-US" dirty="0"/>
+              <a:t>April 26, 2018</a:t>
+            </a:r>
+          </a:p>
+        </p:txBody>
+      </p:sp>
+      <p:sp>
+        <p:nvSpPr>
+          <p:cNvPr id="5" name="Footer Placeholder 4">
+            <a:extLst>
+              <a:ext uri="{FF2B5EF4-FFF2-40B4-BE49-F238E27FC236}">
+                <a16:creationId xmlns:a16="http://schemas.microsoft.com/office/drawing/2014/main" id="{DCE103E8-3126-CC4D-871F-ECE83166BC19}"/>
+              </a:ext>
+            </a:extLst>
+          </p:cNvPr>
+          <p:cNvSpPr>
+            <a:spLocks noGrp="1"/>
+          </p:cNvSpPr>
+          <p:nvPr>
+            <p:ph type="ftr" sz="quarter" idx="11"/>
+          </p:nvPr>
+        </p:nvSpPr>
+        <p:spPr/>
+        <p:txBody>
+          <a:bodyPr/>
+          <a:lstStyle/>
+          <a:p>
+            <a:r>
+              <a:rPr lang="en-US"/>
+              <a:t>Classifying High-Resolution Brain Scans</a:t>
+            </a:r>
+            <a:endParaRPr lang="en-US" dirty="0"/>
+          </a:p>
+        </p:txBody>
+      </p:sp>
+      <p:sp>
+        <p:nvSpPr>
+          <p:cNvPr id="6" name="Slide Number Placeholder 5">
+            <a:extLst>
+              <a:ext uri="{FF2B5EF4-FFF2-40B4-BE49-F238E27FC236}">
+                <a16:creationId xmlns:a16="http://schemas.microsoft.com/office/drawing/2014/main" id="{5592808E-2182-C545-A0D1-306E3886A578}"/>
+              </a:ext>
+            </a:extLst>
+          </p:cNvPr>
+          <p:cNvSpPr>
+            <a:spLocks noGrp="1"/>
+          </p:cNvSpPr>
+          <p:nvPr>
+            <p:ph type="sldNum" sz="quarter" idx="12"/>
+          </p:nvPr>
+        </p:nvSpPr>
+        <p:spPr/>
+        <p:txBody>
+          <a:bodyPr/>
+          <a:lstStyle/>
+          <a:p>
+            <a:fld id="{A85782A5-310D-064D-97B2-7CD9DCF5F4D7}" type="slidenum">
+              <a:rPr lang="en-US" smtClean="0"/>
+              <a:t>15</a:t>
+            </a:fld>
+            <a:endParaRPr lang="en-US"/>
+          </a:p>
+        </p:txBody>
+      </p:sp>
+    </p:spTree>
+    <p:extLst>
+      <p:ext uri="{BB962C8B-B14F-4D97-AF65-F5344CB8AC3E}">
+        <p14:creationId xmlns:p14="http://schemas.microsoft.com/office/powerpoint/2010/main" val="4239048240"/>
+      </p:ext>
+    </p:extLst>
+  </p:cSld>
+  <p:clrMapOvr>
+    <a:masterClrMapping/>
+  </p:clrMapOvr>
+</p:sld>
+</file>
+
+<file path=ppt/slides/slide16.xml><?xml version="1.0" encoding="utf-8"?>
+<p:sld xmlns:a="http://schemas.openxmlformats.org/drawingml/2006/main" xmlns:r="http://schemas.openxmlformats.org/officeDocument/2006/relationships" xmlns:p="http://schemas.openxmlformats.org/presentationml/2006/main">
+  <p:cSld>
+    <p:spTree>
+      <p:nvGrpSpPr>
+        <p:cNvPr id="1" name=""/>
+        <p:cNvGrpSpPr/>
+        <p:nvPr/>
+      </p:nvGrpSpPr>
+      <p:grpSpPr>
+        <a:xfrm>
+          <a:off x="0" y="0"/>
+          <a:ext cx="0" cy="0"/>
+          <a:chOff x="0" y="0"/>
+          <a:chExt cx="0" cy="0"/>
+        </a:xfrm>
+      </p:grpSpPr>
+      <p:sp>
+        <p:nvSpPr>
           <p:cNvPr id="10" name="Title 9"/>
           <p:cNvSpPr>
             <a:spLocks noGrp="1"/>
@@ -7228,7 +7600,7 @@
           <a:p>
             <a:fld id="{A85782A5-310D-064D-97B2-7CD9DCF5F4D7}" type="slidenum">
               <a:rPr lang="en-US" smtClean="0"/>
-              <a:t>14</a:t>
+              <a:t>16</a:t>
             </a:fld>
             <a:endParaRPr lang="en-US"/>
           </a:p>
@@ -7319,19 +7691,27 @@
           <a:p>
             <a:r>
               <a:rPr lang="en-US" sz="2200" dirty="0"/>
-              <a:t>6 csv files, roughly 6.5GB (image 5 is predicted)</a:t>
-            </a:r>
-          </a:p>
-          <a:p>
+              <a:t>6 csv files, roughly 6.5GB (image 5 is for prediction)</a:t>
+            </a:r>
+          </a:p>
+          <a:p>
+            <a:r>
+              <a:rPr lang="en-US" sz="2200" b="1" dirty="0"/>
+              <a:t>Rows</a:t>
+            </a:r>
             <a:r>
               <a:rPr lang="en-US" sz="2200" dirty="0"/>
-              <a:t>Rows: input vector of 21x21x7 brightness values (intensity) from a 3D image</a:t>
-            </a:r>
-          </a:p>
-          <a:p>
+              <a:t>: input vector of 21x21x7 brightness values (intensity) from a 3D image</a:t>
+            </a:r>
+          </a:p>
+          <a:p>
+            <a:r>
+              <a:rPr lang="en-US" sz="2200" b="1" dirty="0"/>
+              <a:t>Label</a:t>
+            </a:r>
             <a:r>
               <a:rPr lang="en-US" sz="2200" dirty="0"/>
-              <a:t>Label (the last value): Center pixel’s foreground vs background</a:t>
+              <a:t>: Center pixel’s foreground (1) vs background (0)</a:t>
             </a:r>
           </a:p>
           <a:p>
@@ -7575,6 +7955,20 @@
           <a:bodyPr/>
           <a:lstStyle/>
           <a:p>
+            <a:r>
+              <a:rPr lang="en-US" dirty="0"/>
+              <a:t>Apache Spark is a fast and general engine for large-scale data processing</a:t>
+            </a:r>
+          </a:p>
+          <a:p>
+            <a:r>
+              <a:rPr lang="en-US" dirty="0"/>
+              <a:t>Parallel approach to Machine Learning - </a:t>
+            </a:r>
+            <a:r>
+              <a:rPr lang="en-US" dirty="0" err="1"/>
+              <a:t>MLLib</a:t>
+            </a:r>
             <a:endParaRPr lang="en-US" dirty="0"/>
           </a:p>
         </p:txBody>
@@ -7978,8 +8372,8 @@
         </p:nvSpPr>
         <p:spPr>
           <a:xfrm>
-            <a:off x="61189" y="3023943"/>
-            <a:ext cx="1541552" cy="923330"/>
+            <a:off x="457199" y="3784232"/>
+            <a:ext cx="6667857" cy="369332"/>
           </a:xfrm>
           <a:prstGeom prst="rect">
             <a:avLst/>
@@ -8002,13 +8396,7 @@
             </a:r>
             <a:r>
               <a:rPr lang="en-US" b="1" dirty="0"/>
-              <a:t> plane</a:t>
-            </a:r>
-          </a:p>
-          <a:p>
-            <a:r>
-              <a:rPr lang="en-US" b="1" dirty="0"/>
-              <a:t>(1 of 7 slices)</a:t>
+              <a:t> plane (1 of 7 slices)</a:t>
             </a:r>
           </a:p>
         </p:txBody>
@@ -8027,8 +8415,8 @@
         </p:nvSpPr>
         <p:spPr>
           <a:xfrm>
-            <a:off x="105504" y="1399038"/>
-            <a:ext cx="1452922" cy="923330"/>
+            <a:off x="451324" y="1314638"/>
+            <a:ext cx="6178065" cy="369332"/>
           </a:xfrm>
           <a:prstGeom prst="rect">
             <a:avLst/>
@@ -8051,13 +8439,7 @@
             </a:r>
             <a:r>
               <a:rPr lang="en-US" b="1" dirty="0"/>
-              <a:t> plane</a:t>
-            </a:r>
-          </a:p>
-          <a:p>
-            <a:r>
-              <a:rPr lang="en-US" b="1" dirty="0"/>
-              <a:t>(1 of 7 slices)</a:t>
+              <a:t> plane (1 of 7 slices)</a:t>
             </a:r>
           </a:p>
         </p:txBody>
@@ -8084,8 +8466,8 @@
         </p:blipFill>
         <p:spPr>
           <a:xfrm>
-            <a:off x="1602741" y="2769866"/>
-            <a:ext cx="6672047" cy="1706357"/>
+            <a:off x="451324" y="4139933"/>
+            <a:ext cx="8229601" cy="1982287"/>
           </a:xfrm>
           <a:prstGeom prst="rect">
             <a:avLst/>
@@ -8114,112 +8496,14 @@
         </p:blipFill>
         <p:spPr>
           <a:xfrm>
-            <a:off x="1602741" y="1118254"/>
-            <a:ext cx="6599721" cy="1665765"/>
+            <a:off x="457199" y="1686401"/>
+            <a:ext cx="8272388" cy="1945192"/>
           </a:xfrm>
           <a:prstGeom prst="rect">
             <a:avLst/>
           </a:prstGeom>
         </p:spPr>
       </p:pic>
-      <p:pic>
-        <p:nvPicPr>
-          <p:cNvPr id="21" name="Picture 20">
-            <a:extLst>
-              <a:ext uri="{FF2B5EF4-FFF2-40B4-BE49-F238E27FC236}">
-                <a16:creationId xmlns:a16="http://schemas.microsoft.com/office/drawing/2014/main" id="{2D70933C-CB34-8448-81C5-8C5F1DCBACC1}"/>
-              </a:ext>
-            </a:extLst>
-          </p:cNvPr>
-          <p:cNvPicPr>
-            <a:picLocks noChangeAspect="1"/>
-          </p:cNvPicPr>
-          <p:nvPr/>
-        </p:nvPicPr>
-        <p:blipFill>
-          <a:blip r:embed="rId5"/>
-          <a:stretch>
-            <a:fillRect/>
-          </a:stretch>
-        </p:blipFill>
-        <p:spPr>
-          <a:xfrm>
-            <a:off x="1441767" y="4462857"/>
-            <a:ext cx="3444931" cy="1703058"/>
-          </a:xfrm>
-          <a:prstGeom prst="rect">
-            <a:avLst/>
-          </a:prstGeom>
-        </p:spPr>
-      </p:pic>
-      <p:pic>
-        <p:nvPicPr>
-          <p:cNvPr id="22" name="Picture 21">
-            <a:extLst>
-              <a:ext uri="{FF2B5EF4-FFF2-40B4-BE49-F238E27FC236}">
-                <a16:creationId xmlns:a16="http://schemas.microsoft.com/office/drawing/2014/main" id="{711F83DE-7BD3-DA40-BA2B-3C9AF397B779}"/>
-              </a:ext>
-            </a:extLst>
-          </p:cNvPr>
-          <p:cNvPicPr>
-            <a:picLocks noChangeAspect="1"/>
-          </p:cNvPicPr>
-          <p:nvPr/>
-        </p:nvPicPr>
-        <p:blipFill>
-          <a:blip r:embed="rId6"/>
-          <a:stretch>
-            <a:fillRect/>
-          </a:stretch>
-        </p:blipFill>
-        <p:spPr>
-          <a:xfrm>
-            <a:off x="5176292" y="5184639"/>
-            <a:ext cx="3825984" cy="945668"/>
-          </a:xfrm>
-          <a:prstGeom prst="rect">
-            <a:avLst/>
-          </a:prstGeom>
-        </p:spPr>
-      </p:pic>
-      <p:sp>
-        <p:nvSpPr>
-          <p:cNvPr id="23" name="TextBox 22">
-            <a:extLst>
-              <a:ext uri="{FF2B5EF4-FFF2-40B4-BE49-F238E27FC236}">
-                <a16:creationId xmlns:a16="http://schemas.microsoft.com/office/drawing/2014/main" id="{6BF6BB73-66F7-6742-8F19-94D7854651A7}"/>
-              </a:ext>
-            </a:extLst>
-          </p:cNvPr>
-          <p:cNvSpPr txBox="1"/>
-          <p:nvPr/>
-        </p:nvSpPr>
-        <p:spPr>
-          <a:xfrm>
-            <a:off x="5011050" y="4834814"/>
-            <a:ext cx="3991226" cy="646331"/>
-          </a:xfrm>
-          <a:prstGeom prst="rect">
-            <a:avLst/>
-          </a:prstGeom>
-          <a:noFill/>
-        </p:spPr>
-        <p:txBody>
-          <a:bodyPr wrap="square" rtlCol="0">
-            <a:spAutoFit/>
-          </a:bodyPr>
-          <a:lstStyle/>
-          <a:p>
-            <a:r>
-              <a:rPr lang="en-US" b="1" dirty="0"/>
-              <a:t>Feature Vector of Preprocessed Data:</a:t>
-            </a:r>
-          </a:p>
-          <a:p>
-            <a:endParaRPr lang="en-US" b="1" dirty="0"/>
-          </a:p>
-        </p:txBody>
-      </p:sp>
     </p:spTree>
     <p:extLst>
       <p:ext uri="{BB962C8B-B14F-4D97-AF65-F5344CB8AC3E}">
@@ -8252,6 +8536,404 @@
       </p:grpSpPr>
       <p:sp>
         <p:nvSpPr>
+          <p:cNvPr id="2" name="Title 1">
+            <a:extLst>
+              <a:ext uri="{FF2B5EF4-FFF2-40B4-BE49-F238E27FC236}">
+                <a16:creationId xmlns:a16="http://schemas.microsoft.com/office/drawing/2014/main" id="{E51A6640-EAEC-C14E-B69E-1320A4674EBC}"/>
+              </a:ext>
+            </a:extLst>
+          </p:cNvPr>
+          <p:cNvSpPr>
+            <a:spLocks noGrp="1"/>
+          </p:cNvSpPr>
+          <p:nvPr>
+            <p:ph type="title"/>
+          </p:nvPr>
+        </p:nvSpPr>
+        <p:spPr/>
+        <p:txBody>
+          <a:bodyPr>
+            <a:normAutofit fontScale="90000"/>
+          </a:bodyPr>
+          <a:lstStyle/>
+          <a:p>
+            <a:r>
+              <a:rPr lang="en-US" dirty="0"/>
+              <a:t>Feature Extraction</a:t>
+            </a:r>
+          </a:p>
+        </p:txBody>
+      </p:sp>
+      <p:sp>
+        <p:nvSpPr>
+          <p:cNvPr id="3" name="Date Placeholder 2">
+            <a:extLst>
+              <a:ext uri="{FF2B5EF4-FFF2-40B4-BE49-F238E27FC236}">
+                <a16:creationId xmlns:a16="http://schemas.microsoft.com/office/drawing/2014/main" id="{52D7EC0D-1644-AB46-9830-5E5A4EBEC582}"/>
+              </a:ext>
+            </a:extLst>
+          </p:cNvPr>
+          <p:cNvSpPr>
+            <a:spLocks noGrp="1"/>
+          </p:cNvSpPr>
+          <p:nvPr>
+            <p:ph type="dt" sz="half" idx="10"/>
+          </p:nvPr>
+        </p:nvSpPr>
+        <p:spPr/>
+        <p:txBody>
+          <a:bodyPr/>
+          <a:lstStyle/>
+          <a:p>
+            <a:r>
+              <a:rPr lang="en-US"/>
+              <a:t>April 26, 2018</a:t>
+            </a:r>
+            <a:endParaRPr lang="en-US" dirty="0"/>
+          </a:p>
+        </p:txBody>
+      </p:sp>
+      <p:sp>
+        <p:nvSpPr>
+          <p:cNvPr id="4" name="Footer Placeholder 3">
+            <a:extLst>
+              <a:ext uri="{FF2B5EF4-FFF2-40B4-BE49-F238E27FC236}">
+                <a16:creationId xmlns:a16="http://schemas.microsoft.com/office/drawing/2014/main" id="{9DB7DCD0-FB85-C94E-B9F2-631BC514C7E7}"/>
+              </a:ext>
+            </a:extLst>
+          </p:cNvPr>
+          <p:cNvSpPr>
+            <a:spLocks noGrp="1"/>
+          </p:cNvSpPr>
+          <p:nvPr>
+            <p:ph type="ftr" sz="quarter" idx="11"/>
+          </p:nvPr>
+        </p:nvSpPr>
+        <p:spPr/>
+        <p:txBody>
+          <a:bodyPr/>
+          <a:lstStyle/>
+          <a:p>
+            <a:r>
+              <a:rPr lang="en-US"/>
+              <a:t>Classifying High-Resolution Brain Scans</a:t>
+            </a:r>
+            <a:endParaRPr lang="en-US" dirty="0"/>
+          </a:p>
+        </p:txBody>
+      </p:sp>
+      <p:sp>
+        <p:nvSpPr>
+          <p:cNvPr id="5" name="Slide Number Placeholder 4">
+            <a:extLst>
+              <a:ext uri="{FF2B5EF4-FFF2-40B4-BE49-F238E27FC236}">
+                <a16:creationId xmlns:a16="http://schemas.microsoft.com/office/drawing/2014/main" id="{C6B713C6-D2A0-444B-B49C-763CB4381C50}"/>
+              </a:ext>
+            </a:extLst>
+          </p:cNvPr>
+          <p:cNvSpPr>
+            <a:spLocks noGrp="1"/>
+          </p:cNvSpPr>
+          <p:nvPr>
+            <p:ph type="sldNum" sz="quarter" idx="12"/>
+          </p:nvPr>
+        </p:nvSpPr>
+        <p:spPr/>
+        <p:txBody>
+          <a:bodyPr/>
+          <a:lstStyle/>
+          <a:p>
+            <a:fld id="{A85782A5-310D-064D-97B2-7CD9DCF5F4D7}" type="slidenum">
+              <a:rPr lang="en-US" smtClean="0"/>
+              <a:pPr/>
+              <a:t>6</a:t>
+            </a:fld>
+            <a:endParaRPr lang="en-US" dirty="0"/>
+          </a:p>
+        </p:txBody>
+      </p:sp>
+      <p:pic>
+        <p:nvPicPr>
+          <p:cNvPr id="6" name="Picture 5">
+            <a:extLst>
+              <a:ext uri="{FF2B5EF4-FFF2-40B4-BE49-F238E27FC236}">
+                <a16:creationId xmlns:a16="http://schemas.microsoft.com/office/drawing/2014/main" id="{CA58B650-751F-1F4A-9F43-96B9BB4763EC}"/>
+              </a:ext>
+            </a:extLst>
+          </p:cNvPr>
+          <p:cNvPicPr>
+            <a:picLocks noChangeAspect="1"/>
+          </p:cNvPicPr>
+          <p:nvPr/>
+        </p:nvPicPr>
+        <p:blipFill>
+          <a:blip r:embed="rId3"/>
+          <a:stretch>
+            <a:fillRect/>
+          </a:stretch>
+        </p:blipFill>
+        <p:spPr>
+          <a:xfrm>
+            <a:off x="2748284" y="5009726"/>
+            <a:ext cx="3825984" cy="945668"/>
+          </a:xfrm>
+          <a:prstGeom prst="rect">
+            <a:avLst/>
+          </a:prstGeom>
+        </p:spPr>
+      </p:pic>
+      <p:sp>
+        <p:nvSpPr>
+          <p:cNvPr id="7" name="TextBox 6">
+            <a:extLst>
+              <a:ext uri="{FF2B5EF4-FFF2-40B4-BE49-F238E27FC236}">
+                <a16:creationId xmlns:a16="http://schemas.microsoft.com/office/drawing/2014/main" id="{F675031C-3C7A-FB47-B2CA-EF110A2AD0E7}"/>
+              </a:ext>
+            </a:extLst>
+          </p:cNvPr>
+          <p:cNvSpPr txBox="1"/>
+          <p:nvPr/>
+        </p:nvSpPr>
+        <p:spPr>
+          <a:xfrm>
+            <a:off x="2583042" y="4659901"/>
+            <a:ext cx="3991226" cy="646331"/>
+          </a:xfrm>
+          <a:prstGeom prst="rect">
+            <a:avLst/>
+          </a:prstGeom>
+          <a:noFill/>
+        </p:spPr>
+        <p:txBody>
+          <a:bodyPr wrap="square" rtlCol="0">
+            <a:spAutoFit/>
+          </a:bodyPr>
+          <a:lstStyle/>
+          <a:p>
+            <a:r>
+              <a:rPr lang="en-US" b="1" dirty="0"/>
+              <a:t>Feature Vector of Preprocessed Data:</a:t>
+            </a:r>
+          </a:p>
+          <a:p>
+            <a:endParaRPr lang="en-US" b="1" dirty="0"/>
+          </a:p>
+        </p:txBody>
+      </p:sp>
+      <p:pic>
+        <p:nvPicPr>
+          <p:cNvPr id="8" name="Picture 7">
+            <a:extLst>
+              <a:ext uri="{FF2B5EF4-FFF2-40B4-BE49-F238E27FC236}">
+                <a16:creationId xmlns:a16="http://schemas.microsoft.com/office/drawing/2014/main" id="{614A54B4-E9B7-1642-9F12-17ADF325D5FC}"/>
+              </a:ext>
+            </a:extLst>
+          </p:cNvPr>
+          <p:cNvPicPr>
+            <a:picLocks noChangeAspect="1"/>
+          </p:cNvPicPr>
+          <p:nvPr/>
+        </p:nvPicPr>
+        <p:blipFill>
+          <a:blip r:embed="rId4"/>
+          <a:stretch>
+            <a:fillRect/>
+          </a:stretch>
+        </p:blipFill>
+        <p:spPr>
+          <a:xfrm>
+            <a:off x="1673080" y="1587040"/>
+            <a:ext cx="5571782" cy="2754501"/>
+          </a:xfrm>
+          <a:prstGeom prst="rect">
+            <a:avLst/>
+          </a:prstGeom>
+        </p:spPr>
+      </p:pic>
+    </p:spTree>
+    <p:extLst>
+      <p:ext uri="{BB962C8B-B14F-4D97-AF65-F5344CB8AC3E}">
+        <p14:creationId xmlns:p14="http://schemas.microsoft.com/office/powerpoint/2010/main" val="1806456493"/>
+      </p:ext>
+    </p:extLst>
+  </p:cSld>
+  <p:clrMapOvr>
+    <a:masterClrMapping/>
+  </p:clrMapOvr>
+</p:sld>
+</file>
+
+<file path=ppt/slides/slide7.xml><?xml version="1.0" encoding="utf-8"?>
+<p:sld xmlns:a="http://schemas.openxmlformats.org/drawingml/2006/main" xmlns:r="http://schemas.openxmlformats.org/officeDocument/2006/relationships" xmlns:p="http://schemas.openxmlformats.org/presentationml/2006/main">
+  <p:cSld>
+    <p:spTree>
+      <p:nvGrpSpPr>
+        <p:cNvPr id="1" name=""/>
+        <p:cNvGrpSpPr/>
+        <p:nvPr/>
+      </p:nvGrpSpPr>
+      <p:grpSpPr>
+        <a:xfrm>
+          <a:off x="0" y="0"/>
+          <a:ext cx="0" cy="0"/>
+          <a:chOff x="0" y="0"/>
+          <a:chExt cx="0" cy="0"/>
+        </a:xfrm>
+      </p:grpSpPr>
+      <p:sp>
+        <p:nvSpPr>
+          <p:cNvPr id="2" name="Title 1">
+            <a:extLst>
+              <a:ext uri="{FF2B5EF4-FFF2-40B4-BE49-F238E27FC236}">
+                <a16:creationId xmlns:a16="http://schemas.microsoft.com/office/drawing/2014/main" id="{B71D9872-CE0B-7C4F-AE1F-471D79FB2122}"/>
+              </a:ext>
+            </a:extLst>
+          </p:cNvPr>
+          <p:cNvSpPr>
+            <a:spLocks noGrp="1"/>
+          </p:cNvSpPr>
+          <p:nvPr>
+            <p:ph type="title"/>
+          </p:nvPr>
+        </p:nvSpPr>
+        <p:spPr>
+          <a:xfrm>
+            <a:off x="634792" y="2313432"/>
+            <a:ext cx="8229600" cy="1344167"/>
+          </a:xfrm>
+        </p:spPr>
+        <p:txBody>
+          <a:bodyPr>
+            <a:normAutofit/>
+          </a:bodyPr>
+          <a:lstStyle/>
+          <a:p>
+            <a:r>
+              <a:rPr lang="en-US" dirty="0"/>
+              <a:t>Model &amp; Results</a:t>
+            </a:r>
+          </a:p>
+        </p:txBody>
+      </p:sp>
+      <p:sp>
+        <p:nvSpPr>
+          <p:cNvPr id="3" name="Date Placeholder 2">
+            <a:extLst>
+              <a:ext uri="{FF2B5EF4-FFF2-40B4-BE49-F238E27FC236}">
+                <a16:creationId xmlns:a16="http://schemas.microsoft.com/office/drawing/2014/main" id="{CD148C30-E7AE-384B-8149-C970B06234A7}"/>
+              </a:ext>
+            </a:extLst>
+          </p:cNvPr>
+          <p:cNvSpPr>
+            <a:spLocks noGrp="1"/>
+          </p:cNvSpPr>
+          <p:nvPr>
+            <p:ph type="dt" sz="half" idx="10"/>
+          </p:nvPr>
+        </p:nvSpPr>
+        <p:spPr/>
+        <p:txBody>
+          <a:bodyPr/>
+          <a:lstStyle/>
+          <a:p>
+            <a:r>
+              <a:rPr lang="en-US" dirty="0"/>
+              <a:t>April 26, 2018</a:t>
+            </a:r>
+          </a:p>
+        </p:txBody>
+      </p:sp>
+      <p:sp>
+        <p:nvSpPr>
+          <p:cNvPr id="4" name="Footer Placeholder 3">
+            <a:extLst>
+              <a:ext uri="{FF2B5EF4-FFF2-40B4-BE49-F238E27FC236}">
+                <a16:creationId xmlns:a16="http://schemas.microsoft.com/office/drawing/2014/main" id="{F778F496-B983-7440-AE28-05D9A7EC6156}"/>
+              </a:ext>
+            </a:extLst>
+          </p:cNvPr>
+          <p:cNvSpPr>
+            <a:spLocks noGrp="1"/>
+          </p:cNvSpPr>
+          <p:nvPr>
+            <p:ph type="ftr" sz="quarter" idx="11"/>
+          </p:nvPr>
+        </p:nvSpPr>
+        <p:spPr/>
+        <p:txBody>
+          <a:bodyPr/>
+          <a:lstStyle/>
+          <a:p>
+            <a:r>
+              <a:rPr lang="en-US"/>
+              <a:t>Classifying High-Resolution Brain Scans</a:t>
+            </a:r>
+            <a:endParaRPr lang="en-US" dirty="0"/>
+          </a:p>
+        </p:txBody>
+      </p:sp>
+      <p:sp>
+        <p:nvSpPr>
+          <p:cNvPr id="5" name="Slide Number Placeholder 4">
+            <a:extLst>
+              <a:ext uri="{FF2B5EF4-FFF2-40B4-BE49-F238E27FC236}">
+                <a16:creationId xmlns:a16="http://schemas.microsoft.com/office/drawing/2014/main" id="{7352E32E-D968-0A4C-876C-5B38829E1E5B}"/>
+              </a:ext>
+            </a:extLst>
+          </p:cNvPr>
+          <p:cNvSpPr>
+            <a:spLocks noGrp="1"/>
+          </p:cNvSpPr>
+          <p:nvPr>
+            <p:ph type="sldNum" sz="quarter" idx="12"/>
+          </p:nvPr>
+        </p:nvSpPr>
+        <p:spPr/>
+        <p:txBody>
+          <a:bodyPr/>
+          <a:lstStyle/>
+          <a:p>
+            <a:fld id="{A85782A5-310D-064D-97B2-7CD9DCF5F4D7}" type="slidenum">
+              <a:rPr lang="en-US" smtClean="0"/>
+              <a:pPr/>
+              <a:t>7</a:t>
+            </a:fld>
+            <a:endParaRPr lang="en-US" dirty="0"/>
+          </a:p>
+        </p:txBody>
+      </p:sp>
+    </p:spTree>
+    <p:extLst>
+      <p:ext uri="{BB962C8B-B14F-4D97-AF65-F5344CB8AC3E}">
+        <p14:creationId xmlns:p14="http://schemas.microsoft.com/office/powerpoint/2010/main" val="1884191572"/>
+      </p:ext>
+    </p:extLst>
+  </p:cSld>
+  <p:clrMapOvr>
+    <a:masterClrMapping/>
+  </p:clrMapOvr>
+</p:sld>
+</file>
+
+<file path=ppt/slides/slide8.xml><?xml version="1.0" encoding="utf-8"?>
+<p:sld xmlns:a="http://schemas.openxmlformats.org/drawingml/2006/main" xmlns:r="http://schemas.openxmlformats.org/officeDocument/2006/relationships" xmlns:p="http://schemas.openxmlformats.org/presentationml/2006/main">
+  <p:cSld>
+    <p:spTree>
+      <p:nvGrpSpPr>
+        <p:cNvPr id="1" name=""/>
+        <p:cNvGrpSpPr/>
+        <p:nvPr/>
+      </p:nvGrpSpPr>
+      <p:grpSpPr>
+        <a:xfrm>
+          <a:off x="0" y="0"/>
+          <a:ext cx="0" cy="0"/>
+          <a:chOff x="0" y="0"/>
+          <a:chExt cx="0" cy="0"/>
+        </a:xfrm>
+      </p:grpSpPr>
+      <p:sp>
+        <p:nvSpPr>
           <p:cNvPr id="2" name="Title 1"/>
           <p:cNvSpPr>
             <a:spLocks noGrp="1"/>
@@ -8397,7 +9079,7 @@
           <a:p>
             <a:fld id="{A85782A5-310D-064D-97B2-7CD9DCF5F4D7}" type="slidenum">
               <a:rPr lang="en-US" smtClean="0"/>
-              <a:t>6</a:t>
+              <a:t>8</a:t>
             </a:fld>
             <a:endParaRPr lang="en-US"/>
           </a:p>
@@ -8523,377 +9205,49 @@
           </a:prstGeom>
         </p:spPr>
       </p:pic>
+      <p:sp>
+        <p:nvSpPr>
+          <p:cNvPr id="9" name="TextBox 8">
+            <a:extLst>
+              <a:ext uri="{FF2B5EF4-FFF2-40B4-BE49-F238E27FC236}">
+                <a16:creationId xmlns:a16="http://schemas.microsoft.com/office/drawing/2014/main" id="{B2FC238B-67AD-D14D-A4E1-524589D23FC4}"/>
+              </a:ext>
+            </a:extLst>
+          </p:cNvPr>
+          <p:cNvSpPr txBox="1"/>
+          <p:nvPr/>
+        </p:nvSpPr>
+        <p:spPr>
+          <a:xfrm>
+            <a:off x="457199" y="1909011"/>
+            <a:ext cx="2833148" cy="369332"/>
+          </a:xfrm>
+          <a:prstGeom prst="rect">
+            <a:avLst/>
+          </a:prstGeom>
+          <a:noFill/>
+        </p:spPr>
+        <p:txBody>
+          <a:bodyPr wrap="none" rtlCol="0">
+            <a:spAutoFit/>
+          </a:bodyPr>
+          <a:lstStyle/>
+          <a:p>
+            <a:pPr marL="285750" indent="-285750">
+              <a:buFont typeface="Arial" panose="020B0604020202020204" pitchFamily="34" charset="0"/>
+              <a:buChar char="•"/>
+            </a:pPr>
+            <a:r>
+              <a:rPr lang="en-US" dirty="0"/>
+              <a:t>Available in Spark ML API</a:t>
+            </a:r>
+          </a:p>
+        </p:txBody>
+      </p:sp>
     </p:spTree>
     <p:extLst>
       <p:ext uri="{BB962C8B-B14F-4D97-AF65-F5344CB8AC3E}">
         <p14:creationId xmlns:p14="http://schemas.microsoft.com/office/powerpoint/2010/main" val="1456638104"/>
-      </p:ext>
-    </p:extLst>
-  </p:cSld>
-  <p:clrMapOvr>
-    <a:masterClrMapping/>
-  </p:clrMapOvr>
-</p:sld>
-</file>
-
-<file path=ppt/slides/slide7.xml><?xml version="1.0" encoding="utf-8"?>
-<p:sld xmlns:a="http://schemas.openxmlformats.org/drawingml/2006/main" xmlns:r="http://schemas.openxmlformats.org/officeDocument/2006/relationships" xmlns:p="http://schemas.openxmlformats.org/presentationml/2006/main">
-  <p:cSld>
-    <p:spTree>
-      <p:nvGrpSpPr>
-        <p:cNvPr id="1" name=""/>
-        <p:cNvGrpSpPr/>
-        <p:nvPr/>
-      </p:nvGrpSpPr>
-      <p:grpSpPr>
-        <a:xfrm>
-          <a:off x="0" y="0"/>
-          <a:ext cx="0" cy="0"/>
-          <a:chOff x="0" y="0"/>
-          <a:chExt cx="0" cy="0"/>
-        </a:xfrm>
-      </p:grpSpPr>
-      <p:sp>
-        <p:nvSpPr>
-          <p:cNvPr id="2" name="Title 1">
-            <a:extLst>
-              <a:ext uri="{FF2B5EF4-FFF2-40B4-BE49-F238E27FC236}">
-                <a16:creationId xmlns:a16="http://schemas.microsoft.com/office/drawing/2014/main" id="{B71D9872-CE0B-7C4F-AE1F-471D79FB2122}"/>
-              </a:ext>
-            </a:extLst>
-          </p:cNvPr>
-          <p:cNvSpPr>
-            <a:spLocks noGrp="1"/>
-          </p:cNvSpPr>
-          <p:nvPr>
-            <p:ph type="title"/>
-          </p:nvPr>
-        </p:nvSpPr>
-        <p:spPr>
-          <a:xfrm>
-            <a:off x="634792" y="2313432"/>
-            <a:ext cx="8229600" cy="1344167"/>
-          </a:xfrm>
-        </p:spPr>
-        <p:txBody>
-          <a:bodyPr>
-            <a:normAutofit/>
-          </a:bodyPr>
-          <a:lstStyle/>
-          <a:p>
-            <a:r>
-              <a:rPr lang="en-US" dirty="0"/>
-              <a:t>Model &amp; Results</a:t>
-            </a:r>
-          </a:p>
-        </p:txBody>
-      </p:sp>
-      <p:sp>
-        <p:nvSpPr>
-          <p:cNvPr id="3" name="Date Placeholder 2">
-            <a:extLst>
-              <a:ext uri="{FF2B5EF4-FFF2-40B4-BE49-F238E27FC236}">
-                <a16:creationId xmlns:a16="http://schemas.microsoft.com/office/drawing/2014/main" id="{CD148C30-E7AE-384B-8149-C970B06234A7}"/>
-              </a:ext>
-            </a:extLst>
-          </p:cNvPr>
-          <p:cNvSpPr>
-            <a:spLocks noGrp="1"/>
-          </p:cNvSpPr>
-          <p:nvPr>
-            <p:ph type="dt" sz="half" idx="10"/>
-          </p:nvPr>
-        </p:nvSpPr>
-        <p:spPr/>
-        <p:txBody>
-          <a:bodyPr/>
-          <a:lstStyle/>
-          <a:p>
-            <a:r>
-              <a:rPr lang="en-US" dirty="0"/>
-              <a:t>April 26, 2018</a:t>
-            </a:r>
-          </a:p>
-        </p:txBody>
-      </p:sp>
-      <p:sp>
-        <p:nvSpPr>
-          <p:cNvPr id="4" name="Footer Placeholder 3">
-            <a:extLst>
-              <a:ext uri="{FF2B5EF4-FFF2-40B4-BE49-F238E27FC236}">
-                <a16:creationId xmlns:a16="http://schemas.microsoft.com/office/drawing/2014/main" id="{F778F496-B983-7440-AE28-05D9A7EC6156}"/>
-              </a:ext>
-            </a:extLst>
-          </p:cNvPr>
-          <p:cNvSpPr>
-            <a:spLocks noGrp="1"/>
-          </p:cNvSpPr>
-          <p:nvPr>
-            <p:ph type="ftr" sz="quarter" idx="11"/>
-          </p:nvPr>
-        </p:nvSpPr>
-        <p:spPr/>
-        <p:txBody>
-          <a:bodyPr/>
-          <a:lstStyle/>
-          <a:p>
-            <a:r>
-              <a:rPr lang="en-US"/>
-              <a:t>Classifying High-Resolution Brain Scans</a:t>
-            </a:r>
-            <a:endParaRPr lang="en-US" dirty="0"/>
-          </a:p>
-        </p:txBody>
-      </p:sp>
-      <p:sp>
-        <p:nvSpPr>
-          <p:cNvPr id="5" name="Slide Number Placeholder 4">
-            <a:extLst>
-              <a:ext uri="{FF2B5EF4-FFF2-40B4-BE49-F238E27FC236}">
-                <a16:creationId xmlns:a16="http://schemas.microsoft.com/office/drawing/2014/main" id="{7352E32E-D968-0A4C-876C-5B38829E1E5B}"/>
-              </a:ext>
-            </a:extLst>
-          </p:cNvPr>
-          <p:cNvSpPr>
-            <a:spLocks noGrp="1"/>
-          </p:cNvSpPr>
-          <p:nvPr>
-            <p:ph type="sldNum" sz="quarter" idx="12"/>
-          </p:nvPr>
-        </p:nvSpPr>
-        <p:spPr/>
-        <p:txBody>
-          <a:bodyPr/>
-          <a:lstStyle/>
-          <a:p>
-            <a:fld id="{A85782A5-310D-064D-97B2-7CD9DCF5F4D7}" type="slidenum">
-              <a:rPr lang="en-US" smtClean="0"/>
-              <a:pPr/>
-              <a:t>7</a:t>
-            </a:fld>
-            <a:endParaRPr lang="en-US" dirty="0"/>
-          </a:p>
-        </p:txBody>
-      </p:sp>
-    </p:spTree>
-    <p:extLst>
-      <p:ext uri="{BB962C8B-B14F-4D97-AF65-F5344CB8AC3E}">
-        <p14:creationId xmlns:p14="http://schemas.microsoft.com/office/powerpoint/2010/main" val="1884191572"/>
-      </p:ext>
-    </p:extLst>
-  </p:cSld>
-  <p:clrMapOvr>
-    <a:masterClrMapping/>
-  </p:clrMapOvr>
-</p:sld>
-</file>
-
-<file path=ppt/slides/slide8.xml><?xml version="1.0" encoding="utf-8"?>
-<p:sld xmlns:a="http://schemas.openxmlformats.org/drawingml/2006/main" xmlns:r="http://schemas.openxmlformats.org/officeDocument/2006/relationships" xmlns:p="http://schemas.openxmlformats.org/presentationml/2006/main">
-  <p:cSld>
-    <p:spTree>
-      <p:nvGrpSpPr>
-        <p:cNvPr id="1" name=""/>
-        <p:cNvGrpSpPr/>
-        <p:nvPr/>
-      </p:nvGrpSpPr>
-      <p:grpSpPr>
-        <a:xfrm>
-          <a:off x="0" y="0"/>
-          <a:ext cx="0" cy="0"/>
-          <a:chOff x="0" y="0"/>
-          <a:chExt cx="0" cy="0"/>
-        </a:xfrm>
-      </p:grpSpPr>
-      <p:sp>
-        <p:nvSpPr>
-          <p:cNvPr id="2" name="Title 1"/>
-          <p:cNvSpPr>
-            <a:spLocks noGrp="1"/>
-          </p:cNvSpPr>
-          <p:nvPr>
-            <p:ph type="title"/>
-          </p:nvPr>
-        </p:nvSpPr>
-        <p:spPr/>
-        <p:txBody>
-          <a:bodyPr>
-            <a:normAutofit fontScale="90000"/>
-          </a:bodyPr>
-          <a:lstStyle/>
-          <a:p>
-            <a:r>
-              <a:rPr lang="en-US" dirty="0"/>
-              <a:t>Parameter Tuning</a:t>
-            </a:r>
-          </a:p>
-        </p:txBody>
-      </p:sp>
-      <p:sp>
-        <p:nvSpPr>
-          <p:cNvPr id="3" name="Content Placeholder 2"/>
-          <p:cNvSpPr>
-            <a:spLocks noGrp="1"/>
-          </p:cNvSpPr>
-          <p:nvPr>
-            <p:ph idx="1"/>
-          </p:nvPr>
-        </p:nvSpPr>
-        <p:spPr/>
-        <p:txBody>
-          <a:bodyPr>
-            <a:normAutofit fontScale="92500"/>
-          </a:bodyPr>
-          <a:lstStyle/>
-          <a:p>
-            <a:r>
-              <a:rPr lang="en-US" b="1" dirty="0" err="1"/>
-              <a:t>ParamGridBuilder</a:t>
-            </a:r>
-            <a:r>
-              <a:rPr lang="en-US" b="1" dirty="0"/>
-              <a:t>() </a:t>
-            </a:r>
-            <a:r>
-              <a:rPr lang="en-US" dirty="0"/>
-              <a:t>– constructs a grid of parameters to search over</a:t>
-            </a:r>
-          </a:p>
-          <a:p>
-            <a:r>
-              <a:rPr lang="en-US" b="1" dirty="0"/>
-              <a:t>*</a:t>
-            </a:r>
-            <a:r>
-              <a:rPr lang="en-US" b="1" dirty="0" err="1"/>
-              <a:t>numTrees</a:t>
-            </a:r>
-            <a:r>
-              <a:rPr lang="en-US" b="1" dirty="0"/>
-              <a:t> </a:t>
-            </a:r>
-            <a:r>
-              <a:rPr lang="en-US" dirty="0"/>
-              <a:t>– increasing lead to better accuracy and less compute time</a:t>
-            </a:r>
-          </a:p>
-          <a:p>
-            <a:r>
-              <a:rPr lang="en-US" b="1" dirty="0"/>
-              <a:t>*</a:t>
-            </a:r>
-            <a:r>
-              <a:rPr lang="en-US" b="1" dirty="0" err="1"/>
-              <a:t>maxDepth</a:t>
-            </a:r>
-            <a:r>
-              <a:rPr lang="en-US" dirty="0"/>
-              <a:t> - higher values lead to overfitting and increased run time of the model</a:t>
-            </a:r>
-            <a:endParaRPr lang="en-US" b="1" dirty="0"/>
-          </a:p>
-          <a:p>
-            <a:r>
-              <a:rPr lang="en-US" b="1" dirty="0" err="1"/>
-              <a:t>maxBins</a:t>
-            </a:r>
-            <a:r>
-              <a:rPr lang="en-US" dirty="0"/>
-              <a:t> - maximum number of bins used for splitting features</a:t>
-            </a:r>
-            <a:endParaRPr lang="en-US" b="1" dirty="0"/>
-          </a:p>
-          <a:p>
-            <a:r>
-              <a:rPr lang="en-US" b="1" dirty="0"/>
-              <a:t>*impurity</a:t>
-            </a:r>
-            <a:r>
-              <a:rPr lang="en-US" dirty="0"/>
-              <a:t> – criterion (</a:t>
-            </a:r>
-            <a:r>
-              <a:rPr lang="en-US" dirty="0" err="1"/>
-              <a:t>gini</a:t>
-            </a:r>
-            <a:r>
-              <a:rPr lang="en-US" dirty="0"/>
-              <a:t>)</a:t>
-            </a:r>
-          </a:p>
-        </p:txBody>
-      </p:sp>
-      <p:sp>
-        <p:nvSpPr>
-          <p:cNvPr id="4" name="Date Placeholder 3"/>
-          <p:cNvSpPr>
-            <a:spLocks noGrp="1"/>
-          </p:cNvSpPr>
-          <p:nvPr>
-            <p:ph type="dt" sz="half" idx="10"/>
-          </p:nvPr>
-        </p:nvSpPr>
-        <p:spPr/>
-        <p:txBody>
-          <a:bodyPr/>
-          <a:lstStyle/>
-          <a:p>
-            <a:r>
-              <a:rPr lang="en-US" dirty="0"/>
-              <a:t>April 26, 2018</a:t>
-            </a:r>
-          </a:p>
-        </p:txBody>
-      </p:sp>
-      <p:sp>
-        <p:nvSpPr>
-          <p:cNvPr id="5" name="Footer Placeholder 4"/>
-          <p:cNvSpPr>
-            <a:spLocks noGrp="1"/>
-          </p:cNvSpPr>
-          <p:nvPr>
-            <p:ph type="ftr" sz="quarter" idx="11"/>
-          </p:nvPr>
-        </p:nvSpPr>
-        <p:spPr/>
-        <p:txBody>
-          <a:bodyPr/>
-          <a:lstStyle/>
-          <a:p>
-            <a:r>
-              <a:rPr lang="en-US" dirty="0"/>
-              <a:t>Classifying High-Resolution Brain Scans</a:t>
-            </a:r>
-          </a:p>
-        </p:txBody>
-      </p:sp>
-      <p:sp>
-        <p:nvSpPr>
-          <p:cNvPr id="6" name="Slide Number Placeholder 5"/>
-          <p:cNvSpPr>
-            <a:spLocks noGrp="1"/>
-          </p:cNvSpPr>
-          <p:nvPr>
-            <p:ph type="sldNum" sz="quarter" idx="12"/>
-          </p:nvPr>
-        </p:nvSpPr>
-        <p:spPr/>
-        <p:txBody>
-          <a:bodyPr/>
-          <a:lstStyle/>
-          <a:p>
-            <a:fld id="{A85782A5-310D-064D-97B2-7CD9DCF5F4D7}" type="slidenum">
-              <a:rPr lang="en-US" smtClean="0"/>
-              <a:t>8</a:t>
-            </a:fld>
-            <a:endParaRPr lang="en-US"/>
-          </a:p>
-        </p:txBody>
-      </p:sp>
-    </p:spTree>
-    <p:extLst>
-      <p:ext uri="{BB962C8B-B14F-4D97-AF65-F5344CB8AC3E}">
-        <p14:creationId xmlns:p14="http://schemas.microsoft.com/office/powerpoint/2010/main" val="4063819120"/>
       </p:ext>
     </p:extLst>
   </p:cSld>
@@ -8939,7 +9293,7 @@
           <a:p>
             <a:r>
               <a:rPr lang="en-US" dirty="0"/>
-              <a:t>Splitting the Dataset</a:t>
+              <a:t>Parameter Tuning</a:t>
             </a:r>
           </a:p>
         </p:txBody>
@@ -8957,19 +9311,83 @@
         <p:spPr/>
         <p:txBody>
           <a:bodyPr>
-            <a:normAutofit/>
+            <a:normAutofit fontScale="92500"/>
           </a:bodyPr>
           <a:lstStyle/>
           <a:p>
             <a:r>
-              <a:rPr lang="en-US" dirty="0"/>
-              <a:t>Training &amp; Test data (image 1,2,3,4,6)</a:t>
-            </a:r>
-          </a:p>
-          <a:p>
-            <a:r>
-              <a:rPr lang="en-US" dirty="0"/>
-              <a:t>Validation data (image 5)</a:t>
+              <a:rPr lang="en-US" b="1" dirty="0" err="1"/>
+              <a:t>ParamGridBuilder</a:t>
+            </a:r>
+            <a:r>
+              <a:rPr lang="en-US" b="1" dirty="0"/>
+              <a:t>() </a:t>
+            </a:r>
+            <a:r>
+              <a:rPr lang="en-US" dirty="0"/>
+              <a:t>– constructs a grid of parameters to search over</a:t>
+            </a:r>
+          </a:p>
+          <a:p>
+            <a:r>
+              <a:rPr lang="en-US" b="1" dirty="0"/>
+              <a:t>*</a:t>
+            </a:r>
+            <a:r>
+              <a:rPr lang="en-US" b="1" dirty="0" err="1"/>
+              <a:t>numTrees</a:t>
+            </a:r>
+            <a:r>
+              <a:rPr lang="en-US" b="1" dirty="0"/>
+              <a:t> </a:t>
+            </a:r>
+            <a:r>
+              <a:rPr lang="en-US" dirty="0"/>
+              <a:t>– increasing lead to better accuracy and less compute time</a:t>
+            </a:r>
+          </a:p>
+          <a:p>
+            <a:r>
+              <a:rPr lang="en-US" b="1" dirty="0"/>
+              <a:t>*</a:t>
+            </a:r>
+            <a:r>
+              <a:rPr lang="en-US" b="1" dirty="0" err="1"/>
+              <a:t>maxDepth</a:t>
+            </a:r>
+            <a:r>
+              <a:rPr lang="en-US" dirty="0"/>
+              <a:t> - higher values lead to overfitting and increased run time of the model</a:t>
+            </a:r>
+            <a:endParaRPr lang="en-US" b="1" dirty="0"/>
+          </a:p>
+          <a:p>
+            <a:r>
+              <a:rPr lang="en-US" b="1" dirty="0" err="1"/>
+              <a:t>maxBins</a:t>
+            </a:r>
+            <a:r>
+              <a:rPr lang="en-US" dirty="0"/>
+              <a:t> - maximum number of bins used for splitting features</a:t>
+            </a:r>
+            <a:endParaRPr lang="en-US" b="1" dirty="0"/>
+          </a:p>
+          <a:p>
+            <a:r>
+              <a:rPr lang="en-US" b="1" dirty="0"/>
+              <a:t>*impurity</a:t>
+            </a:r>
+            <a:r>
+              <a:rPr lang="en-US" dirty="0"/>
+              <a:t> – criterion (</a:t>
+            </a:r>
+            <a:r>
+              <a:rPr lang="en-US" dirty="0" err="1"/>
+              <a:t>gini</a:t>
+            </a:r>
+            <a:r>
+              <a:rPr lang="en-US" dirty="0"/>
+              <a:t>)</a:t>
             </a:r>
           </a:p>
         </p:txBody>
@@ -9044,7 +9462,7 @@
     </p:spTree>
     <p:extLst>
       <p:ext uri="{BB962C8B-B14F-4D97-AF65-F5344CB8AC3E}">
-        <p14:creationId xmlns:p14="http://schemas.microsoft.com/office/powerpoint/2010/main" val="404897761"/>
+        <p14:creationId xmlns:p14="http://schemas.microsoft.com/office/powerpoint/2010/main" val="4063819120"/>
       </p:ext>
     </p:extLst>
   </p:cSld>

</xml_diff>

<commit_message>
update spark & ml slide
</commit_message>
<xml_diff>
--- a/presentation/DutileOtentiPhangSweeney.pptx
+++ b/presentation/DutileOtentiPhangSweeney.pptx
@@ -8045,12 +8045,35 @@
         </p:nvSpPr>
         <p:spPr/>
         <p:txBody>
-          <a:bodyPr/>
+          <a:bodyPr>
+            <a:normAutofit fontScale="92500" lnSpcReduction="10000"/>
+          </a:bodyPr>
           <a:lstStyle/>
           <a:p>
             <a:r>
               <a:rPr lang="en-US" dirty="0"/>
               <a:t>Apache Spark is a fast and general engine for large-scale data processing</a:t>
+            </a:r>
+          </a:p>
+          <a:p>
+            <a:pPr lvl="1"/>
+            <a:r>
+              <a:rPr lang="en-US" dirty="0"/>
+              <a:t>Scalable, fault tolerant, &amp; distributed framework for data science</a:t>
+            </a:r>
+          </a:p>
+          <a:p>
+            <a:pPr lvl="1"/>
+            <a:r>
+              <a:rPr lang="en-US" dirty="0"/>
+              <a:t>Resilient datasets</a:t>
+            </a:r>
+          </a:p>
+          <a:p>
+            <a:pPr lvl="2"/>
+            <a:r>
+              <a:rPr lang="en-US" dirty="0"/>
+              <a:t>No work lost when machines fail</a:t>
             </a:r>
           </a:p>
           <a:p>
@@ -8062,10 +8085,31 @@
               <a:rPr lang="en-US" dirty="0" err="1"/>
               <a:t>MLLib</a:t>
             </a:r>
-            <a:endParaRPr lang="en-US" dirty="0"/>
-          </a:p>
-          <a:p>
-            <a:endParaRPr lang="en-US" dirty="0"/>
+            <a:r>
+              <a:rPr lang="en-US" dirty="0"/>
+              <a:t> runs on Spark</a:t>
+            </a:r>
+          </a:p>
+          <a:p>
+            <a:pPr lvl="1"/>
+            <a:r>
+              <a:rPr lang="en-US" dirty="0"/>
+              <a:t>Packaged ML algorithms</a:t>
+            </a:r>
+          </a:p>
+          <a:p>
+            <a:pPr lvl="1"/>
+            <a:r>
+              <a:rPr lang="en-US" dirty="0"/>
+              <a:t>Limited to easy to parallelize algorithms</a:t>
+            </a:r>
+          </a:p>
+          <a:p>
+            <a:pPr lvl="2"/>
+            <a:r>
+              <a:rPr lang="en-US" dirty="0"/>
+              <a:t>Ensembles are trivially parallel!</a:t>
+            </a:r>
           </a:p>
         </p:txBody>
       </p:sp>

</xml_diff>